<commit_message>
Apresentação Intermédia - PowerPoint
</commit_message>
<xml_diff>
--- a/Documentos/Apresentacao Intermedia- Projeto - LabSecurity.pptx
+++ b/Documentos/Apresentacao Intermedia- Projeto - LabSecurity.pptx
@@ -111,7 +111,16 @@
       </a:defRPr>
     </a:lvl9pPr>
   </p:defaultTextStyle>
+  <p:extLst>
+    <p:ext uri="{EFAFB233-063F-42B5-8137-9DF3F51BA10A}">
+      <p15:sldGuideLst xmlns:p15="http://schemas.microsoft.com/office/powerpoint/2012/main"/>
+    </p:ext>
+  </p:extLst>
 </p:presentation>
+</file>
+
+<file path=ppt/revisionInfo.xml><?xml version="1.0" encoding="utf-8"?>
+<p1510:revInfo xmlns:a="http://schemas.openxmlformats.org/drawingml/2006/main" xmlns:r="http://schemas.openxmlformats.org/officeDocument/2006/relationships" xmlns:p1510="http://schemas.microsoft.com/office/powerpoint/2015/10/main"/>
 </file>
 
 <file path=ppt/notesMasters/notesMaster1.xml><?xml version="1.0" encoding="utf-8"?>
@@ -6671,7 +6680,12 @@
             <p:ph type="ctrTitle"/>
           </p:nvPr>
         </p:nvSpPr>
-        <p:spPr/>
+        <p:spPr>
+          <a:xfrm>
+            <a:off x="1739673" y="914401"/>
+            <a:ext cx="6947127" cy="1266824"/>
+          </a:xfrm>
+        </p:spPr>
         <p:txBody>
           <a:bodyPr/>
           <a:lstStyle/>
@@ -6852,8 +6866,8 @@
         </p:nvSpPr>
         <p:spPr>
           <a:xfrm>
-            <a:off x="1542752" y="1487280"/>
-            <a:ext cx="7080538" cy="2182052"/>
+            <a:off x="689479" y="666750"/>
+            <a:ext cx="7080538" cy="4975989"/>
           </a:xfrm>
         </p:spPr>
         <p:txBody>
@@ -6866,6 +6880,18 @@
               <a:rPr lang="pt-PT" dirty="0"/>
               <a:t>Problema: Divulgação de projetos de Programação e Segurança</a:t>
             </a:r>
+          </a:p>
+          <a:p>
+            <a:endParaRPr lang="pt-PT" dirty="0"/>
+          </a:p>
+          <a:p>
+            <a:endParaRPr lang="pt-PT" dirty="0"/>
+          </a:p>
+          <a:p>
+            <a:pPr marL="0" indent="0">
+              <a:buNone/>
+            </a:pPr>
+            <a:endParaRPr lang="pt-PT" dirty="0"/>
           </a:p>
           <a:p>
             <a:r>
@@ -6921,6 +6947,134 @@
           </a:p>
         </p:txBody>
       </p:sp>
+      <p:pic>
+        <p:nvPicPr>
+          <p:cNvPr id="3074" name="Picture 2" descr="Imagem relacionada">
+            <a:extLst>
+              <a:ext uri="{FF2B5EF4-FFF2-40B4-BE49-F238E27FC236}">
+                <a16:creationId xmlns:a16="http://schemas.microsoft.com/office/drawing/2014/main" id="{9ABB026C-28B5-4F22-B6B3-7F6DCEFD55C5}"/>
+              </a:ext>
+            </a:extLst>
+          </p:cNvPr>
+          <p:cNvPicPr>
+            <a:picLocks noChangeAspect="1" noChangeArrowheads="1"/>
+          </p:cNvPicPr>
+          <p:nvPr/>
+        </p:nvPicPr>
+        <p:blipFill>
+          <a:blip r:embed="rId3">
+            <a:extLst>
+              <a:ext uri="{28A0092B-C50C-407E-A947-70E740481C1C}">
+                <a14:useLocalDpi xmlns:a14="http://schemas.microsoft.com/office/drawing/2010/main" val="0"/>
+              </a:ext>
+            </a:extLst>
+          </a:blip>
+          <a:srcRect/>
+          <a:stretch>
+            <a:fillRect/>
+          </a:stretch>
+        </p:blipFill>
+        <p:spPr bwMode="auto">
+          <a:xfrm>
+            <a:off x="5761943" y="2328585"/>
+            <a:ext cx="1652318" cy="1652318"/>
+          </a:xfrm>
+          <a:prstGeom prst="roundRect">
+            <a:avLst>
+              <a:gd name="adj" fmla="val 4167"/>
+            </a:avLst>
+          </a:prstGeom>
+          <a:solidFill>
+            <a:srgbClr val="FFFFFF"/>
+          </a:solidFill>
+          <a:ln w="76200" cap="sq">
+            <a:solidFill>
+              <a:srgbClr val="292929"/>
+            </a:solidFill>
+            <a:miter lim="800000"/>
+          </a:ln>
+          <a:effectLst>
+            <a:reflection blurRad="12700" stA="28000" endPos="28000" dist="5000" dir="5400000" sy="-100000" algn="bl" rotWithShape="0"/>
+          </a:effectLst>
+          <a:scene3d>
+            <a:camera prst="orthographicFront"/>
+            <a:lightRig rig="threePt" dir="t">
+              <a:rot lat="0" lon="0" rev="2700000"/>
+            </a:lightRig>
+          </a:scene3d>
+          <a:sp3d>
+            <a:bevelT h="38100"/>
+            <a:contourClr>
+              <a:srgbClr val="C0C0C0"/>
+            </a:contourClr>
+          </a:sp3d>
+          <a:extLst/>
+        </p:spPr>
+      </p:pic>
+      <p:pic>
+        <p:nvPicPr>
+          <p:cNvPr id="3076" name="Picture 4" descr="Resultado de imagem para web platform">
+            <a:extLst>
+              <a:ext uri="{FF2B5EF4-FFF2-40B4-BE49-F238E27FC236}">
+                <a16:creationId xmlns:a16="http://schemas.microsoft.com/office/drawing/2014/main" id="{67833637-0E9F-480B-AB3A-0F75DE7CDE87}"/>
+              </a:ext>
+            </a:extLst>
+          </p:cNvPr>
+          <p:cNvPicPr>
+            <a:picLocks noChangeAspect="1" noChangeArrowheads="1"/>
+          </p:cNvPicPr>
+          <p:nvPr/>
+        </p:nvPicPr>
+        <p:blipFill>
+          <a:blip r:embed="rId4">
+            <a:extLst>
+              <a:ext uri="{28A0092B-C50C-407E-A947-70E740481C1C}">
+                <a14:useLocalDpi xmlns:a14="http://schemas.microsoft.com/office/drawing/2010/main" val="0"/>
+              </a:ext>
+            </a:extLst>
+          </a:blip>
+          <a:srcRect/>
+          <a:stretch>
+            <a:fillRect/>
+          </a:stretch>
+        </p:blipFill>
+        <p:spPr bwMode="auto">
+          <a:xfrm>
+            <a:off x="4702019" y="4813998"/>
+            <a:ext cx="2712242" cy="1657481"/>
+          </a:xfrm>
+          <a:prstGeom prst="roundRect">
+            <a:avLst>
+              <a:gd name="adj" fmla="val 4167"/>
+            </a:avLst>
+          </a:prstGeom>
+          <a:solidFill>
+            <a:srgbClr val="FFFFFF"/>
+          </a:solidFill>
+          <a:ln w="76200" cap="sq">
+            <a:solidFill>
+              <a:srgbClr val="292929"/>
+            </a:solidFill>
+            <a:miter lim="800000"/>
+          </a:ln>
+          <a:effectLst>
+            <a:reflection blurRad="12700" stA="28000" endPos="28000" dist="5000" dir="5400000" sy="-100000" algn="bl" rotWithShape="0"/>
+          </a:effectLst>
+          <a:scene3d>
+            <a:camera prst="orthographicFront"/>
+            <a:lightRig rig="threePt" dir="t">
+              <a:rot lat="0" lon="0" rev="2700000"/>
+            </a:lightRig>
+          </a:scene3d>
+          <a:sp3d>
+            <a:bevelT h="38100"/>
+            <a:contourClr>
+              <a:srgbClr val="C0C0C0"/>
+            </a:contourClr>
+          </a:sp3d>
+          <a:extLst/>
+        </p:spPr>
+      </p:pic>
     </p:spTree>
     <p:extLst>
       <p:ext uri="{BB962C8B-B14F-4D97-AF65-F5344CB8AC3E}">
@@ -6991,8 +7145,8 @@
         </p:nvSpPr>
         <p:spPr>
           <a:xfrm>
-            <a:off x="1559403" y="2515"/>
-            <a:ext cx="7067864" cy="979300"/>
+            <a:off x="982133" y="0"/>
+            <a:ext cx="7704667" cy="895350"/>
           </a:xfrm>
         </p:spPr>
         <p:txBody>
@@ -7014,6 +7168,110 @@
               <a:t>Projeto</a:t>
             </a:r>
             <a:endParaRPr lang="en-US" dirty="0"/>
+          </a:p>
+        </p:txBody>
+      </p:sp>
+      <p:sp>
+        <p:nvSpPr>
+          <p:cNvPr id="3" name="Marcador de Posição de Conteúdo 2">
+            <a:extLst>
+              <a:ext uri="{FF2B5EF4-FFF2-40B4-BE49-F238E27FC236}">
+                <a16:creationId xmlns:a16="http://schemas.microsoft.com/office/drawing/2014/main" id="{4165D446-A5A8-4F7A-9B41-8BA11D226FC9}"/>
+              </a:ext>
+            </a:extLst>
+          </p:cNvPr>
+          <p:cNvSpPr>
+            <a:spLocks noGrp="1"/>
+          </p:cNvSpPr>
+          <p:nvPr>
+            <p:ph idx="1"/>
+          </p:nvPr>
+        </p:nvSpPr>
+        <p:spPr>
+          <a:xfrm>
+            <a:off x="982133" y="2447924"/>
+            <a:ext cx="7704667" cy="5095875"/>
+          </a:xfrm>
+        </p:spPr>
+        <p:txBody>
+          <a:bodyPr>
+            <a:normAutofit lnSpcReduction="10000"/>
+          </a:bodyPr>
+          <a:lstStyle/>
+          <a:p>
+            <a:r>
+              <a:rPr lang="pt-PT" sz="2200" dirty="0"/>
+              <a:t>Plataforma Online</a:t>
+            </a:r>
+          </a:p>
+          <a:p>
+            <a:endParaRPr lang="pt-PT" sz="2200" dirty="0"/>
+          </a:p>
+          <a:p>
+            <a:r>
+              <a:rPr lang="pt-PT" sz="2200" dirty="0"/>
+              <a:t>Competições de </a:t>
+            </a:r>
+            <a:r>
+              <a:rPr lang="pt-PT" sz="2200" dirty="0" err="1"/>
+              <a:t>cibersegurança</a:t>
+            </a:r>
+            <a:endParaRPr lang="pt-PT" sz="2200" dirty="0"/>
+          </a:p>
+          <a:p>
+            <a:endParaRPr lang="pt-PT" sz="2200" dirty="0"/>
+          </a:p>
+          <a:p>
+            <a:r>
+              <a:rPr lang="pt-PT" sz="2200" dirty="0"/>
+              <a:t>Verificação automática de respostas</a:t>
+            </a:r>
+          </a:p>
+          <a:p>
+            <a:endParaRPr lang="pt-PT" sz="2200" dirty="0"/>
+          </a:p>
+          <a:p>
+            <a:r>
+              <a:rPr lang="pt-PT" sz="2200" dirty="0"/>
+              <a:t>Inserção de Propostas</a:t>
+            </a:r>
+          </a:p>
+          <a:p>
+            <a:endParaRPr lang="pt-PT" sz="2200" dirty="0"/>
+          </a:p>
+          <a:p>
+            <a:r>
+              <a:rPr lang="pt-PT" sz="2200" dirty="0" err="1"/>
+              <a:t>Quizzes</a:t>
+            </a:r>
+            <a:endParaRPr lang="pt-PT" sz="2200" dirty="0"/>
+          </a:p>
+          <a:p>
+            <a:pPr marL="0" indent="0">
+              <a:buNone/>
+            </a:pPr>
+            <a:endParaRPr lang="pt-PT" sz="2200" dirty="0"/>
+          </a:p>
+          <a:p>
+            <a:r>
+              <a:rPr lang="pt-PT" sz="2200" dirty="0"/>
+              <a:t>Informações sobre as vulnerabilidades</a:t>
+            </a:r>
+          </a:p>
+          <a:p>
+            <a:endParaRPr lang="pt-PT" dirty="0"/>
+          </a:p>
+          <a:p>
+            <a:endParaRPr lang="pt-PT" dirty="0"/>
+          </a:p>
+          <a:p>
+            <a:endParaRPr lang="pt-PT" dirty="0"/>
+          </a:p>
+          <a:p>
+            <a:endParaRPr lang="pt-PT" dirty="0"/>
+          </a:p>
+          <a:p>
+            <a:endParaRPr lang="pt-PT" dirty="0"/>
           </a:p>
         </p:txBody>
       </p:sp>
@@ -7033,12 +7291,7 @@
             <p:ph type="sldNum" sz="quarter" idx="12"/>
           </p:nvPr>
         </p:nvSpPr>
-        <p:spPr>
-          <a:xfrm>
-            <a:off x="8213892" y="5883275"/>
-            <a:ext cx="413375" cy="365125"/>
-          </a:xfrm>
-        </p:spPr>
+        <p:spPr/>
         <p:txBody>
           <a:bodyPr vert="horz" lIns="91440" tIns="45720" rIns="91440" bIns="45720" rtlCol="0" anchor="ctr">
             <a:normAutofit/>
@@ -7063,334 +7316,6 @@
           </a:p>
         </p:txBody>
       </p:sp>
-      <p:pic>
-        <p:nvPicPr>
-          <p:cNvPr id="59" name="Imagem 58">
-            <a:extLst>
-              <a:ext uri="{FF2B5EF4-FFF2-40B4-BE49-F238E27FC236}">
-                <a16:creationId xmlns:a16="http://schemas.microsoft.com/office/drawing/2014/main" id="{AF544B8B-EBF2-4385-A4F0-26196F5157B6}"/>
-              </a:ext>
-            </a:extLst>
-          </p:cNvPr>
-          <p:cNvPicPr>
-            <a:picLocks noChangeAspect="1"/>
-          </p:cNvPicPr>
-          <p:nvPr/>
-        </p:nvPicPr>
-        <p:blipFill>
-          <a:blip r:embed="rId3"/>
-          <a:stretch>
-            <a:fillRect/>
-          </a:stretch>
-        </p:blipFill>
-        <p:spPr>
-          <a:xfrm>
-            <a:off x="7071977" y="2553631"/>
-            <a:ext cx="1943202" cy="1457401"/>
-          </a:xfrm>
-          <a:prstGeom prst="roundRect">
-            <a:avLst>
-              <a:gd name="adj" fmla="val 4167"/>
-            </a:avLst>
-          </a:prstGeom>
-          <a:solidFill>
-            <a:srgbClr val="FFFFFF"/>
-          </a:solidFill>
-          <a:ln w="76200" cap="sq">
-            <a:solidFill>
-              <a:srgbClr val="292929"/>
-            </a:solidFill>
-            <a:miter lim="800000"/>
-          </a:ln>
-          <a:effectLst>
-            <a:reflection blurRad="12700" stA="28000" endPos="28000" dist="5000" dir="5400000" sy="-100000" algn="bl" rotWithShape="0"/>
-          </a:effectLst>
-          <a:scene3d>
-            <a:camera prst="orthographicFront"/>
-            <a:lightRig rig="threePt" dir="t">
-              <a:rot lat="0" lon="0" rev="2700000"/>
-            </a:lightRig>
-          </a:scene3d>
-          <a:sp3d>
-            <a:bevelT h="38100"/>
-            <a:contourClr>
-              <a:srgbClr val="C0C0C0"/>
-            </a:contourClr>
-          </a:sp3d>
-        </p:spPr>
-      </p:pic>
-      <p:pic>
-        <p:nvPicPr>
-          <p:cNvPr id="60" name="Picture 2" descr="Resultado de imagem para Competitions">
-            <a:extLst>
-              <a:ext uri="{FF2B5EF4-FFF2-40B4-BE49-F238E27FC236}">
-                <a16:creationId xmlns:a16="http://schemas.microsoft.com/office/drawing/2014/main" id="{AD3A8EF7-0911-4A27-A5EC-DC24EAE4BD48}"/>
-              </a:ext>
-            </a:extLst>
-          </p:cNvPr>
-          <p:cNvPicPr>
-            <a:picLocks noChangeAspect="1" noChangeArrowheads="1"/>
-          </p:cNvPicPr>
-          <p:nvPr/>
-        </p:nvPicPr>
-        <p:blipFill>
-          <a:blip r:embed="rId4">
-            <a:extLst>
-              <a:ext uri="{28A0092B-C50C-407E-A947-70E740481C1C}">
-                <a14:useLocalDpi xmlns:a14="http://schemas.microsoft.com/office/drawing/2010/main" val="0"/>
-              </a:ext>
-            </a:extLst>
-          </a:blip>
-          <a:srcRect/>
-          <a:stretch>
-            <a:fillRect/>
-          </a:stretch>
-        </p:blipFill>
-        <p:spPr bwMode="auto">
-          <a:xfrm>
-            <a:off x="332682" y="2553631"/>
-            <a:ext cx="1934844" cy="1754477"/>
-          </a:xfrm>
-          <a:prstGeom prst="roundRect">
-            <a:avLst>
-              <a:gd name="adj" fmla="val 4167"/>
-            </a:avLst>
-          </a:prstGeom>
-          <a:solidFill>
-            <a:srgbClr val="FFFFFF"/>
-          </a:solidFill>
-          <a:ln w="76200" cap="sq">
-            <a:solidFill>
-              <a:srgbClr val="292929"/>
-            </a:solidFill>
-            <a:miter lim="800000"/>
-          </a:ln>
-          <a:effectLst>
-            <a:reflection blurRad="12700" stA="28000" endPos="28000" dist="5000" dir="5400000" sy="-100000" algn="bl" rotWithShape="0"/>
-          </a:effectLst>
-          <a:scene3d>
-            <a:camera prst="orthographicFront"/>
-            <a:lightRig rig="threePt" dir="t">
-              <a:rot lat="0" lon="0" rev="2700000"/>
-            </a:lightRig>
-          </a:scene3d>
-          <a:sp3d>
-            <a:bevelT h="38100"/>
-            <a:contourClr>
-              <a:srgbClr val="C0C0C0"/>
-            </a:contourClr>
-          </a:sp3d>
-          <a:extLst>
-            <a:ext uri="{909E8E84-426E-40DD-AFC4-6F175D3DCCD1}">
-              <a14:hiddenFill xmlns:a14="http://schemas.microsoft.com/office/drawing/2010/main">
-                <a:solidFill>
-                  <a:srgbClr val="FFFFFF"/>
-                </a:solidFill>
-              </a14:hiddenFill>
-            </a:ext>
-          </a:extLst>
-        </p:spPr>
-      </p:pic>
-      <p:pic>
-        <p:nvPicPr>
-          <p:cNvPr id="61" name="Imagem 60">
-            <a:extLst>
-              <a:ext uri="{FF2B5EF4-FFF2-40B4-BE49-F238E27FC236}">
-                <a16:creationId xmlns:a16="http://schemas.microsoft.com/office/drawing/2014/main" id="{A3837708-7A5A-44DF-8A89-D97C7E708717}"/>
-              </a:ext>
-            </a:extLst>
-          </p:cNvPr>
-          <p:cNvPicPr>
-            <a:picLocks noChangeAspect="1"/>
-          </p:cNvPicPr>
-          <p:nvPr/>
-        </p:nvPicPr>
-        <p:blipFill>
-          <a:blip r:embed="rId5"/>
-          <a:stretch>
-            <a:fillRect/>
-          </a:stretch>
-        </p:blipFill>
-        <p:spPr>
-          <a:xfrm>
-            <a:off x="1991321" y="4490035"/>
-            <a:ext cx="1938528" cy="1389888"/>
-          </a:xfrm>
-          <a:prstGeom prst="roundRect">
-            <a:avLst>
-              <a:gd name="adj" fmla="val 4167"/>
-            </a:avLst>
-          </a:prstGeom>
-          <a:solidFill>
-            <a:srgbClr val="FFFFFF"/>
-          </a:solidFill>
-          <a:ln w="76200" cap="sq">
-            <a:solidFill>
-              <a:srgbClr val="292929"/>
-            </a:solidFill>
-            <a:miter lim="800000"/>
-          </a:ln>
-          <a:effectLst>
-            <a:reflection blurRad="12700" stA="28000" endPos="28000" dist="5000" dir="5400000" sy="-100000" algn="bl" rotWithShape="0"/>
-          </a:effectLst>
-          <a:scene3d>
-            <a:camera prst="orthographicFront"/>
-            <a:lightRig rig="threePt" dir="t">
-              <a:rot lat="0" lon="0" rev="2700000"/>
-            </a:lightRig>
-          </a:scene3d>
-          <a:sp3d>
-            <a:bevelT h="38100"/>
-            <a:contourClr>
-              <a:srgbClr val="C0C0C0"/>
-            </a:contourClr>
-          </a:sp3d>
-        </p:spPr>
-      </p:pic>
-      <p:pic>
-        <p:nvPicPr>
-          <p:cNvPr id="62" name="Picture 4" descr="Resultado de imagem para Lessons">
-            <a:extLst>
-              <a:ext uri="{FF2B5EF4-FFF2-40B4-BE49-F238E27FC236}">
-                <a16:creationId xmlns:a16="http://schemas.microsoft.com/office/drawing/2014/main" id="{606D9090-3513-4589-AC1A-14C527C8B3C3}"/>
-              </a:ext>
-            </a:extLst>
-          </p:cNvPr>
-          <p:cNvPicPr>
-            <a:picLocks noChangeAspect="1" noChangeArrowheads="1"/>
-          </p:cNvPicPr>
-          <p:nvPr/>
-        </p:nvPicPr>
-        <p:blipFill>
-          <a:blip r:embed="rId6">
-            <a:extLst>
-              <a:ext uri="{28A0092B-C50C-407E-A947-70E740481C1C}">
-                <a14:useLocalDpi xmlns:a14="http://schemas.microsoft.com/office/drawing/2010/main" val="0"/>
-              </a:ext>
-            </a:extLst>
-          </a:blip>
-          <a:srcRect/>
-          <a:stretch>
-            <a:fillRect/>
-          </a:stretch>
-        </p:blipFill>
-        <p:spPr bwMode="auto">
-          <a:xfrm>
-            <a:off x="5189065" y="4490035"/>
-            <a:ext cx="2685776" cy="1389888"/>
-          </a:xfrm>
-          <a:prstGeom prst="roundRect">
-            <a:avLst>
-              <a:gd name="adj" fmla="val 4167"/>
-            </a:avLst>
-          </a:prstGeom>
-          <a:solidFill>
-            <a:srgbClr val="FFFFFF"/>
-          </a:solidFill>
-          <a:ln w="76200" cap="sq">
-            <a:solidFill>
-              <a:srgbClr val="292929"/>
-            </a:solidFill>
-            <a:miter lim="800000"/>
-          </a:ln>
-          <a:effectLst>
-            <a:reflection blurRad="12700" stA="28000" endPos="28000" dist="5000" dir="5400000" sy="-100000" algn="bl" rotWithShape="0"/>
-          </a:effectLst>
-          <a:scene3d>
-            <a:camera prst="orthographicFront"/>
-            <a:lightRig rig="threePt" dir="t">
-              <a:rot lat="0" lon="0" rev="2700000"/>
-            </a:lightRig>
-          </a:scene3d>
-          <a:sp3d>
-            <a:bevelT h="38100"/>
-            <a:contourClr>
-              <a:srgbClr val="C0C0C0"/>
-            </a:contourClr>
-          </a:sp3d>
-          <a:extLst>
-            <a:ext uri="{909E8E84-426E-40DD-AFC4-6F175D3DCCD1}">
-              <a14:hiddenFill xmlns:a14="http://schemas.microsoft.com/office/drawing/2010/main">
-                <a:solidFill>
-                  <a:srgbClr val="FFFFFF"/>
-                </a:solidFill>
-              </a14:hiddenFill>
-            </a:ext>
-          </a:extLst>
-        </p:spPr>
-      </p:pic>
-      <p:pic>
-        <p:nvPicPr>
-          <p:cNvPr id="63" name="Picture 6" descr="Resultado de imagem para Online Platform">
-            <a:extLst>
-              <a:ext uri="{FF2B5EF4-FFF2-40B4-BE49-F238E27FC236}">
-                <a16:creationId xmlns:a16="http://schemas.microsoft.com/office/drawing/2014/main" id="{60DB3BD1-CDC4-4983-8A80-6B77AAABF29A}"/>
-              </a:ext>
-            </a:extLst>
-          </p:cNvPr>
-          <p:cNvPicPr>
-            <a:picLocks noChangeAspect="1" noChangeArrowheads="1"/>
-          </p:cNvPicPr>
-          <p:nvPr/>
-        </p:nvPicPr>
-        <p:blipFill>
-          <a:blip r:embed="rId7">
-            <a:extLst>
-              <a:ext uri="{28A0092B-C50C-407E-A947-70E740481C1C}">
-                <a14:useLocalDpi xmlns:a14="http://schemas.microsoft.com/office/drawing/2010/main" val="0"/>
-              </a:ext>
-            </a:extLst>
-          </a:blip>
-          <a:srcRect/>
-          <a:stretch>
-            <a:fillRect/>
-          </a:stretch>
-        </p:blipFill>
-        <p:spPr bwMode="auto">
-          <a:xfrm>
-            <a:off x="3434295" y="2040981"/>
-            <a:ext cx="2470913" cy="1389888"/>
-          </a:xfrm>
-          <a:prstGeom prst="roundRect">
-            <a:avLst>
-              <a:gd name="adj" fmla="val 4167"/>
-            </a:avLst>
-          </a:prstGeom>
-          <a:solidFill>
-            <a:srgbClr val="FFFFFF"/>
-          </a:solidFill>
-          <a:ln w="76200" cap="sq">
-            <a:solidFill>
-              <a:srgbClr val="292929"/>
-            </a:solidFill>
-            <a:miter lim="800000"/>
-          </a:ln>
-          <a:effectLst>
-            <a:reflection blurRad="12700" stA="28000" endPos="28000" dist="5000" dir="5400000" sy="-100000" algn="bl" rotWithShape="0"/>
-          </a:effectLst>
-          <a:scene3d>
-            <a:camera prst="orthographicFront"/>
-            <a:lightRig rig="threePt" dir="t">
-              <a:rot lat="0" lon="0" rev="2700000"/>
-            </a:lightRig>
-          </a:scene3d>
-          <a:sp3d>
-            <a:bevelT h="38100"/>
-            <a:contourClr>
-              <a:srgbClr val="C0C0C0"/>
-            </a:contourClr>
-          </a:sp3d>
-          <a:extLst>
-            <a:ext uri="{909E8E84-426E-40DD-AFC4-6F175D3DCCD1}">
-              <a14:hiddenFill xmlns:a14="http://schemas.microsoft.com/office/drawing/2010/main">
-                <a:solidFill>
-                  <a:srgbClr val="FFFFFF"/>
-                </a:solidFill>
-              </a14:hiddenFill>
-            </a:ext>
-          </a:extLst>
-        </p:spPr>
-      </p:pic>
     </p:spTree>
     <p:extLst>
       <p:ext uri="{BB962C8B-B14F-4D97-AF65-F5344CB8AC3E}">
@@ -7470,7 +7395,12 @@
             <p:ph type="sldNum" sz="quarter" idx="12"/>
           </p:nvPr>
         </p:nvSpPr>
-        <p:spPr/>
+        <p:spPr>
+          <a:xfrm>
+            <a:off x="8258967" y="6108173"/>
+            <a:ext cx="427833" cy="365125"/>
+          </a:xfrm>
+        </p:spPr>
         <p:txBody>
           <a:bodyPr/>
           <a:lstStyle/>
@@ -7545,15 +7475,7 @@
               <a:srgbClr val="C0C0C0"/>
             </a:contourClr>
           </a:sp3d>
-          <a:extLst>
-            <a:ext uri="{909E8E84-426E-40DD-AFC4-6F175D3DCCD1}">
-              <a14:hiddenFill xmlns:a14="http://schemas.microsoft.com/office/drawing/2010/main">
-                <a:solidFill>
-                  <a:srgbClr val="FFFFFF"/>
-                </a:solidFill>
-              </a14:hiddenFill>
-            </a:ext>
-          </a:extLst>
+          <a:extLst/>
         </p:spPr>
       </p:pic>
       <p:pic>
@@ -7617,15 +7539,7 @@
               <a:srgbClr val="C0C0C0"/>
             </a:contourClr>
           </a:sp3d>
-          <a:extLst>
-            <a:ext uri="{909E8E84-426E-40DD-AFC4-6F175D3DCCD1}">
-              <a14:hiddenFill xmlns:a14="http://schemas.microsoft.com/office/drawing/2010/main">
-                <a:solidFill>
-                  <a:srgbClr val="FFFFFF"/>
-                </a:solidFill>
-              </a14:hiddenFill>
-            </a:ext>
-          </a:extLst>
+          <a:extLst/>
         </p:spPr>
       </p:pic>
       <p:pic>
@@ -7689,15 +7603,7 @@
               <a:srgbClr val="C0C0C0"/>
             </a:contourClr>
           </a:sp3d>
-          <a:extLst>
-            <a:ext uri="{909E8E84-426E-40DD-AFC4-6F175D3DCCD1}">
-              <a14:hiddenFill xmlns:a14="http://schemas.microsoft.com/office/drawing/2010/main">
-                <a:solidFill>
-                  <a:srgbClr val="FFFFFF"/>
-                </a:solidFill>
-              </a14:hiddenFill>
-            </a:ext>
-          </a:extLst>
+          <a:extLst/>
         </p:spPr>
       </p:pic>
       <p:pic>
@@ -7761,15 +7667,7 @@
               <a:srgbClr val="C0C0C0"/>
             </a:contourClr>
           </a:sp3d>
-          <a:extLst>
-            <a:ext uri="{909E8E84-426E-40DD-AFC4-6F175D3DCCD1}">
-              <a14:hiddenFill xmlns:a14="http://schemas.microsoft.com/office/drawing/2010/main">
-                <a:solidFill>
-                  <a:srgbClr val="FFFFFF"/>
-                </a:solidFill>
-              </a14:hiddenFill>
-            </a:ext>
-          </a:extLst>
+          <a:extLst/>
         </p:spPr>
       </p:pic>
       <p:pic>
@@ -7826,6 +7724,1390 @@
               <a:srgbClr val="C0C0C0"/>
             </a:contourClr>
           </a:sp3d>
+        </p:spPr>
+      </p:pic>
+      <p:sp>
+        <p:nvSpPr>
+          <p:cNvPr id="3" name="CaixaDeTexto 2">
+            <a:extLst>
+              <a:ext uri="{FF2B5EF4-FFF2-40B4-BE49-F238E27FC236}">
+                <a16:creationId xmlns:a16="http://schemas.microsoft.com/office/drawing/2014/main" id="{0DAF83C6-A1C1-446B-89E7-E00647F00EE0}"/>
+              </a:ext>
+            </a:extLst>
+          </p:cNvPr>
+          <p:cNvSpPr txBox="1"/>
+          <p:nvPr/>
+        </p:nvSpPr>
+        <p:spPr>
+          <a:xfrm>
+            <a:off x="2249867" y="1132342"/>
+            <a:ext cx="859531" cy="338554"/>
+          </a:xfrm>
+          <a:prstGeom prst="rect">
+            <a:avLst/>
+          </a:prstGeom>
+          <a:noFill/>
+        </p:spPr>
+        <p:txBody>
+          <a:bodyPr wrap="none" rtlCol="0">
+            <a:spAutoFit/>
+          </a:bodyPr>
+          <a:lstStyle/>
+          <a:p>
+            <a:pPr algn="ctr"/>
+            <a:r>
+              <a:rPr lang="pt-PT" sz="1600" dirty="0" err="1"/>
+              <a:t>Quizzes</a:t>
+            </a:r>
+            <a:endParaRPr lang="pt-PT" sz="1600" dirty="0"/>
+          </a:p>
+        </p:txBody>
+      </p:sp>
+      <p:sp>
+        <p:nvSpPr>
+          <p:cNvPr id="10" name="CaixaDeTexto 9">
+            <a:extLst>
+              <a:ext uri="{FF2B5EF4-FFF2-40B4-BE49-F238E27FC236}">
+                <a16:creationId xmlns:a16="http://schemas.microsoft.com/office/drawing/2014/main" id="{EBB6175A-73DE-4C51-B1C3-C51441118F52}"/>
+              </a:ext>
+            </a:extLst>
+          </p:cNvPr>
+          <p:cNvSpPr txBox="1"/>
+          <p:nvPr/>
+        </p:nvSpPr>
+        <p:spPr>
+          <a:xfrm>
+            <a:off x="3622252" y="1009234"/>
+            <a:ext cx="1035860" cy="584775"/>
+          </a:xfrm>
+          <a:prstGeom prst="rect">
+            <a:avLst/>
+          </a:prstGeom>
+          <a:noFill/>
+        </p:spPr>
+        <p:txBody>
+          <a:bodyPr wrap="none" rtlCol="0">
+            <a:spAutoFit/>
+          </a:bodyPr>
+          <a:lstStyle/>
+          <a:p>
+            <a:pPr algn="ctr"/>
+            <a:r>
+              <a:rPr lang="pt-PT" sz="1600" dirty="0"/>
+              <a:t>Propostas</a:t>
+            </a:r>
+          </a:p>
+          <a:p>
+            <a:pPr algn="ctr"/>
+            <a:r>
+              <a:rPr lang="pt-PT" sz="1600" dirty="0"/>
+              <a:t>Ataques</a:t>
+            </a:r>
+          </a:p>
+        </p:txBody>
+      </p:sp>
+      <p:sp>
+        <p:nvSpPr>
+          <p:cNvPr id="11" name="CaixaDeTexto 10">
+            <a:extLst>
+              <a:ext uri="{FF2B5EF4-FFF2-40B4-BE49-F238E27FC236}">
+                <a16:creationId xmlns:a16="http://schemas.microsoft.com/office/drawing/2014/main" id="{2C40CEC5-4C21-451E-B3B2-52E153AD1F76}"/>
+              </a:ext>
+            </a:extLst>
+          </p:cNvPr>
+          <p:cNvSpPr txBox="1"/>
+          <p:nvPr/>
+        </p:nvSpPr>
+        <p:spPr>
+          <a:xfrm>
+            <a:off x="4753449" y="1009234"/>
+            <a:ext cx="1242648" cy="584775"/>
+          </a:xfrm>
+          <a:prstGeom prst="rect">
+            <a:avLst/>
+          </a:prstGeom>
+          <a:noFill/>
+        </p:spPr>
+        <p:txBody>
+          <a:bodyPr wrap="none" rtlCol="0">
+            <a:spAutoFit/>
+          </a:bodyPr>
+          <a:lstStyle/>
+          <a:p>
+            <a:pPr algn="ctr"/>
+            <a:r>
+              <a:rPr lang="pt-PT" sz="1600" dirty="0"/>
+              <a:t>Informações</a:t>
+            </a:r>
+          </a:p>
+          <a:p>
+            <a:pPr algn="ctr"/>
+            <a:r>
+              <a:rPr lang="pt-PT" sz="1600" dirty="0"/>
+              <a:t>Ataques</a:t>
+            </a:r>
+          </a:p>
+        </p:txBody>
+      </p:sp>
+      <p:sp>
+        <p:nvSpPr>
+          <p:cNvPr id="13" name="CaixaDeTexto 12">
+            <a:extLst>
+              <a:ext uri="{FF2B5EF4-FFF2-40B4-BE49-F238E27FC236}">
+                <a16:creationId xmlns:a16="http://schemas.microsoft.com/office/drawing/2014/main" id="{81F5CF0F-1782-4E66-BFB0-296ED927C619}"/>
+              </a:ext>
+            </a:extLst>
+          </p:cNvPr>
+          <p:cNvSpPr txBox="1"/>
+          <p:nvPr/>
+        </p:nvSpPr>
+        <p:spPr>
+          <a:xfrm>
+            <a:off x="6076247" y="1009233"/>
+            <a:ext cx="1180131" cy="584775"/>
+          </a:xfrm>
+          <a:prstGeom prst="rect">
+            <a:avLst/>
+          </a:prstGeom>
+          <a:noFill/>
+        </p:spPr>
+        <p:txBody>
+          <a:bodyPr wrap="none" rtlCol="0">
+            <a:spAutoFit/>
+          </a:bodyPr>
+          <a:lstStyle/>
+          <a:p>
+            <a:pPr algn="ctr"/>
+            <a:r>
+              <a:rPr lang="pt-PT" sz="1600" dirty="0"/>
+              <a:t>Verificação</a:t>
+            </a:r>
+          </a:p>
+          <a:p>
+            <a:pPr algn="ctr"/>
+            <a:r>
+              <a:rPr lang="pt-PT" sz="1600" dirty="0"/>
+              <a:t>Automática</a:t>
+            </a:r>
+          </a:p>
+        </p:txBody>
+      </p:sp>
+      <p:sp>
+        <p:nvSpPr>
+          <p:cNvPr id="14" name="CaixaDeTexto 13">
+            <a:extLst>
+              <a:ext uri="{FF2B5EF4-FFF2-40B4-BE49-F238E27FC236}">
+                <a16:creationId xmlns:a16="http://schemas.microsoft.com/office/drawing/2014/main" id="{424B1A7F-9F87-49BF-B804-99517874365F}"/>
+              </a:ext>
+            </a:extLst>
+          </p:cNvPr>
+          <p:cNvSpPr txBox="1"/>
+          <p:nvPr/>
+        </p:nvSpPr>
+        <p:spPr>
+          <a:xfrm>
+            <a:off x="7581386" y="1009232"/>
+            <a:ext cx="1136850" cy="584775"/>
+          </a:xfrm>
+          <a:prstGeom prst="rect">
+            <a:avLst/>
+          </a:prstGeom>
+          <a:noFill/>
+        </p:spPr>
+        <p:txBody>
+          <a:bodyPr wrap="none" rtlCol="0">
+            <a:spAutoFit/>
+          </a:bodyPr>
+          <a:lstStyle/>
+          <a:p>
+            <a:pPr algn="ctr"/>
+            <a:r>
+              <a:rPr lang="pt-PT" sz="1600" dirty="0"/>
+              <a:t>Plataforma</a:t>
+            </a:r>
+          </a:p>
+          <a:p>
+            <a:pPr algn="ctr"/>
+            <a:r>
+              <a:rPr lang="pt-PT" sz="1600" dirty="0"/>
+              <a:t>Online</a:t>
+            </a:r>
+          </a:p>
+        </p:txBody>
+      </p:sp>
+      <p:pic>
+        <p:nvPicPr>
+          <p:cNvPr id="1030" name="Picture 6" descr="Resultado de imagem para cross png">
+            <a:extLst>
+              <a:ext uri="{FF2B5EF4-FFF2-40B4-BE49-F238E27FC236}">
+                <a16:creationId xmlns:a16="http://schemas.microsoft.com/office/drawing/2014/main" id="{4A925B1B-407D-49C1-B424-2DBFA70FDF11}"/>
+              </a:ext>
+            </a:extLst>
+          </p:cNvPr>
+          <p:cNvPicPr>
+            <a:picLocks noChangeAspect="1" noChangeArrowheads="1"/>
+          </p:cNvPicPr>
+          <p:nvPr/>
+        </p:nvPicPr>
+        <p:blipFill>
+          <a:blip r:embed="rId7">
+            <a:extLst>
+              <a:ext uri="{28A0092B-C50C-407E-A947-70E740481C1C}">
+                <a14:useLocalDpi xmlns:a14="http://schemas.microsoft.com/office/drawing/2010/main" val="0"/>
+              </a:ext>
+            </a:extLst>
+          </a:blip>
+          <a:srcRect/>
+          <a:stretch>
+            <a:fillRect/>
+          </a:stretch>
+        </p:blipFill>
+        <p:spPr bwMode="auto">
+          <a:xfrm>
+            <a:off x="3835382" y="1666855"/>
+            <a:ext cx="609600" cy="609600"/>
+          </a:xfrm>
+          <a:prstGeom prst="rect">
+            <a:avLst/>
+          </a:prstGeom>
+          <a:noFill/>
+          <a:extLst>
+            <a:ext uri="{909E8E84-426E-40DD-AFC4-6F175D3DCCD1}">
+              <a14:hiddenFill xmlns:a14="http://schemas.microsoft.com/office/drawing/2010/main">
+                <a:solidFill>
+                  <a:srgbClr val="FFFFFF"/>
+                </a:solidFill>
+              </a14:hiddenFill>
+            </a:ext>
+          </a:extLst>
+        </p:spPr>
+      </p:pic>
+      <p:pic>
+        <p:nvPicPr>
+          <p:cNvPr id="17" name="Picture 6" descr="Resultado de imagem para cross png">
+            <a:extLst>
+              <a:ext uri="{FF2B5EF4-FFF2-40B4-BE49-F238E27FC236}">
+                <a16:creationId xmlns:a16="http://schemas.microsoft.com/office/drawing/2014/main" id="{12572637-BFFC-425A-A92F-86B9281BE583}"/>
+              </a:ext>
+            </a:extLst>
+          </p:cNvPr>
+          <p:cNvPicPr>
+            <a:picLocks noChangeAspect="1" noChangeArrowheads="1"/>
+          </p:cNvPicPr>
+          <p:nvPr/>
+        </p:nvPicPr>
+        <p:blipFill>
+          <a:blip r:embed="rId7">
+            <a:extLst>
+              <a:ext uri="{28A0092B-C50C-407E-A947-70E740481C1C}">
+                <a14:useLocalDpi xmlns:a14="http://schemas.microsoft.com/office/drawing/2010/main" val="0"/>
+              </a:ext>
+            </a:extLst>
+          </a:blip>
+          <a:srcRect/>
+          <a:stretch>
+            <a:fillRect/>
+          </a:stretch>
+        </p:blipFill>
+        <p:spPr bwMode="auto">
+          <a:xfrm>
+            <a:off x="2369167" y="4999141"/>
+            <a:ext cx="609600" cy="609600"/>
+          </a:xfrm>
+          <a:prstGeom prst="rect">
+            <a:avLst/>
+          </a:prstGeom>
+          <a:noFill/>
+          <a:extLst>
+            <a:ext uri="{909E8E84-426E-40DD-AFC4-6F175D3DCCD1}">
+              <a14:hiddenFill xmlns:a14="http://schemas.microsoft.com/office/drawing/2010/main">
+                <a:solidFill>
+                  <a:srgbClr val="FFFFFF"/>
+                </a:solidFill>
+              </a14:hiddenFill>
+            </a:ext>
+          </a:extLst>
+        </p:spPr>
+      </p:pic>
+      <p:pic>
+        <p:nvPicPr>
+          <p:cNvPr id="21" name="Picture 6" descr="Resultado de imagem para cross png">
+            <a:extLst>
+              <a:ext uri="{FF2B5EF4-FFF2-40B4-BE49-F238E27FC236}">
+                <a16:creationId xmlns:a16="http://schemas.microsoft.com/office/drawing/2014/main" id="{3D29EBEA-F50B-4E0A-B1B8-61E7670F8956}"/>
+              </a:ext>
+            </a:extLst>
+          </p:cNvPr>
+          <p:cNvPicPr>
+            <a:picLocks noChangeAspect="1" noChangeArrowheads="1"/>
+          </p:cNvPicPr>
+          <p:nvPr/>
+        </p:nvPicPr>
+        <p:blipFill>
+          <a:blip r:embed="rId7">
+            <a:extLst>
+              <a:ext uri="{28A0092B-C50C-407E-A947-70E740481C1C}">
+                <a14:useLocalDpi xmlns:a14="http://schemas.microsoft.com/office/drawing/2010/main" val="0"/>
+              </a:ext>
+            </a:extLst>
+          </a:blip>
+          <a:srcRect/>
+          <a:stretch>
+            <a:fillRect/>
+          </a:stretch>
+        </p:blipFill>
+        <p:spPr bwMode="auto">
+          <a:xfrm>
+            <a:off x="3835382" y="2729411"/>
+            <a:ext cx="609600" cy="609600"/>
+          </a:xfrm>
+          <a:prstGeom prst="rect">
+            <a:avLst/>
+          </a:prstGeom>
+          <a:noFill/>
+          <a:extLst>
+            <a:ext uri="{909E8E84-426E-40DD-AFC4-6F175D3DCCD1}">
+              <a14:hiddenFill xmlns:a14="http://schemas.microsoft.com/office/drawing/2010/main">
+                <a:solidFill>
+                  <a:srgbClr val="FFFFFF"/>
+                </a:solidFill>
+              </a14:hiddenFill>
+            </a:ext>
+          </a:extLst>
+        </p:spPr>
+      </p:pic>
+      <p:pic>
+        <p:nvPicPr>
+          <p:cNvPr id="22" name="Picture 6" descr="Resultado de imagem para cross png">
+            <a:extLst>
+              <a:ext uri="{FF2B5EF4-FFF2-40B4-BE49-F238E27FC236}">
+                <a16:creationId xmlns:a16="http://schemas.microsoft.com/office/drawing/2014/main" id="{0A00AB40-7DB2-409B-8C7E-66C25A3F2CBE}"/>
+              </a:ext>
+            </a:extLst>
+          </p:cNvPr>
+          <p:cNvPicPr>
+            <a:picLocks noChangeAspect="1" noChangeArrowheads="1"/>
+          </p:cNvPicPr>
+          <p:nvPr/>
+        </p:nvPicPr>
+        <p:blipFill>
+          <a:blip r:embed="rId7">
+            <a:extLst>
+              <a:ext uri="{28A0092B-C50C-407E-A947-70E740481C1C}">
+                <a14:useLocalDpi xmlns:a14="http://schemas.microsoft.com/office/drawing/2010/main" val="0"/>
+              </a:ext>
+            </a:extLst>
+          </a:blip>
+          <a:srcRect/>
+          <a:stretch>
+            <a:fillRect/>
+          </a:stretch>
+        </p:blipFill>
+        <p:spPr bwMode="auto">
+          <a:xfrm>
+            <a:off x="3835382" y="3789825"/>
+            <a:ext cx="609600" cy="609600"/>
+          </a:xfrm>
+          <a:prstGeom prst="rect">
+            <a:avLst/>
+          </a:prstGeom>
+          <a:noFill/>
+          <a:extLst>
+            <a:ext uri="{909E8E84-426E-40DD-AFC4-6F175D3DCCD1}">
+              <a14:hiddenFill xmlns:a14="http://schemas.microsoft.com/office/drawing/2010/main">
+                <a:solidFill>
+                  <a:srgbClr val="FFFFFF"/>
+                </a:solidFill>
+              </a14:hiddenFill>
+            </a:ext>
+          </a:extLst>
+        </p:spPr>
+      </p:pic>
+      <p:pic>
+        <p:nvPicPr>
+          <p:cNvPr id="23" name="Picture 6" descr="Resultado de imagem para cross png">
+            <a:extLst>
+              <a:ext uri="{FF2B5EF4-FFF2-40B4-BE49-F238E27FC236}">
+                <a16:creationId xmlns:a16="http://schemas.microsoft.com/office/drawing/2014/main" id="{B701D76C-C13D-497C-AC69-2258A1F8A571}"/>
+              </a:ext>
+            </a:extLst>
+          </p:cNvPr>
+          <p:cNvPicPr>
+            <a:picLocks noChangeAspect="1" noChangeArrowheads="1"/>
+          </p:cNvPicPr>
+          <p:nvPr/>
+        </p:nvPicPr>
+        <p:blipFill>
+          <a:blip r:embed="rId7">
+            <a:extLst>
+              <a:ext uri="{28A0092B-C50C-407E-A947-70E740481C1C}">
+                <a14:useLocalDpi xmlns:a14="http://schemas.microsoft.com/office/drawing/2010/main" val="0"/>
+              </a:ext>
+            </a:extLst>
+          </a:blip>
+          <a:srcRect/>
+          <a:stretch>
+            <a:fillRect/>
+          </a:stretch>
+        </p:blipFill>
+        <p:spPr bwMode="auto">
+          <a:xfrm>
+            <a:off x="3835382" y="4999141"/>
+            <a:ext cx="609600" cy="609600"/>
+          </a:xfrm>
+          <a:prstGeom prst="rect">
+            <a:avLst/>
+          </a:prstGeom>
+          <a:noFill/>
+          <a:extLst>
+            <a:ext uri="{909E8E84-426E-40DD-AFC4-6F175D3DCCD1}">
+              <a14:hiddenFill xmlns:a14="http://schemas.microsoft.com/office/drawing/2010/main">
+                <a:solidFill>
+                  <a:srgbClr val="FFFFFF"/>
+                </a:solidFill>
+              </a14:hiddenFill>
+            </a:ext>
+          </a:extLst>
+        </p:spPr>
+      </p:pic>
+      <p:pic>
+        <p:nvPicPr>
+          <p:cNvPr id="24" name="Picture 6" descr="Resultado de imagem para cross png">
+            <a:extLst>
+              <a:ext uri="{FF2B5EF4-FFF2-40B4-BE49-F238E27FC236}">
+                <a16:creationId xmlns:a16="http://schemas.microsoft.com/office/drawing/2014/main" id="{AD7DD5C5-35D0-468F-B46C-82B415A1A8FA}"/>
+              </a:ext>
+            </a:extLst>
+          </p:cNvPr>
+          <p:cNvPicPr>
+            <a:picLocks noChangeAspect="1" noChangeArrowheads="1"/>
+          </p:cNvPicPr>
+          <p:nvPr/>
+        </p:nvPicPr>
+        <p:blipFill>
+          <a:blip r:embed="rId7">
+            <a:extLst>
+              <a:ext uri="{28A0092B-C50C-407E-A947-70E740481C1C}">
+                <a14:useLocalDpi xmlns:a14="http://schemas.microsoft.com/office/drawing/2010/main" val="0"/>
+              </a:ext>
+            </a:extLst>
+          </a:blip>
+          <a:srcRect/>
+          <a:stretch>
+            <a:fillRect/>
+          </a:stretch>
+        </p:blipFill>
+        <p:spPr bwMode="auto">
+          <a:xfrm>
+            <a:off x="3835382" y="6030703"/>
+            <a:ext cx="609600" cy="609600"/>
+          </a:xfrm>
+          <a:prstGeom prst="rect">
+            <a:avLst/>
+          </a:prstGeom>
+          <a:noFill/>
+          <a:extLst>
+            <a:ext uri="{909E8E84-426E-40DD-AFC4-6F175D3DCCD1}">
+              <a14:hiddenFill xmlns:a14="http://schemas.microsoft.com/office/drawing/2010/main">
+                <a:solidFill>
+                  <a:srgbClr val="FFFFFF"/>
+                </a:solidFill>
+              </a14:hiddenFill>
+            </a:ext>
+          </a:extLst>
+        </p:spPr>
+      </p:pic>
+      <p:pic>
+        <p:nvPicPr>
+          <p:cNvPr id="25" name="Picture 6" descr="Resultado de imagem para cross png">
+            <a:extLst>
+              <a:ext uri="{FF2B5EF4-FFF2-40B4-BE49-F238E27FC236}">
+                <a16:creationId xmlns:a16="http://schemas.microsoft.com/office/drawing/2014/main" id="{4CB5D3FF-8C7A-49FF-9F4B-113B69102F9C}"/>
+              </a:ext>
+            </a:extLst>
+          </p:cNvPr>
+          <p:cNvPicPr>
+            <a:picLocks noChangeAspect="1" noChangeArrowheads="1"/>
+          </p:cNvPicPr>
+          <p:nvPr/>
+        </p:nvPicPr>
+        <p:blipFill>
+          <a:blip r:embed="rId7">
+            <a:extLst>
+              <a:ext uri="{28A0092B-C50C-407E-A947-70E740481C1C}">
+                <a14:useLocalDpi xmlns:a14="http://schemas.microsoft.com/office/drawing/2010/main" val="0"/>
+              </a:ext>
+            </a:extLst>
+          </a:blip>
+          <a:srcRect/>
+          <a:stretch>
+            <a:fillRect/>
+          </a:stretch>
+        </p:blipFill>
+        <p:spPr bwMode="auto">
+          <a:xfrm>
+            <a:off x="5128468" y="1677058"/>
+            <a:ext cx="609600" cy="609600"/>
+          </a:xfrm>
+          <a:prstGeom prst="rect">
+            <a:avLst/>
+          </a:prstGeom>
+          <a:noFill/>
+          <a:extLst>
+            <a:ext uri="{909E8E84-426E-40DD-AFC4-6F175D3DCCD1}">
+              <a14:hiddenFill xmlns:a14="http://schemas.microsoft.com/office/drawing/2010/main">
+                <a:solidFill>
+                  <a:srgbClr val="FFFFFF"/>
+                </a:solidFill>
+              </a14:hiddenFill>
+            </a:ext>
+          </a:extLst>
+        </p:spPr>
+      </p:pic>
+      <p:pic>
+        <p:nvPicPr>
+          <p:cNvPr id="26" name="Picture 6" descr="Resultado de imagem para cross png">
+            <a:extLst>
+              <a:ext uri="{FF2B5EF4-FFF2-40B4-BE49-F238E27FC236}">
+                <a16:creationId xmlns:a16="http://schemas.microsoft.com/office/drawing/2014/main" id="{9BFC7988-E5D3-4DDF-936D-C155DB152925}"/>
+              </a:ext>
+            </a:extLst>
+          </p:cNvPr>
+          <p:cNvPicPr>
+            <a:picLocks noChangeAspect="1" noChangeArrowheads="1"/>
+          </p:cNvPicPr>
+          <p:nvPr/>
+        </p:nvPicPr>
+        <p:blipFill>
+          <a:blip r:embed="rId7">
+            <a:extLst>
+              <a:ext uri="{28A0092B-C50C-407E-A947-70E740481C1C}">
+                <a14:useLocalDpi xmlns:a14="http://schemas.microsoft.com/office/drawing/2010/main" val="0"/>
+              </a:ext>
+            </a:extLst>
+          </a:blip>
+          <a:srcRect/>
+          <a:stretch>
+            <a:fillRect/>
+          </a:stretch>
+        </p:blipFill>
+        <p:spPr bwMode="auto">
+          <a:xfrm>
+            <a:off x="5128468" y="2729411"/>
+            <a:ext cx="609600" cy="609600"/>
+          </a:xfrm>
+          <a:prstGeom prst="rect">
+            <a:avLst/>
+          </a:prstGeom>
+          <a:noFill/>
+          <a:extLst>
+            <a:ext uri="{909E8E84-426E-40DD-AFC4-6F175D3DCCD1}">
+              <a14:hiddenFill xmlns:a14="http://schemas.microsoft.com/office/drawing/2010/main">
+                <a:solidFill>
+                  <a:srgbClr val="FFFFFF"/>
+                </a:solidFill>
+              </a14:hiddenFill>
+            </a:ext>
+          </a:extLst>
+        </p:spPr>
+      </p:pic>
+      <p:pic>
+        <p:nvPicPr>
+          <p:cNvPr id="27" name="Picture 6" descr="Resultado de imagem para cross png">
+            <a:extLst>
+              <a:ext uri="{FF2B5EF4-FFF2-40B4-BE49-F238E27FC236}">
+                <a16:creationId xmlns:a16="http://schemas.microsoft.com/office/drawing/2014/main" id="{08E26847-1E9B-4801-B0B3-899AAB32A7BA}"/>
+              </a:ext>
+            </a:extLst>
+          </p:cNvPr>
+          <p:cNvPicPr>
+            <a:picLocks noChangeAspect="1" noChangeArrowheads="1"/>
+          </p:cNvPicPr>
+          <p:nvPr/>
+        </p:nvPicPr>
+        <p:blipFill>
+          <a:blip r:embed="rId7">
+            <a:extLst>
+              <a:ext uri="{28A0092B-C50C-407E-A947-70E740481C1C}">
+                <a14:useLocalDpi xmlns:a14="http://schemas.microsoft.com/office/drawing/2010/main" val="0"/>
+              </a:ext>
+            </a:extLst>
+          </a:blip>
+          <a:srcRect/>
+          <a:stretch>
+            <a:fillRect/>
+          </a:stretch>
+        </p:blipFill>
+        <p:spPr bwMode="auto">
+          <a:xfrm>
+            <a:off x="5069973" y="3789825"/>
+            <a:ext cx="609600" cy="609600"/>
+          </a:xfrm>
+          <a:prstGeom prst="rect">
+            <a:avLst/>
+          </a:prstGeom>
+          <a:noFill/>
+          <a:extLst>
+            <a:ext uri="{909E8E84-426E-40DD-AFC4-6F175D3DCCD1}">
+              <a14:hiddenFill xmlns:a14="http://schemas.microsoft.com/office/drawing/2010/main">
+                <a:solidFill>
+                  <a:srgbClr val="FFFFFF"/>
+                </a:solidFill>
+              </a14:hiddenFill>
+            </a:ext>
+          </a:extLst>
+        </p:spPr>
+      </p:pic>
+      <p:pic>
+        <p:nvPicPr>
+          <p:cNvPr id="28" name="Picture 6" descr="Resultado de imagem para cross png">
+            <a:extLst>
+              <a:ext uri="{FF2B5EF4-FFF2-40B4-BE49-F238E27FC236}">
+                <a16:creationId xmlns:a16="http://schemas.microsoft.com/office/drawing/2014/main" id="{CC1C9233-125E-470D-A2F1-B2EA1FEE3094}"/>
+              </a:ext>
+            </a:extLst>
+          </p:cNvPr>
+          <p:cNvPicPr>
+            <a:picLocks noChangeAspect="1" noChangeArrowheads="1"/>
+          </p:cNvPicPr>
+          <p:nvPr/>
+        </p:nvPicPr>
+        <p:blipFill>
+          <a:blip r:embed="rId7">
+            <a:extLst>
+              <a:ext uri="{28A0092B-C50C-407E-A947-70E740481C1C}">
+                <a14:useLocalDpi xmlns:a14="http://schemas.microsoft.com/office/drawing/2010/main" val="0"/>
+              </a:ext>
+            </a:extLst>
+          </a:blip>
+          <a:srcRect/>
+          <a:stretch>
+            <a:fillRect/>
+          </a:stretch>
+        </p:blipFill>
+        <p:spPr bwMode="auto">
+          <a:xfrm>
+            <a:off x="5069973" y="4999141"/>
+            <a:ext cx="609600" cy="609600"/>
+          </a:xfrm>
+          <a:prstGeom prst="rect">
+            <a:avLst/>
+          </a:prstGeom>
+          <a:noFill/>
+          <a:extLst>
+            <a:ext uri="{909E8E84-426E-40DD-AFC4-6F175D3DCCD1}">
+              <a14:hiddenFill xmlns:a14="http://schemas.microsoft.com/office/drawing/2010/main">
+                <a:solidFill>
+                  <a:srgbClr val="FFFFFF"/>
+                </a:solidFill>
+              </a14:hiddenFill>
+            </a:ext>
+          </a:extLst>
+        </p:spPr>
+      </p:pic>
+      <p:pic>
+        <p:nvPicPr>
+          <p:cNvPr id="30" name="Picture 4" descr="Resultado de imagem para check png">
+            <a:extLst>
+              <a:ext uri="{FF2B5EF4-FFF2-40B4-BE49-F238E27FC236}">
+                <a16:creationId xmlns:a16="http://schemas.microsoft.com/office/drawing/2014/main" id="{B231400E-780A-407A-9B26-2103B481969B}"/>
+              </a:ext>
+            </a:extLst>
+          </p:cNvPr>
+          <p:cNvPicPr>
+            <a:picLocks noChangeAspect="1" noChangeArrowheads="1"/>
+          </p:cNvPicPr>
+          <p:nvPr/>
+        </p:nvPicPr>
+        <p:blipFill>
+          <a:blip r:embed="rId8">
+            <a:extLst>
+              <a:ext uri="{28A0092B-C50C-407E-A947-70E740481C1C}">
+                <a14:useLocalDpi xmlns:a14="http://schemas.microsoft.com/office/drawing/2010/main" val="0"/>
+              </a:ext>
+            </a:extLst>
+          </a:blip>
+          <a:srcRect/>
+          <a:stretch>
+            <a:fillRect/>
+          </a:stretch>
+        </p:blipFill>
+        <p:spPr bwMode="auto">
+          <a:xfrm>
+            <a:off x="4979660" y="5936127"/>
+            <a:ext cx="790225" cy="790225"/>
+          </a:xfrm>
+          <a:prstGeom prst="rect">
+            <a:avLst/>
+          </a:prstGeom>
+          <a:noFill/>
+          <a:extLst>
+            <a:ext uri="{909E8E84-426E-40DD-AFC4-6F175D3DCCD1}">
+              <a14:hiddenFill xmlns:a14="http://schemas.microsoft.com/office/drawing/2010/main">
+                <a:solidFill>
+                  <a:srgbClr val="FFFFFF"/>
+                </a:solidFill>
+              </a14:hiddenFill>
+            </a:ext>
+          </a:extLst>
+        </p:spPr>
+      </p:pic>
+      <p:pic>
+        <p:nvPicPr>
+          <p:cNvPr id="31" name="Picture 6" descr="Resultado de imagem para cross png">
+            <a:extLst>
+              <a:ext uri="{FF2B5EF4-FFF2-40B4-BE49-F238E27FC236}">
+                <a16:creationId xmlns:a16="http://schemas.microsoft.com/office/drawing/2014/main" id="{2703F2B0-7CB9-4FC9-8A1D-1187167296AA}"/>
+              </a:ext>
+            </a:extLst>
+          </p:cNvPr>
+          <p:cNvPicPr>
+            <a:picLocks noChangeAspect="1" noChangeArrowheads="1"/>
+          </p:cNvPicPr>
+          <p:nvPr/>
+        </p:nvPicPr>
+        <p:blipFill>
+          <a:blip r:embed="rId7">
+            <a:extLst>
+              <a:ext uri="{28A0092B-C50C-407E-A947-70E740481C1C}">
+                <a14:useLocalDpi xmlns:a14="http://schemas.microsoft.com/office/drawing/2010/main" val="0"/>
+              </a:ext>
+            </a:extLst>
+          </a:blip>
+          <a:srcRect/>
+          <a:stretch>
+            <a:fillRect/>
+          </a:stretch>
+        </p:blipFill>
+        <p:spPr bwMode="auto">
+          <a:xfrm>
+            <a:off x="6361512" y="4999141"/>
+            <a:ext cx="609600" cy="609600"/>
+          </a:xfrm>
+          <a:prstGeom prst="rect">
+            <a:avLst/>
+          </a:prstGeom>
+          <a:noFill/>
+          <a:extLst>
+            <a:ext uri="{909E8E84-426E-40DD-AFC4-6F175D3DCCD1}">
+              <a14:hiddenFill xmlns:a14="http://schemas.microsoft.com/office/drawing/2010/main">
+                <a:solidFill>
+                  <a:srgbClr val="FFFFFF"/>
+                </a:solidFill>
+              </a14:hiddenFill>
+            </a:ext>
+          </a:extLst>
+        </p:spPr>
+      </p:pic>
+      <p:pic>
+        <p:nvPicPr>
+          <p:cNvPr id="32" name="Picture 6" descr="Resultado de imagem para cross png">
+            <a:extLst>
+              <a:ext uri="{FF2B5EF4-FFF2-40B4-BE49-F238E27FC236}">
+                <a16:creationId xmlns:a16="http://schemas.microsoft.com/office/drawing/2014/main" id="{143D1839-516C-4A65-93A1-7EDF24700412}"/>
+              </a:ext>
+            </a:extLst>
+          </p:cNvPr>
+          <p:cNvPicPr>
+            <a:picLocks noChangeAspect="1" noChangeArrowheads="1"/>
+          </p:cNvPicPr>
+          <p:nvPr/>
+        </p:nvPicPr>
+        <p:blipFill>
+          <a:blip r:embed="rId7">
+            <a:extLst>
+              <a:ext uri="{28A0092B-C50C-407E-A947-70E740481C1C}">
+                <a14:useLocalDpi xmlns:a14="http://schemas.microsoft.com/office/drawing/2010/main" val="0"/>
+              </a:ext>
+            </a:extLst>
+          </a:blip>
+          <a:srcRect/>
+          <a:stretch>
+            <a:fillRect/>
+          </a:stretch>
+        </p:blipFill>
+        <p:spPr bwMode="auto">
+          <a:xfrm>
+            <a:off x="6361512" y="2729411"/>
+            <a:ext cx="609600" cy="609600"/>
+          </a:xfrm>
+          <a:prstGeom prst="rect">
+            <a:avLst/>
+          </a:prstGeom>
+          <a:noFill/>
+          <a:extLst>
+            <a:ext uri="{909E8E84-426E-40DD-AFC4-6F175D3DCCD1}">
+              <a14:hiddenFill xmlns:a14="http://schemas.microsoft.com/office/drawing/2010/main">
+                <a:solidFill>
+                  <a:srgbClr val="FFFFFF"/>
+                </a:solidFill>
+              </a14:hiddenFill>
+            </a:ext>
+          </a:extLst>
+        </p:spPr>
+      </p:pic>
+      <p:pic>
+        <p:nvPicPr>
+          <p:cNvPr id="33" name="Picture 4" descr="Resultado de imagem para check png">
+            <a:extLst>
+              <a:ext uri="{FF2B5EF4-FFF2-40B4-BE49-F238E27FC236}">
+                <a16:creationId xmlns:a16="http://schemas.microsoft.com/office/drawing/2014/main" id="{958F7889-6231-46A7-987D-CA68948A8936}"/>
+              </a:ext>
+            </a:extLst>
+          </p:cNvPr>
+          <p:cNvPicPr>
+            <a:picLocks noChangeAspect="1" noChangeArrowheads="1"/>
+          </p:cNvPicPr>
+          <p:nvPr/>
+        </p:nvPicPr>
+        <p:blipFill>
+          <a:blip r:embed="rId8">
+            <a:extLst>
+              <a:ext uri="{28A0092B-C50C-407E-A947-70E740481C1C}">
+                <a14:useLocalDpi xmlns:a14="http://schemas.microsoft.com/office/drawing/2010/main" val="0"/>
+              </a:ext>
+            </a:extLst>
+          </a:blip>
+          <a:srcRect/>
+          <a:stretch>
+            <a:fillRect/>
+          </a:stretch>
+        </p:blipFill>
+        <p:spPr bwMode="auto">
+          <a:xfrm>
+            <a:off x="6271199" y="1572279"/>
+            <a:ext cx="790225" cy="790225"/>
+          </a:xfrm>
+          <a:prstGeom prst="rect">
+            <a:avLst/>
+          </a:prstGeom>
+          <a:noFill/>
+          <a:extLst>
+            <a:ext uri="{909E8E84-426E-40DD-AFC4-6F175D3DCCD1}">
+              <a14:hiddenFill xmlns:a14="http://schemas.microsoft.com/office/drawing/2010/main">
+                <a:solidFill>
+                  <a:srgbClr val="FFFFFF"/>
+                </a:solidFill>
+              </a14:hiddenFill>
+            </a:ext>
+          </a:extLst>
+        </p:spPr>
+      </p:pic>
+      <p:pic>
+        <p:nvPicPr>
+          <p:cNvPr id="34" name="Picture 4" descr="Resultado de imagem para check png">
+            <a:extLst>
+              <a:ext uri="{FF2B5EF4-FFF2-40B4-BE49-F238E27FC236}">
+                <a16:creationId xmlns:a16="http://schemas.microsoft.com/office/drawing/2014/main" id="{F5581357-547B-4032-93D3-A1EBF56A1A6C}"/>
+              </a:ext>
+            </a:extLst>
+          </p:cNvPr>
+          <p:cNvPicPr>
+            <a:picLocks noChangeAspect="1" noChangeArrowheads="1"/>
+          </p:cNvPicPr>
+          <p:nvPr/>
+        </p:nvPicPr>
+        <p:blipFill>
+          <a:blip r:embed="rId8">
+            <a:extLst>
+              <a:ext uri="{28A0092B-C50C-407E-A947-70E740481C1C}">
+                <a14:useLocalDpi xmlns:a14="http://schemas.microsoft.com/office/drawing/2010/main" val="0"/>
+              </a:ext>
+            </a:extLst>
+          </a:blip>
+          <a:srcRect/>
+          <a:stretch>
+            <a:fillRect/>
+          </a:stretch>
+        </p:blipFill>
+        <p:spPr bwMode="auto">
+          <a:xfrm>
+            <a:off x="6271199" y="3699512"/>
+            <a:ext cx="790225" cy="790225"/>
+          </a:xfrm>
+          <a:prstGeom prst="rect">
+            <a:avLst/>
+          </a:prstGeom>
+          <a:noFill/>
+          <a:extLst>
+            <a:ext uri="{909E8E84-426E-40DD-AFC4-6F175D3DCCD1}">
+              <a14:hiddenFill xmlns:a14="http://schemas.microsoft.com/office/drawing/2010/main">
+                <a:solidFill>
+                  <a:srgbClr val="FFFFFF"/>
+                </a:solidFill>
+              </a14:hiddenFill>
+            </a:ext>
+          </a:extLst>
+        </p:spPr>
+      </p:pic>
+      <p:pic>
+        <p:nvPicPr>
+          <p:cNvPr id="35" name="Picture 4" descr="Resultado de imagem para check png">
+            <a:extLst>
+              <a:ext uri="{FF2B5EF4-FFF2-40B4-BE49-F238E27FC236}">
+                <a16:creationId xmlns:a16="http://schemas.microsoft.com/office/drawing/2014/main" id="{F8DFFDE3-0D65-49F5-992E-9A40CFAE9334}"/>
+              </a:ext>
+            </a:extLst>
+          </p:cNvPr>
+          <p:cNvPicPr>
+            <a:picLocks noChangeAspect="1" noChangeArrowheads="1"/>
+          </p:cNvPicPr>
+          <p:nvPr/>
+        </p:nvPicPr>
+        <p:blipFill>
+          <a:blip r:embed="rId8">
+            <a:extLst>
+              <a:ext uri="{28A0092B-C50C-407E-A947-70E740481C1C}">
+                <a14:useLocalDpi xmlns:a14="http://schemas.microsoft.com/office/drawing/2010/main" val="0"/>
+              </a:ext>
+            </a:extLst>
+          </a:blip>
+          <a:srcRect/>
+          <a:stretch>
+            <a:fillRect/>
+          </a:stretch>
+        </p:blipFill>
+        <p:spPr bwMode="auto">
+          <a:xfrm>
+            <a:off x="6271198" y="5930000"/>
+            <a:ext cx="790225" cy="790225"/>
+          </a:xfrm>
+          <a:prstGeom prst="rect">
+            <a:avLst/>
+          </a:prstGeom>
+          <a:noFill/>
+          <a:extLst>
+            <a:ext uri="{909E8E84-426E-40DD-AFC4-6F175D3DCCD1}">
+              <a14:hiddenFill xmlns:a14="http://schemas.microsoft.com/office/drawing/2010/main">
+                <a:solidFill>
+                  <a:srgbClr val="FFFFFF"/>
+                </a:solidFill>
+              </a14:hiddenFill>
+            </a:ext>
+          </a:extLst>
+        </p:spPr>
+      </p:pic>
+      <p:pic>
+        <p:nvPicPr>
+          <p:cNvPr id="36" name="Picture 4" descr="Resultado de imagem para check png">
+            <a:extLst>
+              <a:ext uri="{FF2B5EF4-FFF2-40B4-BE49-F238E27FC236}">
+                <a16:creationId xmlns:a16="http://schemas.microsoft.com/office/drawing/2014/main" id="{EA829DC7-3A77-4076-93D9-2AA71E67A0E3}"/>
+              </a:ext>
+            </a:extLst>
+          </p:cNvPr>
+          <p:cNvPicPr>
+            <a:picLocks noChangeAspect="1" noChangeArrowheads="1"/>
+          </p:cNvPicPr>
+          <p:nvPr/>
+        </p:nvPicPr>
+        <p:blipFill>
+          <a:blip r:embed="rId8">
+            <a:extLst>
+              <a:ext uri="{28A0092B-C50C-407E-A947-70E740481C1C}">
+                <a14:useLocalDpi xmlns:a14="http://schemas.microsoft.com/office/drawing/2010/main" val="0"/>
+              </a:ext>
+            </a:extLst>
+          </a:blip>
+          <a:srcRect/>
+          <a:stretch>
+            <a:fillRect/>
+          </a:stretch>
+        </p:blipFill>
+        <p:spPr bwMode="auto">
+          <a:xfrm>
+            <a:off x="7769232" y="1572279"/>
+            <a:ext cx="790225" cy="790225"/>
+          </a:xfrm>
+          <a:prstGeom prst="rect">
+            <a:avLst/>
+          </a:prstGeom>
+          <a:noFill/>
+          <a:extLst>
+            <a:ext uri="{909E8E84-426E-40DD-AFC4-6F175D3DCCD1}">
+              <a14:hiddenFill xmlns:a14="http://schemas.microsoft.com/office/drawing/2010/main">
+                <a:solidFill>
+                  <a:srgbClr val="FFFFFF"/>
+                </a:solidFill>
+              </a14:hiddenFill>
+            </a:ext>
+          </a:extLst>
+        </p:spPr>
+      </p:pic>
+      <p:pic>
+        <p:nvPicPr>
+          <p:cNvPr id="37" name="Picture 4" descr="Resultado de imagem para check png">
+            <a:extLst>
+              <a:ext uri="{FF2B5EF4-FFF2-40B4-BE49-F238E27FC236}">
+                <a16:creationId xmlns:a16="http://schemas.microsoft.com/office/drawing/2014/main" id="{F3769A65-0802-4B56-BAF5-60284EFBD1FD}"/>
+              </a:ext>
+            </a:extLst>
+          </p:cNvPr>
+          <p:cNvPicPr>
+            <a:picLocks noChangeAspect="1" noChangeArrowheads="1"/>
+          </p:cNvPicPr>
+          <p:nvPr/>
+        </p:nvPicPr>
+        <p:blipFill>
+          <a:blip r:embed="rId8">
+            <a:extLst>
+              <a:ext uri="{28A0092B-C50C-407E-A947-70E740481C1C}">
+                <a14:useLocalDpi xmlns:a14="http://schemas.microsoft.com/office/drawing/2010/main" val="0"/>
+              </a:ext>
+            </a:extLst>
+          </a:blip>
+          <a:srcRect/>
+          <a:stretch>
+            <a:fillRect/>
+          </a:stretch>
+        </p:blipFill>
+        <p:spPr bwMode="auto">
+          <a:xfrm>
+            <a:off x="7769232" y="2639098"/>
+            <a:ext cx="790225" cy="790225"/>
+          </a:xfrm>
+          <a:prstGeom prst="rect">
+            <a:avLst/>
+          </a:prstGeom>
+          <a:noFill/>
+          <a:extLst>
+            <a:ext uri="{909E8E84-426E-40DD-AFC4-6F175D3DCCD1}">
+              <a14:hiddenFill xmlns:a14="http://schemas.microsoft.com/office/drawing/2010/main">
+                <a:solidFill>
+                  <a:srgbClr val="FFFFFF"/>
+                </a:solidFill>
+              </a14:hiddenFill>
+            </a:ext>
+          </a:extLst>
+        </p:spPr>
+      </p:pic>
+      <p:pic>
+        <p:nvPicPr>
+          <p:cNvPr id="38" name="Picture 4" descr="Resultado de imagem para check png">
+            <a:extLst>
+              <a:ext uri="{FF2B5EF4-FFF2-40B4-BE49-F238E27FC236}">
+                <a16:creationId xmlns:a16="http://schemas.microsoft.com/office/drawing/2014/main" id="{A8EF135E-2762-4F76-A5B7-7C3C75819E4B}"/>
+              </a:ext>
+            </a:extLst>
+          </p:cNvPr>
+          <p:cNvPicPr>
+            <a:picLocks noChangeAspect="1" noChangeArrowheads="1"/>
+          </p:cNvPicPr>
+          <p:nvPr/>
+        </p:nvPicPr>
+        <p:blipFill>
+          <a:blip r:embed="rId8">
+            <a:extLst>
+              <a:ext uri="{28A0092B-C50C-407E-A947-70E740481C1C}">
+                <a14:useLocalDpi xmlns:a14="http://schemas.microsoft.com/office/drawing/2010/main" val="0"/>
+              </a:ext>
+            </a:extLst>
+          </a:blip>
+          <a:srcRect/>
+          <a:stretch>
+            <a:fillRect/>
+          </a:stretch>
+        </p:blipFill>
+        <p:spPr bwMode="auto">
+          <a:xfrm>
+            <a:off x="7769232" y="3699511"/>
+            <a:ext cx="790225" cy="790225"/>
+          </a:xfrm>
+          <a:prstGeom prst="rect">
+            <a:avLst/>
+          </a:prstGeom>
+          <a:noFill/>
+          <a:extLst>
+            <a:ext uri="{909E8E84-426E-40DD-AFC4-6F175D3DCCD1}">
+              <a14:hiddenFill xmlns:a14="http://schemas.microsoft.com/office/drawing/2010/main">
+                <a:solidFill>
+                  <a:srgbClr val="FFFFFF"/>
+                </a:solidFill>
+              </a14:hiddenFill>
+            </a:ext>
+          </a:extLst>
+        </p:spPr>
+      </p:pic>
+      <p:pic>
+        <p:nvPicPr>
+          <p:cNvPr id="39" name="Picture 4" descr="Resultado de imagem para check png">
+            <a:extLst>
+              <a:ext uri="{FF2B5EF4-FFF2-40B4-BE49-F238E27FC236}">
+                <a16:creationId xmlns:a16="http://schemas.microsoft.com/office/drawing/2014/main" id="{823814B1-2A2C-4FB9-95D0-A3E52304AAD7}"/>
+              </a:ext>
+            </a:extLst>
+          </p:cNvPr>
+          <p:cNvPicPr>
+            <a:picLocks noChangeAspect="1" noChangeArrowheads="1"/>
+          </p:cNvPicPr>
+          <p:nvPr/>
+        </p:nvPicPr>
+        <p:blipFill>
+          <a:blip r:embed="rId8">
+            <a:extLst>
+              <a:ext uri="{28A0092B-C50C-407E-A947-70E740481C1C}">
+                <a14:useLocalDpi xmlns:a14="http://schemas.microsoft.com/office/drawing/2010/main" val="0"/>
+              </a:ext>
+            </a:extLst>
+          </a:blip>
+          <a:srcRect/>
+          <a:stretch>
+            <a:fillRect/>
+          </a:stretch>
+        </p:blipFill>
+        <p:spPr bwMode="auto">
+          <a:xfrm>
+            <a:off x="7754698" y="4818516"/>
+            <a:ext cx="790225" cy="790225"/>
+          </a:xfrm>
+          <a:prstGeom prst="rect">
+            <a:avLst/>
+          </a:prstGeom>
+          <a:noFill/>
+          <a:extLst>
+            <a:ext uri="{909E8E84-426E-40DD-AFC4-6F175D3DCCD1}">
+              <a14:hiddenFill xmlns:a14="http://schemas.microsoft.com/office/drawing/2010/main">
+                <a:solidFill>
+                  <a:srgbClr val="FFFFFF"/>
+                </a:solidFill>
+              </a14:hiddenFill>
+            </a:ext>
+          </a:extLst>
+        </p:spPr>
+      </p:pic>
+      <p:pic>
+        <p:nvPicPr>
+          <p:cNvPr id="40" name="Picture 6" descr="Resultado de imagem para cross png">
+            <a:extLst>
+              <a:ext uri="{FF2B5EF4-FFF2-40B4-BE49-F238E27FC236}">
+                <a16:creationId xmlns:a16="http://schemas.microsoft.com/office/drawing/2014/main" id="{EEA8880F-912B-4996-99AC-4131B6854459}"/>
+              </a:ext>
+            </a:extLst>
+          </p:cNvPr>
+          <p:cNvPicPr>
+            <a:picLocks noChangeAspect="1" noChangeArrowheads="1"/>
+          </p:cNvPicPr>
+          <p:nvPr/>
+        </p:nvPicPr>
+        <p:blipFill>
+          <a:blip r:embed="rId7">
+            <a:extLst>
+              <a:ext uri="{28A0092B-C50C-407E-A947-70E740481C1C}">
+                <a14:useLocalDpi xmlns:a14="http://schemas.microsoft.com/office/drawing/2010/main" val="0"/>
+              </a:ext>
+            </a:extLst>
+          </a:blip>
+          <a:srcRect/>
+          <a:stretch>
+            <a:fillRect/>
+          </a:stretch>
+        </p:blipFill>
+        <p:spPr bwMode="auto">
+          <a:xfrm>
+            <a:off x="7845010" y="6026506"/>
+            <a:ext cx="609600" cy="609600"/>
+          </a:xfrm>
+          <a:prstGeom prst="rect">
+            <a:avLst/>
+          </a:prstGeom>
+          <a:noFill/>
+          <a:extLst>
+            <a:ext uri="{909E8E84-426E-40DD-AFC4-6F175D3DCCD1}">
+              <a14:hiddenFill xmlns:a14="http://schemas.microsoft.com/office/drawing/2010/main">
+                <a:solidFill>
+                  <a:srgbClr val="FFFFFF"/>
+                </a:solidFill>
+              </a14:hiddenFill>
+            </a:ext>
+          </a:extLst>
+        </p:spPr>
+      </p:pic>
+      <p:pic>
+        <p:nvPicPr>
+          <p:cNvPr id="42" name="Picture 6" descr="Resultado de imagem para cross png">
+            <a:extLst>
+              <a:ext uri="{FF2B5EF4-FFF2-40B4-BE49-F238E27FC236}">
+                <a16:creationId xmlns:a16="http://schemas.microsoft.com/office/drawing/2014/main" id="{8343F6BF-E526-4D54-A45D-72A36CF66F89}"/>
+              </a:ext>
+            </a:extLst>
+          </p:cNvPr>
+          <p:cNvPicPr>
+            <a:picLocks noChangeAspect="1" noChangeArrowheads="1"/>
+          </p:cNvPicPr>
+          <p:nvPr/>
+        </p:nvPicPr>
+        <p:blipFill>
+          <a:blip r:embed="rId7">
+            <a:extLst>
+              <a:ext uri="{28A0092B-C50C-407E-A947-70E740481C1C}">
+                <a14:useLocalDpi xmlns:a14="http://schemas.microsoft.com/office/drawing/2010/main" val="0"/>
+              </a:ext>
+            </a:extLst>
+          </a:blip>
+          <a:srcRect/>
+          <a:stretch>
+            <a:fillRect/>
+          </a:stretch>
+        </p:blipFill>
+        <p:spPr bwMode="auto">
+          <a:xfrm>
+            <a:off x="2369167" y="6030703"/>
+            <a:ext cx="609600" cy="609600"/>
+          </a:xfrm>
+          <a:prstGeom prst="rect">
+            <a:avLst/>
+          </a:prstGeom>
+          <a:noFill/>
+          <a:extLst>
+            <a:ext uri="{909E8E84-426E-40DD-AFC4-6F175D3DCCD1}">
+              <a14:hiddenFill xmlns:a14="http://schemas.microsoft.com/office/drawing/2010/main">
+                <a:solidFill>
+                  <a:srgbClr val="FFFFFF"/>
+                </a:solidFill>
+              </a14:hiddenFill>
+            </a:ext>
+          </a:extLst>
+        </p:spPr>
+      </p:pic>
+      <p:pic>
+        <p:nvPicPr>
+          <p:cNvPr id="43" name="Picture 6" descr="Resultado de imagem para cross png">
+            <a:extLst>
+              <a:ext uri="{FF2B5EF4-FFF2-40B4-BE49-F238E27FC236}">
+                <a16:creationId xmlns:a16="http://schemas.microsoft.com/office/drawing/2014/main" id="{A9A1749F-552A-4E5B-8C42-C3E90348ED63}"/>
+              </a:ext>
+            </a:extLst>
+          </p:cNvPr>
+          <p:cNvPicPr>
+            <a:picLocks noChangeAspect="1" noChangeArrowheads="1"/>
+          </p:cNvPicPr>
+          <p:nvPr/>
+        </p:nvPicPr>
+        <p:blipFill>
+          <a:blip r:embed="rId7">
+            <a:extLst>
+              <a:ext uri="{28A0092B-C50C-407E-A947-70E740481C1C}">
+                <a14:useLocalDpi xmlns:a14="http://schemas.microsoft.com/office/drawing/2010/main" val="0"/>
+              </a:ext>
+            </a:extLst>
+          </a:blip>
+          <a:srcRect/>
+          <a:stretch>
+            <a:fillRect/>
+          </a:stretch>
+        </p:blipFill>
+        <p:spPr bwMode="auto">
+          <a:xfrm>
+            <a:off x="2369167" y="3789823"/>
+            <a:ext cx="609600" cy="609600"/>
+          </a:xfrm>
+          <a:prstGeom prst="rect">
+            <a:avLst/>
+          </a:prstGeom>
+          <a:noFill/>
+          <a:extLst>
+            <a:ext uri="{909E8E84-426E-40DD-AFC4-6F175D3DCCD1}">
+              <a14:hiddenFill xmlns:a14="http://schemas.microsoft.com/office/drawing/2010/main">
+                <a:solidFill>
+                  <a:srgbClr val="FFFFFF"/>
+                </a:solidFill>
+              </a14:hiddenFill>
+            </a:ext>
+          </a:extLst>
+        </p:spPr>
+      </p:pic>
+      <p:pic>
+        <p:nvPicPr>
+          <p:cNvPr id="44" name="Picture 6" descr="Resultado de imagem para cross png">
+            <a:extLst>
+              <a:ext uri="{FF2B5EF4-FFF2-40B4-BE49-F238E27FC236}">
+                <a16:creationId xmlns:a16="http://schemas.microsoft.com/office/drawing/2014/main" id="{3E43029C-484F-402E-8FE1-EFD02E482F62}"/>
+              </a:ext>
+            </a:extLst>
+          </p:cNvPr>
+          <p:cNvPicPr>
+            <a:picLocks noChangeAspect="1" noChangeArrowheads="1"/>
+          </p:cNvPicPr>
+          <p:nvPr/>
+        </p:nvPicPr>
+        <p:blipFill>
+          <a:blip r:embed="rId7">
+            <a:extLst>
+              <a:ext uri="{28A0092B-C50C-407E-A947-70E740481C1C}">
+                <a14:useLocalDpi xmlns:a14="http://schemas.microsoft.com/office/drawing/2010/main" val="0"/>
+              </a:ext>
+            </a:extLst>
+          </a:blip>
+          <a:srcRect/>
+          <a:stretch>
+            <a:fillRect/>
+          </a:stretch>
+        </p:blipFill>
+        <p:spPr bwMode="auto">
+          <a:xfrm>
+            <a:off x="2369167" y="2729411"/>
+            <a:ext cx="609600" cy="609600"/>
+          </a:xfrm>
+          <a:prstGeom prst="rect">
+            <a:avLst/>
+          </a:prstGeom>
+          <a:noFill/>
+          <a:extLst>
+            <a:ext uri="{909E8E84-426E-40DD-AFC4-6F175D3DCCD1}">
+              <a14:hiddenFill xmlns:a14="http://schemas.microsoft.com/office/drawing/2010/main">
+                <a:solidFill>
+                  <a:srgbClr val="FFFFFF"/>
+                </a:solidFill>
+              </a14:hiddenFill>
+            </a:ext>
+          </a:extLst>
+        </p:spPr>
+      </p:pic>
+      <p:pic>
+        <p:nvPicPr>
+          <p:cNvPr id="45" name="Picture 6" descr="Resultado de imagem para cross png">
+            <a:extLst>
+              <a:ext uri="{FF2B5EF4-FFF2-40B4-BE49-F238E27FC236}">
+                <a16:creationId xmlns:a16="http://schemas.microsoft.com/office/drawing/2014/main" id="{6774A060-97F0-4ADA-AA9D-F6DEF73DC087}"/>
+              </a:ext>
+            </a:extLst>
+          </p:cNvPr>
+          <p:cNvPicPr>
+            <a:picLocks noChangeAspect="1" noChangeArrowheads="1"/>
+          </p:cNvPicPr>
+          <p:nvPr/>
+        </p:nvPicPr>
+        <p:blipFill>
+          <a:blip r:embed="rId7">
+            <a:extLst>
+              <a:ext uri="{28A0092B-C50C-407E-A947-70E740481C1C}">
+                <a14:useLocalDpi xmlns:a14="http://schemas.microsoft.com/office/drawing/2010/main" val="0"/>
+              </a:ext>
+            </a:extLst>
+          </a:blip>
+          <a:srcRect/>
+          <a:stretch>
+            <a:fillRect/>
+          </a:stretch>
+        </p:blipFill>
+        <p:spPr bwMode="auto">
+          <a:xfrm>
+            <a:off x="2369167" y="1665090"/>
+            <a:ext cx="609600" cy="609600"/>
+          </a:xfrm>
+          <a:prstGeom prst="rect">
+            <a:avLst/>
+          </a:prstGeom>
+          <a:noFill/>
+          <a:extLst>
+            <a:ext uri="{909E8E84-426E-40DD-AFC4-6F175D3DCCD1}">
+              <a14:hiddenFill xmlns:a14="http://schemas.microsoft.com/office/drawing/2010/main">
+                <a:solidFill>
+                  <a:srgbClr val="FFFFFF"/>
+                </a:solidFill>
+              </a14:hiddenFill>
+            </a:ext>
+          </a:extLst>
         </p:spPr>
       </p:pic>
     </p:spTree>
@@ -7893,31 +9175,6 @@
       </p:sp>
       <p:sp>
         <p:nvSpPr>
-          <p:cNvPr id="3" name="Marcador de Posição de Conteúdo 2">
-            <a:extLst>
-              <a:ext uri="{FF2B5EF4-FFF2-40B4-BE49-F238E27FC236}">
-                <a16:creationId xmlns:a16="http://schemas.microsoft.com/office/drawing/2014/main" id="{6BC681CD-079F-4740-8A64-56A58898D573}"/>
-              </a:ext>
-            </a:extLst>
-          </p:cNvPr>
-          <p:cNvSpPr>
-            <a:spLocks noGrp="1"/>
-          </p:cNvSpPr>
-          <p:nvPr>
-            <p:ph idx="1"/>
-          </p:nvPr>
-        </p:nvSpPr>
-        <p:spPr/>
-        <p:txBody>
-          <a:bodyPr/>
-          <a:lstStyle/>
-          <a:p>
-            <a:endParaRPr lang="pt-PT"/>
-          </a:p>
-        </p:txBody>
-      </p:sp>
-      <p:sp>
-        <p:nvSpPr>
           <p:cNvPr id="4" name="Marcador de Posição do Número do Diapositivo 3">
             <a:extLst>
               <a:ext uri="{FF2B5EF4-FFF2-40B4-BE49-F238E27FC236}">
@@ -7946,6 +9203,70 @@
           </a:p>
         </p:txBody>
       </p:sp>
+      <p:pic>
+        <p:nvPicPr>
+          <p:cNvPr id="2052" name="Picture 4" descr="Imagem relacionada">
+            <a:extLst>
+              <a:ext uri="{FF2B5EF4-FFF2-40B4-BE49-F238E27FC236}">
+                <a16:creationId xmlns:a16="http://schemas.microsoft.com/office/drawing/2014/main" id="{888A3217-531A-4E48-9636-611C6781C2CF}"/>
+              </a:ext>
+            </a:extLst>
+          </p:cNvPr>
+          <p:cNvPicPr>
+            <a:picLocks noChangeAspect="1" noChangeArrowheads="1"/>
+          </p:cNvPicPr>
+          <p:nvPr/>
+        </p:nvPicPr>
+        <p:blipFill>
+          <a:blip r:embed="rId2">
+            <a:extLst>
+              <a:ext uri="{28A0092B-C50C-407E-A947-70E740481C1C}">
+                <a14:useLocalDpi xmlns:a14="http://schemas.microsoft.com/office/drawing/2010/main" val="0"/>
+              </a:ext>
+            </a:extLst>
+          </a:blip>
+          <a:srcRect/>
+          <a:stretch>
+            <a:fillRect/>
+          </a:stretch>
+        </p:blipFill>
+        <p:spPr bwMode="auto">
+          <a:xfrm>
+            <a:off x="1402459" y="1420950"/>
+            <a:ext cx="6703315" cy="4339698"/>
+          </a:xfrm>
+          <a:prstGeom prst="roundRect">
+            <a:avLst>
+              <a:gd name="adj" fmla="val 4167"/>
+            </a:avLst>
+          </a:prstGeom>
+          <a:solidFill>
+            <a:srgbClr val="FFFFFF"/>
+          </a:solidFill>
+          <a:ln w="76200" cap="sq">
+            <a:solidFill>
+              <a:srgbClr val="292929"/>
+            </a:solidFill>
+            <a:miter lim="800000"/>
+          </a:ln>
+          <a:effectLst>
+            <a:reflection blurRad="12700" stA="28000" endPos="28000" dist="5000" dir="5400000" sy="-100000" algn="bl" rotWithShape="0"/>
+          </a:effectLst>
+          <a:scene3d>
+            <a:camera prst="orthographicFront"/>
+            <a:lightRig rig="threePt" dir="t">
+              <a:rot lat="0" lon="0" rev="2700000"/>
+            </a:lightRig>
+          </a:scene3d>
+          <a:sp3d>
+            <a:bevelT h="38100"/>
+            <a:contourClr>
+              <a:srgbClr val="C0C0C0"/>
+            </a:contourClr>
+          </a:sp3d>
+          <a:extLst/>
+        </p:spPr>
+      </p:pic>
     </p:spTree>
     <p:extLst>
       <p:ext uri="{BB962C8B-B14F-4D97-AF65-F5344CB8AC3E}">

</xml_diff>

<commit_message>
Análise de Requisitos (Atores e respetivos casos de uso e Diagrama de Casos de uso)
</commit_message>
<xml_diff>
--- a/Documentos/Apresentacao Intermedia- Projeto - LabSecurity.pptx
+++ b/Documentos/Apresentacao Intermedia- Projeto - LabSecurity.pptx
@@ -205,7 +205,7 @@
           <a:p>
             <a:fld id="{49C4E3B3-E8BB-4A8E-821D-3CF4DD5602DB}" type="datetimeFigureOut">
               <a:rPr lang="pt-PT" smtClean="0"/>
-              <a:t>20/06/2018</a:t>
+              <a:t>21/06/2018</a:t>
             </a:fld>
             <a:endParaRPr lang="pt-PT"/>
           </a:p>
@@ -988,7 +988,7 @@
           <a:p>
             <a:fld id="{F2AEA71E-5E66-40E0-9F8C-68663391016D}" type="datetime1">
               <a:rPr lang="en-US" smtClean="0"/>
-              <a:t>20-Jun-18</a:t>
+              <a:t>21-Jun-18</a:t>
             </a:fld>
             <a:endParaRPr lang="en-US" dirty="0"/>
           </a:p>
@@ -1090,7 +1090,7 @@
           </a:ln>
           <a:extLst>
             <a:ext uri="{91240B29-F687-4f45-9708-019B960494DF}">
-              <a14:hiddenLine xmlns:a14="http://schemas.microsoft.com/office/drawing/2010/main" xmlns="" w="9525">
+              <a14:hiddenLine xmlns="" xmlns:a14="http://schemas.microsoft.com/office/drawing/2010/main" w="9525">
                 <a:solidFill>
                   <a:srgbClr val="000000"/>
                 </a:solidFill>
@@ -1145,7 +1145,7 @@
           </a:ln>
           <a:extLst>
             <a:ext uri="{91240B29-F687-4f45-9708-019B960494DF}">
-              <a14:hiddenLine xmlns:a14="http://schemas.microsoft.com/office/drawing/2010/main" xmlns="" w="9525">
+              <a14:hiddenLine xmlns="" xmlns:a14="http://schemas.microsoft.com/office/drawing/2010/main" w="9525">
                 <a:solidFill>
                   <a:srgbClr val="000000"/>
                 </a:solidFill>
@@ -1400,7 +1400,7 @@
           <a:p>
             <a:fld id="{987CA4A7-55E7-4E87-AB13-4B00EC0A8DB0}" type="datetime1">
               <a:rPr lang="en-US" smtClean="0"/>
-              <a:t>20-Jun-18</a:t>
+              <a:t>21-Jun-18</a:t>
             </a:fld>
             <a:endParaRPr lang="en-US" dirty="0"/>
           </a:p>
@@ -1649,7 +1649,7 @@
           <a:p>
             <a:fld id="{FBD37299-E919-4A70-AA78-4DC967196E65}" type="datetime1">
               <a:rPr lang="en-US" smtClean="0"/>
-              <a:t>20-Jun-18</a:t>
+              <a:t>21-Jun-18</a:t>
             </a:fld>
             <a:endParaRPr lang="en-US" dirty="0"/>
           </a:p>
@@ -2190,7 +2190,7 @@
           <a:p>
             <a:fld id="{8F689CA6-45BC-4C49-885E-994F7B4CC6D3}" type="datetime1">
               <a:rPr lang="en-US" smtClean="0"/>
-              <a:t>20-Jun-18</a:t>
+              <a:t>21-Jun-18</a:t>
             </a:fld>
             <a:endParaRPr lang="en-US" dirty="0"/>
           </a:p>
@@ -2439,7 +2439,7 @@
           <a:p>
             <a:fld id="{7B5B7D79-60FF-46B6-9746-F9075481C36A}" type="datetime1">
               <a:rPr lang="en-US" smtClean="0"/>
-              <a:t>20-Jun-18</a:t>
+              <a:t>21-Jun-18</a:t>
             </a:fld>
             <a:endParaRPr lang="en-US" dirty="0"/>
           </a:p>
@@ -2972,7 +2972,7 @@
           <a:p>
             <a:fld id="{66A2D770-8723-4808-9A81-5A77127D5EF8}" type="datetime1">
               <a:rPr lang="en-US" smtClean="0"/>
-              <a:t>20-Jun-18</a:t>
+              <a:t>21-Jun-18</a:t>
             </a:fld>
             <a:endParaRPr lang="en-US" dirty="0"/>
           </a:p>
@@ -3270,7 +3270,7 @@
           <a:p>
             <a:fld id="{CEDFF1B1-5EF2-440F-8804-7680700AA6E7}" type="datetime1">
               <a:rPr lang="en-US" smtClean="0"/>
-              <a:t>20-Jun-18</a:t>
+              <a:t>21-Jun-18</a:t>
             </a:fld>
             <a:endParaRPr lang="en-US" dirty="0"/>
           </a:p>
@@ -3445,7 +3445,7 @@
           <a:p>
             <a:fld id="{C799142C-90F1-4C01-B1F4-01D45DC10164}" type="datetime1">
               <a:rPr lang="en-US" smtClean="0"/>
-              <a:t>20-Jun-18</a:t>
+              <a:t>21-Jun-18</a:t>
             </a:fld>
             <a:endParaRPr lang="en-US" dirty="0"/>
           </a:p>
@@ -3626,7 +3626,7 @@
           <a:p>
             <a:fld id="{7A64C461-EA35-4528-9ECD-98782B286F97}" type="datetime1">
               <a:rPr lang="en-US" smtClean="0"/>
-              <a:t>20-Jun-18</a:t>
+              <a:t>21-Jun-18</a:t>
             </a:fld>
             <a:endParaRPr lang="en-US" dirty="0"/>
           </a:p>
@@ -3812,7 +3812,7 @@
           <a:p>
             <a:fld id="{7F132594-395A-4D3F-B1D6-ECDD18416CB7}" type="datetime1">
               <a:rPr lang="en-US" smtClean="0"/>
-              <a:t>20-Jun-18</a:t>
+              <a:t>21-Jun-18</a:t>
             </a:fld>
             <a:endParaRPr lang="en-US" dirty="0"/>
           </a:p>
@@ -4069,7 +4069,7 @@
           <a:p>
             <a:fld id="{5694667B-EBFE-43B4-93E9-FC4DE0B52405}" type="datetime1">
               <a:rPr lang="en-US" smtClean="0"/>
-              <a:t>20-Jun-18</a:t>
+              <a:t>21-Jun-18</a:t>
             </a:fld>
             <a:endParaRPr lang="en-US" dirty="0"/>
           </a:p>
@@ -4372,7 +4372,7 @@
           <a:p>
             <a:fld id="{4B72E740-F732-4BA0-BF90-6D63E1C57081}" type="datetime1">
               <a:rPr lang="en-US" smtClean="0"/>
-              <a:t>20-Jun-18</a:t>
+              <a:t>21-Jun-18</a:t>
             </a:fld>
             <a:endParaRPr lang="en-US" dirty="0"/>
           </a:p>
@@ -4815,7 +4815,7 @@
           <a:p>
             <a:fld id="{19514532-B5F6-441F-B0DF-5F0D6F5FB33A}" type="datetime1">
               <a:rPr lang="en-US" smtClean="0"/>
-              <a:t>20-Jun-18</a:t>
+              <a:t>21-Jun-18</a:t>
             </a:fld>
             <a:endParaRPr lang="en-US" dirty="0"/>
           </a:p>
@@ -4934,7 +4934,7 @@
           <a:p>
             <a:fld id="{4BF255F0-0830-4628-B199-4F57013DA031}" type="datetime1">
               <a:rPr lang="en-US" smtClean="0"/>
-              <a:t>20-Jun-18</a:t>
+              <a:t>21-Jun-18</a:t>
             </a:fld>
             <a:endParaRPr lang="en-US" dirty="0"/>
           </a:p>
@@ -5030,7 +5030,7 @@
           <a:p>
             <a:fld id="{94D4EE79-B7E8-4678-A131-486DDED8E184}" type="datetime1">
               <a:rPr lang="en-US" smtClean="0"/>
-              <a:t>20-Jun-18</a:t>
+              <a:t>21-Jun-18</a:t>
             </a:fld>
             <a:endParaRPr lang="en-US" dirty="0"/>
           </a:p>
@@ -5314,7 +5314,7 @@
           <a:p>
             <a:fld id="{F7B3843B-9B7D-42D0-A66D-81C4A65EDFA7}" type="datetime1">
               <a:rPr lang="en-US" smtClean="0"/>
-              <a:t>20-Jun-18</a:t>
+              <a:t>21-Jun-18</a:t>
             </a:fld>
             <a:endParaRPr lang="en-US" dirty="0"/>
           </a:p>
@@ -5606,7 +5606,7 @@
           <a:p>
             <a:fld id="{48DA69CF-28D2-40DD-949C-5DEBC5516499}" type="datetime1">
               <a:rPr lang="en-US" smtClean="0"/>
-              <a:t>20-Jun-18</a:t>
+              <a:t>21-Jun-18</a:t>
             </a:fld>
             <a:endParaRPr lang="en-US" dirty="0"/>
           </a:p>
@@ -6131,7 +6131,7 @@
           <a:p>
             <a:fld id="{C48EB757-431F-4220-8D43-3157C9D0E054}" type="datetime1">
               <a:rPr lang="en-US" smtClean="0"/>
-              <a:t>20-Jun-18</a:t>
+              <a:t>21-Jun-18</a:t>
             </a:fld>
             <a:endParaRPr lang="en-US" dirty="0"/>
           </a:p>
@@ -7740,7 +7740,7 @@
         </p:nvSpPr>
         <p:spPr>
           <a:xfrm>
-            <a:off x="2249867" y="1132342"/>
+            <a:off x="2978737" y="1132342"/>
             <a:ext cx="859531" cy="338554"/>
           </a:xfrm>
           <a:prstGeom prst="rect">
@@ -7777,7 +7777,7 @@
         </p:nvSpPr>
         <p:spPr>
           <a:xfrm>
-            <a:off x="3622252" y="1009234"/>
+            <a:off x="4324618" y="1009234"/>
             <a:ext cx="1035860" cy="584775"/>
           </a:xfrm>
           <a:prstGeom prst="rect">
@@ -7820,7 +7820,7 @@
         </p:nvSpPr>
         <p:spPr>
           <a:xfrm>
-            <a:off x="4753449" y="1009234"/>
+            <a:off x="5455815" y="1009234"/>
             <a:ext cx="1242648" cy="584775"/>
           </a:xfrm>
           <a:prstGeom prst="rect">
@@ -7863,7 +7863,7 @@
         </p:nvSpPr>
         <p:spPr>
           <a:xfrm>
-            <a:off x="6076247" y="1009233"/>
+            <a:off x="6778613" y="1009233"/>
             <a:ext cx="1180131" cy="584775"/>
           </a:xfrm>
           <a:prstGeom prst="rect">
@@ -7888,49 +7888,6 @@
             <a:r>
               <a:rPr lang="pt-PT" sz="1600" dirty="0"/>
               <a:t>Automática</a:t>
-            </a:r>
-          </a:p>
-        </p:txBody>
-      </p:sp>
-      <p:sp>
-        <p:nvSpPr>
-          <p:cNvPr id="14" name="CaixaDeTexto 13">
-            <a:extLst>
-              <a:ext uri="{FF2B5EF4-FFF2-40B4-BE49-F238E27FC236}">
-                <a16:creationId xmlns:a16="http://schemas.microsoft.com/office/drawing/2014/main" id="{424B1A7F-9F87-49BF-B804-99517874365F}"/>
-              </a:ext>
-            </a:extLst>
-          </p:cNvPr>
-          <p:cNvSpPr txBox="1"/>
-          <p:nvPr/>
-        </p:nvSpPr>
-        <p:spPr>
-          <a:xfrm>
-            <a:off x="7581386" y="1009232"/>
-            <a:ext cx="1136850" cy="584775"/>
-          </a:xfrm>
-          <a:prstGeom prst="rect">
-            <a:avLst/>
-          </a:prstGeom>
-          <a:noFill/>
-        </p:spPr>
-        <p:txBody>
-          <a:bodyPr wrap="none" rtlCol="0">
-            <a:spAutoFit/>
-          </a:bodyPr>
-          <a:lstStyle/>
-          <a:p>
-            <a:pPr algn="ctr"/>
-            <a:r>
-              <a:rPr lang="pt-PT" sz="1600" dirty="0"/>
-              <a:t>Plataforma</a:t>
-            </a:r>
-          </a:p>
-          <a:p>
-            <a:pPr algn="ctr"/>
-            <a:r>
-              <a:rPr lang="pt-PT" sz="1600" dirty="0"/>
-              <a:t>Online</a:t>
             </a:r>
           </a:p>
         </p:txBody>
@@ -7964,7 +7921,7 @@
         </p:blipFill>
         <p:spPr bwMode="auto">
           <a:xfrm>
-            <a:off x="3835382" y="1666855"/>
+            <a:off x="4564252" y="1666855"/>
             <a:ext cx="609600" cy="609600"/>
           </a:xfrm>
           <a:prstGeom prst="rect">
@@ -8011,7 +7968,7 @@
         </p:blipFill>
         <p:spPr bwMode="auto">
           <a:xfrm>
-            <a:off x="2369167" y="4999141"/>
+            <a:off x="3098037" y="4999141"/>
             <a:ext cx="609600" cy="609600"/>
           </a:xfrm>
           <a:prstGeom prst="rect">
@@ -8058,7 +8015,7 @@
         </p:blipFill>
         <p:spPr bwMode="auto">
           <a:xfrm>
-            <a:off x="3835382" y="2729411"/>
+            <a:off x="4564252" y="2729411"/>
             <a:ext cx="609600" cy="609600"/>
           </a:xfrm>
           <a:prstGeom prst="rect">
@@ -8105,7 +8062,7 @@
         </p:blipFill>
         <p:spPr bwMode="auto">
           <a:xfrm>
-            <a:off x="3835382" y="3789825"/>
+            <a:off x="4564252" y="3789825"/>
             <a:ext cx="609600" cy="609600"/>
           </a:xfrm>
           <a:prstGeom prst="rect">
@@ -8152,7 +8109,7 @@
         </p:blipFill>
         <p:spPr bwMode="auto">
           <a:xfrm>
-            <a:off x="3835382" y="4999141"/>
+            <a:off x="4564252" y="4999141"/>
             <a:ext cx="609600" cy="609600"/>
           </a:xfrm>
           <a:prstGeom prst="rect">
@@ -8199,7 +8156,7 @@
         </p:blipFill>
         <p:spPr bwMode="auto">
           <a:xfrm>
-            <a:off x="3835382" y="6030703"/>
+            <a:off x="4564252" y="6030703"/>
             <a:ext cx="609600" cy="609600"/>
           </a:xfrm>
           <a:prstGeom prst="rect">
@@ -8246,7 +8203,7 @@
         </p:blipFill>
         <p:spPr bwMode="auto">
           <a:xfrm>
-            <a:off x="5128468" y="1677058"/>
+            <a:off x="5857338" y="1677058"/>
             <a:ext cx="609600" cy="609600"/>
           </a:xfrm>
           <a:prstGeom prst="rect">
@@ -8293,7 +8250,7 @@
         </p:blipFill>
         <p:spPr bwMode="auto">
           <a:xfrm>
-            <a:off x="5128468" y="2729411"/>
+            <a:off x="5857338" y="2729411"/>
             <a:ext cx="609600" cy="609600"/>
           </a:xfrm>
           <a:prstGeom prst="rect">
@@ -8340,7 +8297,7 @@
         </p:blipFill>
         <p:spPr bwMode="auto">
           <a:xfrm>
-            <a:off x="5069973" y="3789825"/>
+            <a:off x="5798843" y="3789825"/>
             <a:ext cx="609600" cy="609600"/>
           </a:xfrm>
           <a:prstGeom prst="rect">
@@ -8387,7 +8344,7 @@
         </p:blipFill>
         <p:spPr bwMode="auto">
           <a:xfrm>
-            <a:off x="5069973" y="4999141"/>
+            <a:off x="5798843" y="4999141"/>
             <a:ext cx="609600" cy="609600"/>
           </a:xfrm>
           <a:prstGeom prst="rect">
@@ -8434,7 +8391,7 @@
         </p:blipFill>
         <p:spPr bwMode="auto">
           <a:xfrm>
-            <a:off x="4979660" y="5936127"/>
+            <a:off x="5708530" y="5936127"/>
             <a:ext cx="790225" cy="790225"/>
           </a:xfrm>
           <a:prstGeom prst="rect">
@@ -8481,7 +8438,7 @@
         </p:blipFill>
         <p:spPr bwMode="auto">
           <a:xfrm>
-            <a:off x="6361512" y="4999141"/>
+            <a:off x="7090382" y="4999141"/>
             <a:ext cx="609600" cy="609600"/>
           </a:xfrm>
           <a:prstGeom prst="rect">
@@ -8528,7 +8485,7 @@
         </p:blipFill>
         <p:spPr bwMode="auto">
           <a:xfrm>
-            <a:off x="6361512" y="2729411"/>
+            <a:off x="7090382" y="2729411"/>
             <a:ext cx="609600" cy="609600"/>
           </a:xfrm>
           <a:prstGeom prst="rect">
@@ -8575,7 +8532,7 @@
         </p:blipFill>
         <p:spPr bwMode="auto">
           <a:xfrm>
-            <a:off x="6271199" y="1572279"/>
+            <a:off x="7000069" y="1572279"/>
             <a:ext cx="790225" cy="790225"/>
           </a:xfrm>
           <a:prstGeom prst="rect">
@@ -8622,7 +8579,7 @@
         </p:blipFill>
         <p:spPr bwMode="auto">
           <a:xfrm>
-            <a:off x="6271199" y="3699512"/>
+            <a:off x="7000069" y="3699512"/>
             <a:ext cx="790225" cy="790225"/>
           </a:xfrm>
           <a:prstGeom prst="rect">
@@ -8669,243 +8626,8 @@
         </p:blipFill>
         <p:spPr bwMode="auto">
           <a:xfrm>
-            <a:off x="6271198" y="5930000"/>
+            <a:off x="7000068" y="5930000"/>
             <a:ext cx="790225" cy="790225"/>
-          </a:xfrm>
-          <a:prstGeom prst="rect">
-            <a:avLst/>
-          </a:prstGeom>
-          <a:noFill/>
-          <a:extLst>
-            <a:ext uri="{909E8E84-426E-40DD-AFC4-6F175D3DCCD1}">
-              <a14:hiddenFill xmlns:a14="http://schemas.microsoft.com/office/drawing/2010/main">
-                <a:solidFill>
-                  <a:srgbClr val="FFFFFF"/>
-                </a:solidFill>
-              </a14:hiddenFill>
-            </a:ext>
-          </a:extLst>
-        </p:spPr>
-      </p:pic>
-      <p:pic>
-        <p:nvPicPr>
-          <p:cNvPr id="36" name="Picture 4" descr="Resultado de imagem para check png">
-            <a:extLst>
-              <a:ext uri="{FF2B5EF4-FFF2-40B4-BE49-F238E27FC236}">
-                <a16:creationId xmlns:a16="http://schemas.microsoft.com/office/drawing/2014/main" id="{EA829DC7-3A77-4076-93D9-2AA71E67A0E3}"/>
-              </a:ext>
-            </a:extLst>
-          </p:cNvPr>
-          <p:cNvPicPr>
-            <a:picLocks noChangeAspect="1" noChangeArrowheads="1"/>
-          </p:cNvPicPr>
-          <p:nvPr/>
-        </p:nvPicPr>
-        <p:blipFill>
-          <a:blip r:embed="rId8">
-            <a:extLst>
-              <a:ext uri="{28A0092B-C50C-407E-A947-70E740481C1C}">
-                <a14:useLocalDpi xmlns:a14="http://schemas.microsoft.com/office/drawing/2010/main" val="0"/>
-              </a:ext>
-            </a:extLst>
-          </a:blip>
-          <a:srcRect/>
-          <a:stretch>
-            <a:fillRect/>
-          </a:stretch>
-        </p:blipFill>
-        <p:spPr bwMode="auto">
-          <a:xfrm>
-            <a:off x="7769232" y="1572279"/>
-            <a:ext cx="790225" cy="790225"/>
-          </a:xfrm>
-          <a:prstGeom prst="rect">
-            <a:avLst/>
-          </a:prstGeom>
-          <a:noFill/>
-          <a:extLst>
-            <a:ext uri="{909E8E84-426E-40DD-AFC4-6F175D3DCCD1}">
-              <a14:hiddenFill xmlns:a14="http://schemas.microsoft.com/office/drawing/2010/main">
-                <a:solidFill>
-                  <a:srgbClr val="FFFFFF"/>
-                </a:solidFill>
-              </a14:hiddenFill>
-            </a:ext>
-          </a:extLst>
-        </p:spPr>
-      </p:pic>
-      <p:pic>
-        <p:nvPicPr>
-          <p:cNvPr id="37" name="Picture 4" descr="Resultado de imagem para check png">
-            <a:extLst>
-              <a:ext uri="{FF2B5EF4-FFF2-40B4-BE49-F238E27FC236}">
-                <a16:creationId xmlns:a16="http://schemas.microsoft.com/office/drawing/2014/main" id="{F3769A65-0802-4B56-BAF5-60284EFBD1FD}"/>
-              </a:ext>
-            </a:extLst>
-          </p:cNvPr>
-          <p:cNvPicPr>
-            <a:picLocks noChangeAspect="1" noChangeArrowheads="1"/>
-          </p:cNvPicPr>
-          <p:nvPr/>
-        </p:nvPicPr>
-        <p:blipFill>
-          <a:blip r:embed="rId8">
-            <a:extLst>
-              <a:ext uri="{28A0092B-C50C-407E-A947-70E740481C1C}">
-                <a14:useLocalDpi xmlns:a14="http://schemas.microsoft.com/office/drawing/2010/main" val="0"/>
-              </a:ext>
-            </a:extLst>
-          </a:blip>
-          <a:srcRect/>
-          <a:stretch>
-            <a:fillRect/>
-          </a:stretch>
-        </p:blipFill>
-        <p:spPr bwMode="auto">
-          <a:xfrm>
-            <a:off x="7769232" y="2639098"/>
-            <a:ext cx="790225" cy="790225"/>
-          </a:xfrm>
-          <a:prstGeom prst="rect">
-            <a:avLst/>
-          </a:prstGeom>
-          <a:noFill/>
-          <a:extLst>
-            <a:ext uri="{909E8E84-426E-40DD-AFC4-6F175D3DCCD1}">
-              <a14:hiddenFill xmlns:a14="http://schemas.microsoft.com/office/drawing/2010/main">
-                <a:solidFill>
-                  <a:srgbClr val="FFFFFF"/>
-                </a:solidFill>
-              </a14:hiddenFill>
-            </a:ext>
-          </a:extLst>
-        </p:spPr>
-      </p:pic>
-      <p:pic>
-        <p:nvPicPr>
-          <p:cNvPr id="38" name="Picture 4" descr="Resultado de imagem para check png">
-            <a:extLst>
-              <a:ext uri="{FF2B5EF4-FFF2-40B4-BE49-F238E27FC236}">
-                <a16:creationId xmlns:a16="http://schemas.microsoft.com/office/drawing/2014/main" id="{A8EF135E-2762-4F76-A5B7-7C3C75819E4B}"/>
-              </a:ext>
-            </a:extLst>
-          </p:cNvPr>
-          <p:cNvPicPr>
-            <a:picLocks noChangeAspect="1" noChangeArrowheads="1"/>
-          </p:cNvPicPr>
-          <p:nvPr/>
-        </p:nvPicPr>
-        <p:blipFill>
-          <a:blip r:embed="rId8">
-            <a:extLst>
-              <a:ext uri="{28A0092B-C50C-407E-A947-70E740481C1C}">
-                <a14:useLocalDpi xmlns:a14="http://schemas.microsoft.com/office/drawing/2010/main" val="0"/>
-              </a:ext>
-            </a:extLst>
-          </a:blip>
-          <a:srcRect/>
-          <a:stretch>
-            <a:fillRect/>
-          </a:stretch>
-        </p:blipFill>
-        <p:spPr bwMode="auto">
-          <a:xfrm>
-            <a:off x="7769232" y="3699511"/>
-            <a:ext cx="790225" cy="790225"/>
-          </a:xfrm>
-          <a:prstGeom prst="rect">
-            <a:avLst/>
-          </a:prstGeom>
-          <a:noFill/>
-          <a:extLst>
-            <a:ext uri="{909E8E84-426E-40DD-AFC4-6F175D3DCCD1}">
-              <a14:hiddenFill xmlns:a14="http://schemas.microsoft.com/office/drawing/2010/main">
-                <a:solidFill>
-                  <a:srgbClr val="FFFFFF"/>
-                </a:solidFill>
-              </a14:hiddenFill>
-            </a:ext>
-          </a:extLst>
-        </p:spPr>
-      </p:pic>
-      <p:pic>
-        <p:nvPicPr>
-          <p:cNvPr id="39" name="Picture 4" descr="Resultado de imagem para check png">
-            <a:extLst>
-              <a:ext uri="{FF2B5EF4-FFF2-40B4-BE49-F238E27FC236}">
-                <a16:creationId xmlns:a16="http://schemas.microsoft.com/office/drawing/2014/main" id="{823814B1-2A2C-4FB9-95D0-A3E52304AAD7}"/>
-              </a:ext>
-            </a:extLst>
-          </p:cNvPr>
-          <p:cNvPicPr>
-            <a:picLocks noChangeAspect="1" noChangeArrowheads="1"/>
-          </p:cNvPicPr>
-          <p:nvPr/>
-        </p:nvPicPr>
-        <p:blipFill>
-          <a:blip r:embed="rId8">
-            <a:extLst>
-              <a:ext uri="{28A0092B-C50C-407E-A947-70E740481C1C}">
-                <a14:useLocalDpi xmlns:a14="http://schemas.microsoft.com/office/drawing/2010/main" val="0"/>
-              </a:ext>
-            </a:extLst>
-          </a:blip>
-          <a:srcRect/>
-          <a:stretch>
-            <a:fillRect/>
-          </a:stretch>
-        </p:blipFill>
-        <p:spPr bwMode="auto">
-          <a:xfrm>
-            <a:off x="7754698" y="4818516"/>
-            <a:ext cx="790225" cy="790225"/>
-          </a:xfrm>
-          <a:prstGeom prst="rect">
-            <a:avLst/>
-          </a:prstGeom>
-          <a:noFill/>
-          <a:extLst>
-            <a:ext uri="{909E8E84-426E-40DD-AFC4-6F175D3DCCD1}">
-              <a14:hiddenFill xmlns:a14="http://schemas.microsoft.com/office/drawing/2010/main">
-                <a:solidFill>
-                  <a:srgbClr val="FFFFFF"/>
-                </a:solidFill>
-              </a14:hiddenFill>
-            </a:ext>
-          </a:extLst>
-        </p:spPr>
-      </p:pic>
-      <p:pic>
-        <p:nvPicPr>
-          <p:cNvPr id="40" name="Picture 6" descr="Resultado de imagem para cross png">
-            <a:extLst>
-              <a:ext uri="{FF2B5EF4-FFF2-40B4-BE49-F238E27FC236}">
-                <a16:creationId xmlns:a16="http://schemas.microsoft.com/office/drawing/2014/main" id="{EEA8880F-912B-4996-99AC-4131B6854459}"/>
-              </a:ext>
-            </a:extLst>
-          </p:cNvPr>
-          <p:cNvPicPr>
-            <a:picLocks noChangeAspect="1" noChangeArrowheads="1"/>
-          </p:cNvPicPr>
-          <p:nvPr/>
-        </p:nvPicPr>
-        <p:blipFill>
-          <a:blip r:embed="rId7">
-            <a:extLst>
-              <a:ext uri="{28A0092B-C50C-407E-A947-70E740481C1C}">
-                <a14:useLocalDpi xmlns:a14="http://schemas.microsoft.com/office/drawing/2010/main" val="0"/>
-              </a:ext>
-            </a:extLst>
-          </a:blip>
-          <a:srcRect/>
-          <a:stretch>
-            <a:fillRect/>
-          </a:stretch>
-        </p:blipFill>
-        <p:spPr bwMode="auto">
-          <a:xfrm>
-            <a:off x="7845010" y="6026506"/>
-            <a:ext cx="609600" cy="609600"/>
           </a:xfrm>
           <a:prstGeom prst="rect">
             <a:avLst/>
@@ -8951,7 +8673,7 @@
         </p:blipFill>
         <p:spPr bwMode="auto">
           <a:xfrm>
-            <a:off x="2369167" y="6030703"/>
+            <a:off x="3098037" y="6030703"/>
             <a:ext cx="609600" cy="609600"/>
           </a:xfrm>
           <a:prstGeom prst="rect">
@@ -8998,7 +8720,7 @@
         </p:blipFill>
         <p:spPr bwMode="auto">
           <a:xfrm>
-            <a:off x="2369167" y="3789823"/>
+            <a:off x="3098037" y="3789823"/>
             <a:ext cx="609600" cy="609600"/>
           </a:xfrm>
           <a:prstGeom prst="rect">
@@ -9045,7 +8767,7 @@
         </p:blipFill>
         <p:spPr bwMode="auto">
           <a:xfrm>
-            <a:off x="2369167" y="2729411"/>
+            <a:off x="3098037" y="2729411"/>
             <a:ext cx="609600" cy="609600"/>
           </a:xfrm>
           <a:prstGeom prst="rect">
@@ -9092,7 +8814,7 @@
         </p:blipFill>
         <p:spPr bwMode="auto">
           <a:xfrm>
-            <a:off x="2369167" y="1665090"/>
+            <a:off x="3098037" y="1665090"/>
             <a:ext cx="609600" cy="609600"/>
           </a:xfrm>
           <a:prstGeom prst="rect">

</xml_diff>

<commit_message>
Fix Suggestions + Final PPTX
</commit_message>
<xml_diff>
--- a/Documentos/Apresentacao Intermedia- Projeto - LabSecurity.pptx
+++ b/Documentos/Apresentacao Intermedia- Projeto - LabSecurity.pptx
@@ -5,14 +5,21 @@
     <p:sldMasterId id="2147483686" r:id="rId1"/>
   </p:sldMasterIdLst>
   <p:notesMasterIdLst>
-    <p:notesMasterId r:id="rId7"/>
+    <p:notesMasterId r:id="rId14"/>
   </p:notesMasterIdLst>
   <p:sldIdLst>
     <p:sldId id="256" r:id="rId2"/>
     <p:sldId id="257" r:id="rId3"/>
-    <p:sldId id="258" r:id="rId4"/>
-    <p:sldId id="260" r:id="rId5"/>
-    <p:sldId id="261" r:id="rId6"/>
+    <p:sldId id="263" r:id="rId4"/>
+    <p:sldId id="258" r:id="rId5"/>
+    <p:sldId id="260" r:id="rId6"/>
+    <p:sldId id="261" r:id="rId7"/>
+    <p:sldId id="268" r:id="rId8"/>
+    <p:sldId id="266" r:id="rId9"/>
+    <p:sldId id="267" r:id="rId10"/>
+    <p:sldId id="262" r:id="rId11"/>
+    <p:sldId id="264" r:id="rId12"/>
+    <p:sldId id="269" r:id="rId13"/>
   </p:sldIdLst>
   <p:sldSz cx="9144000" cy="6858000" type="screen4x3"/>
   <p:notesSz cx="6858000" cy="9144000"/>
@@ -119,10 +126,6 @@
 </p:presentation>
 </file>
 
-<file path=ppt/revisionInfo.xml><?xml version="1.0" encoding="utf-8"?>
-<p1510:revInfo xmlns:a="http://schemas.openxmlformats.org/drawingml/2006/main" xmlns:r="http://schemas.openxmlformats.org/officeDocument/2006/relationships" xmlns:p1510="http://schemas.microsoft.com/office/powerpoint/2015/10/main"/>
-</file>
-
 <file path=ppt/notesMasters/notesMaster1.xml><?xml version="1.0" encoding="utf-8"?>
 <p:notesMaster xmlns:a="http://schemas.openxmlformats.org/drawingml/2006/main" xmlns:r="http://schemas.openxmlformats.org/officeDocument/2006/relationships" xmlns:p="http://schemas.openxmlformats.org/presentationml/2006/main">
   <p:cSld>
@@ -205,7 +208,7 @@
           <a:p>
             <a:fld id="{49C4E3B3-E8BB-4A8E-821D-3CF4DD5602DB}" type="datetimeFigureOut">
               <a:rPr lang="pt-PT" smtClean="0"/>
-              <a:t>21/06/2018</a:t>
+              <a:t>17/09/2018</a:t>
             </a:fld>
             <a:endParaRPr lang="pt-PT"/>
           </a:p>
@@ -988,7 +991,7 @@
           <a:p>
             <a:fld id="{F2AEA71E-5E66-40E0-9F8C-68663391016D}" type="datetime1">
               <a:rPr lang="en-US" smtClean="0"/>
-              <a:t>21-Jun-18</a:t>
+              <a:t>17-Sep-18</a:t>
             </a:fld>
             <a:endParaRPr lang="en-US" dirty="0"/>
           </a:p>
@@ -1090,7 +1093,7 @@
           </a:ln>
           <a:extLst>
             <a:ext uri="{91240B29-F687-4f45-9708-019B960494DF}">
-              <a14:hiddenLine xmlns="" xmlns:a14="http://schemas.microsoft.com/office/drawing/2010/main" w="9525">
+              <a14:hiddenLine xmlns:a14="http://schemas.microsoft.com/office/drawing/2010/main" xmlns="" w="9525">
                 <a:solidFill>
                   <a:srgbClr val="000000"/>
                 </a:solidFill>
@@ -1145,7 +1148,7 @@
           </a:ln>
           <a:extLst>
             <a:ext uri="{91240B29-F687-4f45-9708-019B960494DF}">
-              <a14:hiddenLine xmlns="" xmlns:a14="http://schemas.microsoft.com/office/drawing/2010/main" w="9525">
+              <a14:hiddenLine xmlns:a14="http://schemas.microsoft.com/office/drawing/2010/main" xmlns="" w="9525">
                 <a:solidFill>
                   <a:srgbClr val="000000"/>
                 </a:solidFill>
@@ -1400,7 +1403,7 @@
           <a:p>
             <a:fld id="{987CA4A7-55E7-4E87-AB13-4B00EC0A8DB0}" type="datetime1">
               <a:rPr lang="en-US" smtClean="0"/>
-              <a:t>21-Jun-18</a:t>
+              <a:t>17-Sep-18</a:t>
             </a:fld>
             <a:endParaRPr lang="en-US" dirty="0"/>
           </a:p>
@@ -1649,7 +1652,7 @@
           <a:p>
             <a:fld id="{FBD37299-E919-4A70-AA78-4DC967196E65}" type="datetime1">
               <a:rPr lang="en-US" smtClean="0"/>
-              <a:t>21-Jun-18</a:t>
+              <a:t>17-Sep-18</a:t>
             </a:fld>
             <a:endParaRPr lang="en-US" dirty="0"/>
           </a:p>
@@ -2190,7 +2193,7 @@
           <a:p>
             <a:fld id="{8F689CA6-45BC-4C49-885E-994F7B4CC6D3}" type="datetime1">
               <a:rPr lang="en-US" smtClean="0"/>
-              <a:t>21-Jun-18</a:t>
+              <a:t>17-Sep-18</a:t>
             </a:fld>
             <a:endParaRPr lang="en-US" dirty="0"/>
           </a:p>
@@ -2439,7 +2442,7 @@
           <a:p>
             <a:fld id="{7B5B7D79-60FF-46B6-9746-F9075481C36A}" type="datetime1">
               <a:rPr lang="en-US" smtClean="0"/>
-              <a:t>21-Jun-18</a:t>
+              <a:t>17-Sep-18</a:t>
             </a:fld>
             <a:endParaRPr lang="en-US" dirty="0"/>
           </a:p>
@@ -2972,7 +2975,7 @@
           <a:p>
             <a:fld id="{66A2D770-8723-4808-9A81-5A77127D5EF8}" type="datetime1">
               <a:rPr lang="en-US" smtClean="0"/>
-              <a:t>21-Jun-18</a:t>
+              <a:t>17-Sep-18</a:t>
             </a:fld>
             <a:endParaRPr lang="en-US" dirty="0"/>
           </a:p>
@@ -3270,7 +3273,7 @@
           <a:p>
             <a:fld id="{CEDFF1B1-5EF2-440F-8804-7680700AA6E7}" type="datetime1">
               <a:rPr lang="en-US" smtClean="0"/>
-              <a:t>21-Jun-18</a:t>
+              <a:t>17-Sep-18</a:t>
             </a:fld>
             <a:endParaRPr lang="en-US" dirty="0"/>
           </a:p>
@@ -3445,7 +3448,7 @@
           <a:p>
             <a:fld id="{C799142C-90F1-4C01-B1F4-01D45DC10164}" type="datetime1">
               <a:rPr lang="en-US" smtClean="0"/>
-              <a:t>21-Jun-18</a:t>
+              <a:t>17-Sep-18</a:t>
             </a:fld>
             <a:endParaRPr lang="en-US" dirty="0"/>
           </a:p>
@@ -3626,7 +3629,7 @@
           <a:p>
             <a:fld id="{7A64C461-EA35-4528-9ECD-98782B286F97}" type="datetime1">
               <a:rPr lang="en-US" smtClean="0"/>
-              <a:t>21-Jun-18</a:t>
+              <a:t>17-Sep-18</a:t>
             </a:fld>
             <a:endParaRPr lang="en-US" dirty="0"/>
           </a:p>
@@ -3812,7 +3815,7 @@
           <a:p>
             <a:fld id="{7F132594-395A-4D3F-B1D6-ECDD18416CB7}" type="datetime1">
               <a:rPr lang="en-US" smtClean="0"/>
-              <a:t>21-Jun-18</a:t>
+              <a:t>17-Sep-18</a:t>
             </a:fld>
             <a:endParaRPr lang="en-US" dirty="0"/>
           </a:p>
@@ -4069,7 +4072,7 @@
           <a:p>
             <a:fld id="{5694667B-EBFE-43B4-93E9-FC4DE0B52405}" type="datetime1">
               <a:rPr lang="en-US" smtClean="0"/>
-              <a:t>21-Jun-18</a:t>
+              <a:t>17-Sep-18</a:t>
             </a:fld>
             <a:endParaRPr lang="en-US" dirty="0"/>
           </a:p>
@@ -4372,7 +4375,7 @@
           <a:p>
             <a:fld id="{4B72E740-F732-4BA0-BF90-6D63E1C57081}" type="datetime1">
               <a:rPr lang="en-US" smtClean="0"/>
-              <a:t>21-Jun-18</a:t>
+              <a:t>17-Sep-18</a:t>
             </a:fld>
             <a:endParaRPr lang="en-US" dirty="0"/>
           </a:p>
@@ -4815,7 +4818,7 @@
           <a:p>
             <a:fld id="{19514532-B5F6-441F-B0DF-5F0D6F5FB33A}" type="datetime1">
               <a:rPr lang="en-US" smtClean="0"/>
-              <a:t>21-Jun-18</a:t>
+              <a:t>17-Sep-18</a:t>
             </a:fld>
             <a:endParaRPr lang="en-US" dirty="0"/>
           </a:p>
@@ -4934,7 +4937,7 @@
           <a:p>
             <a:fld id="{4BF255F0-0830-4628-B199-4F57013DA031}" type="datetime1">
               <a:rPr lang="en-US" smtClean="0"/>
-              <a:t>21-Jun-18</a:t>
+              <a:t>17-Sep-18</a:t>
             </a:fld>
             <a:endParaRPr lang="en-US" dirty="0"/>
           </a:p>
@@ -5030,7 +5033,7 @@
           <a:p>
             <a:fld id="{94D4EE79-B7E8-4678-A131-486DDED8E184}" type="datetime1">
               <a:rPr lang="en-US" smtClean="0"/>
-              <a:t>21-Jun-18</a:t>
+              <a:t>17-Sep-18</a:t>
             </a:fld>
             <a:endParaRPr lang="en-US" dirty="0"/>
           </a:p>
@@ -5314,7 +5317,7 @@
           <a:p>
             <a:fld id="{F7B3843B-9B7D-42D0-A66D-81C4A65EDFA7}" type="datetime1">
               <a:rPr lang="en-US" smtClean="0"/>
-              <a:t>21-Jun-18</a:t>
+              <a:t>17-Sep-18</a:t>
             </a:fld>
             <a:endParaRPr lang="en-US" dirty="0"/>
           </a:p>
@@ -5606,7 +5609,7 @@
           <a:p>
             <a:fld id="{48DA69CF-28D2-40DD-949C-5DEBC5516499}" type="datetime1">
               <a:rPr lang="en-US" smtClean="0"/>
-              <a:t>21-Jun-18</a:t>
+              <a:t>17-Sep-18</a:t>
             </a:fld>
             <a:endParaRPr lang="en-US" dirty="0"/>
           </a:p>
@@ -6131,7 +6134,7 @@
           <a:p>
             <a:fld id="{C48EB757-431F-4220-8D43-3157C9D0E054}" type="datetime1">
               <a:rPr lang="en-US" smtClean="0"/>
-              <a:t>21-Jun-18</a:t>
+              <a:t>17-Sep-18</a:t>
             </a:fld>
             <a:endParaRPr lang="en-US" dirty="0"/>
           </a:p>
@@ -6756,7 +6759,7 @@
           <a:p>
             <a:r>
               <a:rPr lang="pt-PT" sz="1600" dirty="0"/>
-              <a:t>Data:21-Jun-2018</a:t>
+              <a:t>Data:28-Set-2018</a:t>
             </a:r>
           </a:p>
         </p:txBody>
@@ -6765,6 +6768,659 @@
     <p:extLst>
       <p:ext uri="{BB962C8B-B14F-4D97-AF65-F5344CB8AC3E}">
         <p14:creationId xmlns:p14="http://schemas.microsoft.com/office/powerpoint/2010/main" val="154313468"/>
+      </p:ext>
+    </p:extLst>
+  </p:cSld>
+  <p:clrMapOvr>
+    <a:masterClrMapping/>
+  </p:clrMapOvr>
+</p:sld>
+</file>
+
+<file path=ppt/slides/slide10.xml><?xml version="1.0" encoding="utf-8"?>
+<p:sld xmlns:a="http://schemas.openxmlformats.org/drawingml/2006/main" xmlns:r="http://schemas.openxmlformats.org/officeDocument/2006/relationships" xmlns:p="http://schemas.openxmlformats.org/presentationml/2006/main">
+  <p:cSld>
+    <p:spTree>
+      <p:nvGrpSpPr>
+        <p:cNvPr id="1" name=""/>
+        <p:cNvGrpSpPr/>
+        <p:nvPr/>
+      </p:nvGrpSpPr>
+      <p:grpSpPr>
+        <a:xfrm>
+          <a:off x="0" y="0"/>
+          <a:ext cx="0" cy="0"/>
+          <a:chOff x="0" y="0"/>
+          <a:chExt cx="0" cy="0"/>
+        </a:xfrm>
+      </p:grpSpPr>
+      <p:sp>
+        <p:nvSpPr>
+          <p:cNvPr id="4" name="Marcador de Posição do Número do Diapositivo 3">
+            <a:extLst>
+              <a:ext uri="{FF2B5EF4-FFF2-40B4-BE49-F238E27FC236}">
+                <a16:creationId xmlns:a16="http://schemas.microsoft.com/office/drawing/2014/main" id="{E079EE21-185F-4CD9-95D1-87ECAA81CFA7}"/>
+              </a:ext>
+            </a:extLst>
+          </p:cNvPr>
+          <p:cNvSpPr>
+            <a:spLocks noGrp="1"/>
+          </p:cNvSpPr>
+          <p:nvPr>
+            <p:ph type="sldNum" sz="quarter" idx="12"/>
+          </p:nvPr>
+        </p:nvSpPr>
+        <p:spPr/>
+        <p:txBody>
+          <a:bodyPr/>
+          <a:lstStyle/>
+          <a:p>
+            <a:fld id="{D57F1E4F-1CFF-5643-939E-217C01CDF565}" type="slidenum">
+              <a:rPr lang="en-US" smtClean="0"/>
+              <a:pPr/>
+              <a:t>10</a:t>
+            </a:fld>
+            <a:endParaRPr lang="en-US" dirty="0"/>
+          </a:p>
+        </p:txBody>
+      </p:sp>
+      <p:sp>
+        <p:nvSpPr>
+          <p:cNvPr id="5" name="Título 1">
+            <a:extLst>
+              <a:ext uri="{FF2B5EF4-FFF2-40B4-BE49-F238E27FC236}">
+                <a16:creationId xmlns:a16="http://schemas.microsoft.com/office/drawing/2014/main" id="{C6A5B2C0-8B8E-4A48-85A9-B23D324C60F7}"/>
+              </a:ext>
+            </a:extLst>
+          </p:cNvPr>
+          <p:cNvSpPr>
+            <a:spLocks noGrp="1"/>
+          </p:cNvSpPr>
+          <p:nvPr>
+            <p:ph type="title"/>
+          </p:nvPr>
+        </p:nvSpPr>
+        <p:spPr>
+          <a:xfrm>
+            <a:off x="982132" y="-1"/>
+            <a:ext cx="7704667" cy="1179443"/>
+          </a:xfrm>
+        </p:spPr>
+        <p:txBody>
+          <a:bodyPr/>
+          <a:lstStyle/>
+          <a:p>
+            <a:r>
+              <a:rPr lang="pt-PT" dirty="0"/>
+              <a:t>Arquitetura do Sistema</a:t>
+            </a:r>
+          </a:p>
+        </p:txBody>
+      </p:sp>
+      <p:pic>
+        <p:nvPicPr>
+          <p:cNvPr id="7" name="Imagem 6">
+            <a:extLst>
+              <a:ext uri="{FF2B5EF4-FFF2-40B4-BE49-F238E27FC236}">
+                <a16:creationId xmlns:a16="http://schemas.microsoft.com/office/drawing/2014/main" id="{A3090872-124C-4C22-AAA3-12038BB9A4E3}"/>
+              </a:ext>
+            </a:extLst>
+          </p:cNvPr>
+          <p:cNvPicPr>
+            <a:picLocks noChangeAspect="1"/>
+          </p:cNvPicPr>
+          <p:nvPr/>
+        </p:nvPicPr>
+        <p:blipFill>
+          <a:blip r:embed="rId2"/>
+          <a:stretch>
+            <a:fillRect/>
+          </a:stretch>
+        </p:blipFill>
+        <p:spPr>
+          <a:xfrm>
+            <a:off x="1233487" y="1262062"/>
+            <a:ext cx="7466206" cy="4846111"/>
+          </a:xfrm>
+          <a:prstGeom prst="roundRect">
+            <a:avLst>
+              <a:gd name="adj" fmla="val 4167"/>
+            </a:avLst>
+          </a:prstGeom>
+          <a:solidFill>
+            <a:srgbClr val="FFFFFF"/>
+          </a:solidFill>
+          <a:ln w="76200" cap="sq">
+            <a:solidFill>
+              <a:srgbClr val="292929"/>
+            </a:solidFill>
+            <a:miter lim="800000"/>
+          </a:ln>
+          <a:effectLst>
+            <a:reflection blurRad="12700" stA="28000" endPos="28000" dist="5000" dir="5400000" sy="-100000" algn="bl" rotWithShape="0"/>
+          </a:effectLst>
+          <a:scene3d>
+            <a:camera prst="orthographicFront"/>
+            <a:lightRig rig="threePt" dir="t">
+              <a:rot lat="0" lon="0" rev="2700000"/>
+            </a:lightRig>
+          </a:scene3d>
+          <a:sp3d>
+            <a:bevelT h="38100"/>
+            <a:contourClr>
+              <a:srgbClr val="C0C0C0"/>
+            </a:contourClr>
+          </a:sp3d>
+        </p:spPr>
+      </p:pic>
+    </p:spTree>
+    <p:extLst>
+      <p:ext uri="{BB962C8B-B14F-4D97-AF65-F5344CB8AC3E}">
+        <p14:creationId xmlns:p14="http://schemas.microsoft.com/office/powerpoint/2010/main" val="1601394881"/>
+      </p:ext>
+    </p:extLst>
+  </p:cSld>
+  <p:clrMapOvr>
+    <a:masterClrMapping/>
+  </p:clrMapOvr>
+</p:sld>
+</file>
+
+<file path=ppt/slides/slide11.xml><?xml version="1.0" encoding="utf-8"?>
+<p:sld xmlns:a="http://schemas.openxmlformats.org/drawingml/2006/main" xmlns:r="http://schemas.openxmlformats.org/officeDocument/2006/relationships" xmlns:p="http://schemas.openxmlformats.org/presentationml/2006/main">
+  <p:cSld>
+    <p:spTree>
+      <p:nvGrpSpPr>
+        <p:cNvPr id="1" name=""/>
+        <p:cNvGrpSpPr/>
+        <p:nvPr/>
+      </p:nvGrpSpPr>
+      <p:grpSpPr>
+        <a:xfrm>
+          <a:off x="0" y="0"/>
+          <a:ext cx="0" cy="0"/>
+          <a:chOff x="0" y="0"/>
+          <a:chExt cx="0" cy="0"/>
+        </a:xfrm>
+      </p:grpSpPr>
+      <p:sp>
+        <p:nvSpPr>
+          <p:cNvPr id="4" name="Marcador de Posição do Número do Diapositivo 3">
+            <a:extLst>
+              <a:ext uri="{FF2B5EF4-FFF2-40B4-BE49-F238E27FC236}">
+                <a16:creationId xmlns:a16="http://schemas.microsoft.com/office/drawing/2014/main" id="{354A4F1E-35E2-4875-9FE7-39F4F118612C}"/>
+              </a:ext>
+            </a:extLst>
+          </p:cNvPr>
+          <p:cNvSpPr>
+            <a:spLocks noGrp="1"/>
+          </p:cNvSpPr>
+          <p:nvPr>
+            <p:ph type="sldNum" sz="quarter" idx="12"/>
+          </p:nvPr>
+        </p:nvSpPr>
+        <p:spPr/>
+        <p:txBody>
+          <a:bodyPr/>
+          <a:lstStyle/>
+          <a:p>
+            <a:fld id="{D57F1E4F-1CFF-5643-939E-217C01CDF565}" type="slidenum">
+              <a:rPr lang="en-US" smtClean="0"/>
+              <a:pPr/>
+              <a:t>11</a:t>
+            </a:fld>
+            <a:endParaRPr lang="en-US" dirty="0"/>
+          </a:p>
+        </p:txBody>
+      </p:sp>
+      <p:sp>
+        <p:nvSpPr>
+          <p:cNvPr id="5" name="Título 1">
+            <a:extLst>
+              <a:ext uri="{FF2B5EF4-FFF2-40B4-BE49-F238E27FC236}">
+                <a16:creationId xmlns:a16="http://schemas.microsoft.com/office/drawing/2014/main" id="{C7BF3950-AE8B-418A-A5A1-35D144BA34A7}"/>
+              </a:ext>
+            </a:extLst>
+          </p:cNvPr>
+          <p:cNvSpPr>
+            <a:spLocks noGrp="1"/>
+          </p:cNvSpPr>
+          <p:nvPr>
+            <p:ph type="title"/>
+          </p:nvPr>
+        </p:nvSpPr>
+        <p:spPr>
+          <a:xfrm>
+            <a:off x="982132" y="-1"/>
+            <a:ext cx="7704667" cy="1179443"/>
+          </a:xfrm>
+        </p:spPr>
+        <p:txBody>
+          <a:bodyPr/>
+          <a:lstStyle/>
+          <a:p>
+            <a:r>
+              <a:rPr lang="pt-PT" dirty="0"/>
+              <a:t>Organigrama</a:t>
+            </a:r>
+          </a:p>
+        </p:txBody>
+      </p:sp>
+      <p:pic>
+        <p:nvPicPr>
+          <p:cNvPr id="7" name="Imagem 6" descr="Uma imagem com captura de ecrã&#10;&#10;Descrição gerada com confiança muito alta">
+            <a:extLst>
+              <a:ext uri="{FF2B5EF4-FFF2-40B4-BE49-F238E27FC236}">
+                <a16:creationId xmlns:a16="http://schemas.microsoft.com/office/drawing/2014/main" id="{0064EFE8-9EAB-48F9-B153-8FB0E28309AB}"/>
+              </a:ext>
+            </a:extLst>
+          </p:cNvPr>
+          <p:cNvPicPr>
+            <a:picLocks noChangeAspect="1"/>
+          </p:cNvPicPr>
+          <p:nvPr/>
+        </p:nvPicPr>
+        <p:blipFill>
+          <a:blip r:embed="rId2"/>
+          <a:stretch>
+            <a:fillRect/>
+          </a:stretch>
+        </p:blipFill>
+        <p:spPr>
+          <a:xfrm>
+            <a:off x="0" y="1572050"/>
+            <a:ext cx="9144000" cy="4033623"/>
+          </a:xfrm>
+          <a:prstGeom prst="rect">
+            <a:avLst/>
+          </a:prstGeom>
+        </p:spPr>
+      </p:pic>
+    </p:spTree>
+    <p:extLst>
+      <p:ext uri="{BB962C8B-B14F-4D97-AF65-F5344CB8AC3E}">
+        <p14:creationId xmlns:p14="http://schemas.microsoft.com/office/powerpoint/2010/main" val="3828965261"/>
+      </p:ext>
+    </p:extLst>
+  </p:cSld>
+  <p:clrMapOvr>
+    <a:masterClrMapping/>
+  </p:clrMapOvr>
+</p:sld>
+</file>
+
+<file path=ppt/slides/slide12.xml><?xml version="1.0" encoding="utf-8"?>
+<p:sld xmlns:a="http://schemas.openxmlformats.org/drawingml/2006/main" xmlns:r="http://schemas.openxmlformats.org/officeDocument/2006/relationships" xmlns:p="http://schemas.openxmlformats.org/presentationml/2006/main">
+  <p:cSld>
+    <p:spTree>
+      <p:nvGrpSpPr>
+        <p:cNvPr id="1" name=""/>
+        <p:cNvGrpSpPr/>
+        <p:nvPr/>
+      </p:nvGrpSpPr>
+      <p:grpSpPr>
+        <a:xfrm>
+          <a:off x="0" y="0"/>
+          <a:ext cx="0" cy="0"/>
+          <a:chOff x="0" y="0"/>
+          <a:chExt cx="0" cy="0"/>
+        </a:xfrm>
+      </p:grpSpPr>
+      <p:sp>
+        <p:nvSpPr>
+          <p:cNvPr id="4" name="Marcador de Posição do Número do Diapositivo 3">
+            <a:extLst>
+              <a:ext uri="{FF2B5EF4-FFF2-40B4-BE49-F238E27FC236}">
+                <a16:creationId xmlns:a16="http://schemas.microsoft.com/office/drawing/2014/main" id="{FE8DC949-2FF0-4B32-88A6-613762D61861}"/>
+              </a:ext>
+            </a:extLst>
+          </p:cNvPr>
+          <p:cNvSpPr>
+            <a:spLocks noGrp="1"/>
+          </p:cNvSpPr>
+          <p:nvPr>
+            <p:ph type="sldNum" sz="quarter" idx="12"/>
+          </p:nvPr>
+        </p:nvSpPr>
+        <p:spPr/>
+        <p:txBody>
+          <a:bodyPr/>
+          <a:lstStyle/>
+          <a:p>
+            <a:fld id="{D57F1E4F-1CFF-5643-939E-217C01CDF565}" type="slidenum">
+              <a:rPr lang="en-US" smtClean="0"/>
+              <a:pPr/>
+              <a:t>12</a:t>
+            </a:fld>
+            <a:endParaRPr lang="en-US" dirty="0"/>
+          </a:p>
+        </p:txBody>
+      </p:sp>
+      <p:sp>
+        <p:nvSpPr>
+          <p:cNvPr id="5" name="Título 1">
+            <a:extLst>
+              <a:ext uri="{FF2B5EF4-FFF2-40B4-BE49-F238E27FC236}">
+                <a16:creationId xmlns:a16="http://schemas.microsoft.com/office/drawing/2014/main" id="{7BEA97A4-9272-4C1F-85E0-87E1297DDCF8}"/>
+              </a:ext>
+            </a:extLst>
+          </p:cNvPr>
+          <p:cNvSpPr>
+            <a:spLocks noGrp="1"/>
+          </p:cNvSpPr>
+          <p:nvPr>
+            <p:ph type="title"/>
+          </p:nvPr>
+        </p:nvSpPr>
+        <p:spPr>
+          <a:xfrm>
+            <a:off x="982132" y="-1"/>
+            <a:ext cx="7704667" cy="1179443"/>
+          </a:xfrm>
+        </p:spPr>
+        <p:txBody>
+          <a:bodyPr/>
+          <a:lstStyle/>
+          <a:p>
+            <a:r>
+              <a:rPr lang="pt-PT" dirty="0"/>
+              <a:t>Conclusão</a:t>
+            </a:r>
+          </a:p>
+        </p:txBody>
+      </p:sp>
+      <p:pic>
+        <p:nvPicPr>
+          <p:cNvPr id="8194" name="Picture 2" descr="Resultado de imagem para web platform">
+            <a:extLst>
+              <a:ext uri="{FF2B5EF4-FFF2-40B4-BE49-F238E27FC236}">
+                <a16:creationId xmlns:a16="http://schemas.microsoft.com/office/drawing/2014/main" id="{31E82894-06DA-4C50-AE3B-C3CA50DD6F38}"/>
+              </a:ext>
+            </a:extLst>
+          </p:cNvPr>
+          <p:cNvPicPr>
+            <a:picLocks noChangeAspect="1" noChangeArrowheads="1"/>
+          </p:cNvPicPr>
+          <p:nvPr/>
+        </p:nvPicPr>
+        <p:blipFill>
+          <a:blip r:embed="rId2">
+            <a:extLst>
+              <a:ext uri="{28A0092B-C50C-407E-A947-70E740481C1C}">
+                <a14:useLocalDpi xmlns:a14="http://schemas.microsoft.com/office/drawing/2010/main" val="0"/>
+              </a:ext>
+            </a:extLst>
+          </a:blip>
+          <a:srcRect/>
+          <a:stretch>
+            <a:fillRect/>
+          </a:stretch>
+        </p:blipFill>
+        <p:spPr bwMode="auto">
+          <a:xfrm>
+            <a:off x="4425923" y="1179442"/>
+            <a:ext cx="4472911" cy="2563273"/>
+          </a:xfrm>
+          <a:prstGeom prst="roundRect">
+            <a:avLst>
+              <a:gd name="adj" fmla="val 4167"/>
+            </a:avLst>
+          </a:prstGeom>
+          <a:solidFill>
+            <a:srgbClr val="FFFFFF"/>
+          </a:solidFill>
+          <a:ln w="76200" cap="sq">
+            <a:solidFill>
+              <a:srgbClr val="292929"/>
+            </a:solidFill>
+            <a:miter lim="800000"/>
+          </a:ln>
+          <a:effectLst>
+            <a:reflection blurRad="12700" stA="28000" endPos="28000" dist="5000" dir="5400000" sy="-100000" algn="bl" rotWithShape="0"/>
+          </a:effectLst>
+          <a:scene3d>
+            <a:camera prst="orthographicFront"/>
+            <a:lightRig rig="threePt" dir="t">
+              <a:rot lat="0" lon="0" rev="2700000"/>
+            </a:lightRig>
+          </a:scene3d>
+          <a:sp3d>
+            <a:bevelT h="38100"/>
+            <a:contourClr>
+              <a:srgbClr val="C0C0C0"/>
+            </a:contourClr>
+          </a:sp3d>
+          <a:extLst>
+            <a:ext uri="{909E8E84-426E-40DD-AFC4-6F175D3DCCD1}">
+              <a14:hiddenFill xmlns:a14="http://schemas.microsoft.com/office/drawing/2010/main">
+                <a:solidFill>
+                  <a:srgbClr val="FFFFFF"/>
+                </a:solidFill>
+              </a14:hiddenFill>
+            </a:ext>
+          </a:extLst>
+        </p:spPr>
+      </p:pic>
+      <p:pic>
+        <p:nvPicPr>
+          <p:cNvPr id="8196" name="Picture 4" descr="Resultado de imagem para Competitions icon">
+            <a:extLst>
+              <a:ext uri="{FF2B5EF4-FFF2-40B4-BE49-F238E27FC236}">
+                <a16:creationId xmlns:a16="http://schemas.microsoft.com/office/drawing/2014/main" id="{702E6D31-F107-445E-A6F9-E915C0A4B8B7}"/>
+              </a:ext>
+            </a:extLst>
+          </p:cNvPr>
+          <p:cNvPicPr>
+            <a:picLocks noChangeAspect="1" noChangeArrowheads="1"/>
+          </p:cNvPicPr>
+          <p:nvPr/>
+        </p:nvPicPr>
+        <p:blipFill>
+          <a:blip r:embed="rId3">
+            <a:extLst>
+              <a:ext uri="{28A0092B-C50C-407E-A947-70E740481C1C}">
+                <a14:useLocalDpi xmlns:a14="http://schemas.microsoft.com/office/drawing/2010/main" val="0"/>
+              </a:ext>
+            </a:extLst>
+          </a:blip>
+          <a:srcRect/>
+          <a:stretch>
+            <a:fillRect/>
+          </a:stretch>
+        </p:blipFill>
+        <p:spPr bwMode="auto">
+          <a:xfrm>
+            <a:off x="1129746" y="1298199"/>
+            <a:ext cx="2325757" cy="2325757"/>
+          </a:xfrm>
+          <a:prstGeom prst="roundRect">
+            <a:avLst>
+              <a:gd name="adj" fmla="val 4167"/>
+            </a:avLst>
+          </a:prstGeom>
+          <a:solidFill>
+            <a:srgbClr val="FFFFFF"/>
+          </a:solidFill>
+          <a:ln w="76200" cap="sq">
+            <a:solidFill>
+              <a:srgbClr val="292929"/>
+            </a:solidFill>
+            <a:miter lim="800000"/>
+          </a:ln>
+          <a:effectLst>
+            <a:reflection blurRad="12700" stA="28000" endPos="28000" dist="5000" dir="5400000" sy="-100000" algn="bl" rotWithShape="0"/>
+          </a:effectLst>
+          <a:scene3d>
+            <a:camera prst="orthographicFront"/>
+            <a:lightRig rig="threePt" dir="t">
+              <a:rot lat="0" lon="0" rev="2700000"/>
+            </a:lightRig>
+          </a:scene3d>
+          <a:sp3d>
+            <a:bevelT h="38100"/>
+            <a:contourClr>
+              <a:srgbClr val="C0C0C0"/>
+            </a:contourClr>
+          </a:sp3d>
+          <a:extLst>
+            <a:ext uri="{909E8E84-426E-40DD-AFC4-6F175D3DCCD1}">
+              <a14:hiddenFill xmlns:a14="http://schemas.microsoft.com/office/drawing/2010/main">
+                <a:solidFill>
+                  <a:srgbClr val="FFFFFF"/>
+                </a:solidFill>
+              </a14:hiddenFill>
+            </a:ext>
+          </a:extLst>
+        </p:spPr>
+      </p:pic>
+      <p:pic>
+        <p:nvPicPr>
+          <p:cNvPr id="8202" name="Picture 10" descr="Resultado de imagem para Cloud service">
+            <a:extLst>
+              <a:ext uri="{FF2B5EF4-FFF2-40B4-BE49-F238E27FC236}">
+                <a16:creationId xmlns:a16="http://schemas.microsoft.com/office/drawing/2014/main" id="{D02A965D-CF8D-4728-96E1-360E328B9B93}"/>
+              </a:ext>
+            </a:extLst>
+          </p:cNvPr>
+          <p:cNvPicPr>
+            <a:picLocks noChangeAspect="1" noChangeArrowheads="1"/>
+          </p:cNvPicPr>
+          <p:nvPr/>
+        </p:nvPicPr>
+        <p:blipFill>
+          <a:blip r:embed="rId4">
+            <a:extLst>
+              <a:ext uri="{28A0092B-C50C-407E-A947-70E740481C1C}">
+                <a14:useLocalDpi xmlns:a14="http://schemas.microsoft.com/office/drawing/2010/main" val="0"/>
+              </a:ext>
+            </a:extLst>
+          </a:blip>
+          <a:srcRect/>
+          <a:stretch>
+            <a:fillRect/>
+          </a:stretch>
+        </p:blipFill>
+        <p:spPr bwMode="auto">
+          <a:xfrm>
+            <a:off x="1129746" y="4051463"/>
+            <a:ext cx="2421835" cy="2421835"/>
+          </a:xfrm>
+          <a:prstGeom prst="roundRect">
+            <a:avLst>
+              <a:gd name="adj" fmla="val 4167"/>
+            </a:avLst>
+          </a:prstGeom>
+          <a:solidFill>
+            <a:srgbClr val="FFFFFF"/>
+          </a:solidFill>
+          <a:ln w="76200" cap="sq">
+            <a:solidFill>
+              <a:srgbClr val="292929"/>
+            </a:solidFill>
+            <a:miter lim="800000"/>
+          </a:ln>
+          <a:effectLst>
+            <a:reflection blurRad="12700" stA="28000" endPos="28000" dist="5000" dir="5400000" sy="-100000" algn="bl" rotWithShape="0"/>
+          </a:effectLst>
+          <a:scene3d>
+            <a:camera prst="orthographicFront"/>
+            <a:lightRig rig="threePt" dir="t">
+              <a:rot lat="0" lon="0" rev="2700000"/>
+            </a:lightRig>
+          </a:scene3d>
+          <a:sp3d>
+            <a:bevelT h="38100"/>
+            <a:contourClr>
+              <a:srgbClr val="C0C0C0"/>
+            </a:contourClr>
+          </a:sp3d>
+          <a:extLst>
+            <a:ext uri="{909E8E84-426E-40DD-AFC4-6F175D3DCCD1}">
+              <a14:hiddenFill xmlns:a14="http://schemas.microsoft.com/office/drawing/2010/main">
+                <a:solidFill>
+                  <a:srgbClr val="FFFFFF"/>
+                </a:solidFill>
+              </a14:hiddenFill>
+            </a:ext>
+          </a:extLst>
+        </p:spPr>
+      </p:pic>
+      <p:pic>
+        <p:nvPicPr>
+          <p:cNvPr id="8204" name="Picture 12" descr="Resultado de imagem para Fix errors">
+            <a:extLst>
+              <a:ext uri="{FF2B5EF4-FFF2-40B4-BE49-F238E27FC236}">
+                <a16:creationId xmlns:a16="http://schemas.microsoft.com/office/drawing/2014/main" id="{FFC65380-6100-4CE9-9640-4844C1C406EF}"/>
+              </a:ext>
+            </a:extLst>
+          </p:cNvPr>
+          <p:cNvPicPr>
+            <a:picLocks noChangeAspect="1" noChangeArrowheads="1"/>
+          </p:cNvPicPr>
+          <p:nvPr/>
+        </p:nvPicPr>
+        <p:blipFill>
+          <a:blip r:embed="rId5">
+            <a:extLst>
+              <a:ext uri="{28A0092B-C50C-407E-A947-70E740481C1C}">
+                <a14:useLocalDpi xmlns:a14="http://schemas.microsoft.com/office/drawing/2010/main" val="0"/>
+              </a:ext>
+            </a:extLst>
+          </a:blip>
+          <a:srcRect/>
+          <a:stretch>
+            <a:fillRect/>
+          </a:stretch>
+        </p:blipFill>
+        <p:spPr bwMode="auto">
+          <a:xfrm>
+            <a:off x="4834465" y="4227248"/>
+            <a:ext cx="3262233" cy="2070263"/>
+          </a:xfrm>
+          <a:prstGeom prst="roundRect">
+            <a:avLst>
+              <a:gd name="adj" fmla="val 4167"/>
+            </a:avLst>
+          </a:prstGeom>
+          <a:solidFill>
+            <a:srgbClr val="FFFFFF"/>
+          </a:solidFill>
+          <a:ln w="76200" cap="sq">
+            <a:solidFill>
+              <a:srgbClr val="292929"/>
+            </a:solidFill>
+            <a:miter lim="800000"/>
+          </a:ln>
+          <a:effectLst>
+            <a:reflection blurRad="12700" stA="28000" endPos="28000" dist="5000" dir="5400000" sy="-100000" algn="bl" rotWithShape="0"/>
+          </a:effectLst>
+          <a:scene3d>
+            <a:camera prst="orthographicFront"/>
+            <a:lightRig rig="threePt" dir="t">
+              <a:rot lat="0" lon="0" rev="2700000"/>
+            </a:lightRig>
+          </a:scene3d>
+          <a:sp3d>
+            <a:bevelT h="38100"/>
+            <a:contourClr>
+              <a:srgbClr val="C0C0C0"/>
+            </a:contourClr>
+          </a:sp3d>
+          <a:extLst>
+            <a:ext uri="{909E8E84-426E-40DD-AFC4-6F175D3DCCD1}">
+              <a14:hiddenFill xmlns:a14="http://schemas.microsoft.com/office/drawing/2010/main">
+                <a:solidFill>
+                  <a:srgbClr val="FFFFFF"/>
+                </a:solidFill>
+              </a14:hiddenFill>
+            </a:ext>
+          </a:extLst>
+        </p:spPr>
+      </p:pic>
+    </p:spTree>
+    <p:extLst>
+      <p:ext uri="{BB962C8B-B14F-4D97-AF65-F5344CB8AC3E}">
+        <p14:creationId xmlns:p14="http://schemas.microsoft.com/office/powerpoint/2010/main" val="4045281557"/>
       </p:ext>
     </p:extLst>
   </p:cSld>
@@ -6831,7 +7487,7 @@
         </p:nvSpPr>
         <p:spPr>
           <a:xfrm>
-            <a:off x="1542752" y="1"/>
+            <a:off x="1277707" y="1"/>
             <a:ext cx="6877827" cy="1219200"/>
           </a:xfrm>
         </p:spPr>
@@ -6843,7 +7499,7 @@
           <a:p>
             <a:r>
               <a:rPr lang="pt-PT" dirty="0"/>
-              <a:t>Introdução ao Projeto</a:t>
+              <a:t>Motivação</a:t>
             </a:r>
           </a:p>
         </p:txBody>
@@ -6866,8 +7522,8 @@
         </p:nvSpPr>
         <p:spPr>
           <a:xfrm>
-            <a:off x="689479" y="666750"/>
-            <a:ext cx="7080538" cy="4975989"/>
+            <a:off x="594757" y="860576"/>
+            <a:ext cx="7080538" cy="3314154"/>
           </a:xfrm>
         </p:spPr>
         <p:txBody>
@@ -6877,7 +7533,10 @@
           <a:lstStyle/>
           <a:p>
             <a:r>
-              <a:rPr lang="pt-PT" dirty="0"/>
+              <a:rPr lang="pt-PT" dirty="0">
+                <a:latin typeface="Times New Roman" panose="02020603050405020304" pitchFamily="18" charset="0"/>
+                <a:cs typeface="Times New Roman" panose="02020603050405020304" pitchFamily="18" charset="0"/>
+              </a:rPr>
               <a:t>Problema: Divulgação de projetos de Programação e Segurança</a:t>
             </a:r>
           </a:p>
@@ -6894,10 +7553,10 @@
             <a:endParaRPr lang="pt-PT" dirty="0"/>
           </a:p>
           <a:p>
-            <a:r>
-              <a:rPr lang="pt-PT" dirty="0"/>
-              <a:t>Proposta: Plataforma Web para jogos de segurança</a:t>
-            </a:r>
+            <a:pPr marL="0" indent="0">
+              <a:buNone/>
+            </a:pPr>
+            <a:endParaRPr lang="pt-PT" dirty="0"/>
           </a:p>
         </p:txBody>
       </p:sp>
@@ -6976,8 +7635,8 @@
         </p:blipFill>
         <p:spPr bwMode="auto">
           <a:xfrm>
-            <a:off x="5761943" y="2328585"/>
-            <a:ext cx="1652318" cy="1652318"/>
+            <a:off x="594757" y="1967881"/>
+            <a:ext cx="2043587" cy="2043587"/>
           </a:xfrm>
           <a:prstGeom prst="roundRect">
             <a:avLst>
@@ -7013,10 +7672,10 @@
       </p:pic>
       <p:pic>
         <p:nvPicPr>
-          <p:cNvPr id="3076" name="Picture 4" descr="Resultado de imagem para web platform">
+          <p:cNvPr id="4" name="Picture 2" descr="Resultado de imagem para PC delete">
             <a:extLst>
               <a:ext uri="{FF2B5EF4-FFF2-40B4-BE49-F238E27FC236}">
-                <a16:creationId xmlns:a16="http://schemas.microsoft.com/office/drawing/2014/main" id="{67833637-0E9F-480B-AB3A-0F75DE7CDE87}"/>
+                <a16:creationId xmlns:a16="http://schemas.microsoft.com/office/drawing/2014/main" id="{BA4F7772-5E1D-4D52-BC2F-7F830F94BFD9}"/>
               </a:ext>
             </a:extLst>
           </p:cNvPr>
@@ -7040,8 +7699,253 @@
         </p:blipFill>
         <p:spPr bwMode="auto">
           <a:xfrm>
-            <a:off x="4702019" y="4813998"/>
-            <a:ext cx="2712242" cy="1657481"/>
+            <a:off x="4553267" y="1658848"/>
+            <a:ext cx="4305107" cy="2423118"/>
+          </a:xfrm>
+          <a:prstGeom prst="roundRect">
+            <a:avLst>
+              <a:gd name="adj" fmla="val 4167"/>
+            </a:avLst>
+          </a:prstGeom>
+          <a:solidFill>
+            <a:srgbClr val="FFFFFF"/>
+          </a:solidFill>
+          <a:ln w="76200" cap="sq">
+            <a:solidFill>
+              <a:srgbClr val="292929"/>
+            </a:solidFill>
+            <a:miter lim="800000"/>
+          </a:ln>
+          <a:effectLst>
+            <a:reflection blurRad="12700" stA="28000" endPos="28000" dist="5000" dir="5400000" sy="-100000" algn="bl" rotWithShape="0"/>
+          </a:effectLst>
+          <a:scene3d>
+            <a:camera prst="orthographicFront"/>
+            <a:lightRig rig="threePt" dir="t">
+              <a:rot lat="0" lon="0" rev="2700000"/>
+            </a:lightRig>
+          </a:scene3d>
+          <a:sp3d>
+            <a:bevelT h="38100"/>
+            <a:contourClr>
+              <a:srgbClr val="C0C0C0"/>
+            </a:contourClr>
+          </a:sp3d>
+          <a:extLst>
+            <a:ext uri="{909E8E84-426E-40DD-AFC4-6F175D3DCCD1}">
+              <a14:hiddenFill xmlns:a14="http://schemas.microsoft.com/office/drawing/2010/main">
+                <a:solidFill>
+                  <a:srgbClr val="FFFFFF"/>
+                </a:solidFill>
+              </a14:hiddenFill>
+            </a:ext>
+          </a:extLst>
+        </p:spPr>
+      </p:pic>
+      <p:pic>
+        <p:nvPicPr>
+          <p:cNvPr id="6" name="Picture 4" descr="Resultado de imagem para Computed Hacked">
+            <a:extLst>
+              <a:ext uri="{FF2B5EF4-FFF2-40B4-BE49-F238E27FC236}">
+                <a16:creationId xmlns:a16="http://schemas.microsoft.com/office/drawing/2014/main" id="{7CB19650-0ACC-4638-BCB1-AD0B9ABCEF38}"/>
+              </a:ext>
+            </a:extLst>
+          </p:cNvPr>
+          <p:cNvPicPr>
+            <a:picLocks noChangeAspect="1" noChangeArrowheads="1"/>
+          </p:cNvPicPr>
+          <p:nvPr/>
+        </p:nvPicPr>
+        <p:blipFill>
+          <a:blip r:embed="rId5">
+            <a:extLst>
+              <a:ext uri="{28A0092B-C50C-407E-A947-70E740481C1C}">
+                <a14:useLocalDpi xmlns:a14="http://schemas.microsoft.com/office/drawing/2010/main" val="0"/>
+              </a:ext>
+            </a:extLst>
+          </a:blip>
+          <a:srcRect/>
+          <a:stretch>
+            <a:fillRect/>
+          </a:stretch>
+        </p:blipFill>
+        <p:spPr bwMode="auto">
+          <a:xfrm>
+            <a:off x="2667117" y="4174730"/>
+            <a:ext cx="3974659" cy="2564296"/>
+          </a:xfrm>
+          <a:prstGeom prst="roundRect">
+            <a:avLst>
+              <a:gd name="adj" fmla="val 4167"/>
+            </a:avLst>
+          </a:prstGeom>
+          <a:solidFill>
+            <a:srgbClr val="FFFFFF"/>
+          </a:solidFill>
+          <a:ln w="76200" cap="sq">
+            <a:solidFill>
+              <a:srgbClr val="292929"/>
+            </a:solidFill>
+            <a:miter lim="800000"/>
+          </a:ln>
+          <a:effectLst>
+            <a:reflection blurRad="12700" stA="28000" endPos="28000" dist="5000" dir="5400000" sy="-100000" algn="bl" rotWithShape="0"/>
+          </a:effectLst>
+          <a:scene3d>
+            <a:camera prst="orthographicFront"/>
+            <a:lightRig rig="threePt" dir="t">
+              <a:rot lat="0" lon="0" rev="2700000"/>
+            </a:lightRig>
+          </a:scene3d>
+          <a:sp3d>
+            <a:bevelT h="38100"/>
+            <a:contourClr>
+              <a:srgbClr val="C0C0C0"/>
+            </a:contourClr>
+          </a:sp3d>
+          <a:extLst>
+            <a:ext uri="{909E8E84-426E-40DD-AFC4-6F175D3DCCD1}">
+              <a14:hiddenFill xmlns:a14="http://schemas.microsoft.com/office/drawing/2010/main">
+                <a:solidFill>
+                  <a:srgbClr val="FFFFFF"/>
+                </a:solidFill>
+              </a14:hiddenFill>
+            </a:ext>
+          </a:extLst>
+        </p:spPr>
+      </p:pic>
+    </p:spTree>
+    <p:extLst>
+      <p:ext uri="{BB962C8B-B14F-4D97-AF65-F5344CB8AC3E}">
+        <p14:creationId xmlns:p14="http://schemas.microsoft.com/office/powerpoint/2010/main" val="2766241932"/>
+      </p:ext>
+    </p:extLst>
+  </p:cSld>
+  <p:clrMapOvr>
+    <a:masterClrMapping/>
+  </p:clrMapOvr>
+</p:sld>
+</file>
+
+<file path=ppt/slides/slide3.xml><?xml version="1.0" encoding="utf-8"?>
+<p:sld xmlns:a="http://schemas.openxmlformats.org/drawingml/2006/main" xmlns:r="http://schemas.openxmlformats.org/officeDocument/2006/relationships" xmlns:p="http://schemas.openxmlformats.org/presentationml/2006/main">
+  <p:cSld>
+    <p:spTree>
+      <p:nvGrpSpPr>
+        <p:cNvPr id="1" name=""/>
+        <p:cNvGrpSpPr/>
+        <p:nvPr/>
+      </p:nvGrpSpPr>
+      <p:grpSpPr>
+        <a:xfrm>
+          <a:off x="0" y="0"/>
+          <a:ext cx="0" cy="0"/>
+          <a:chOff x="0" y="0"/>
+          <a:chExt cx="0" cy="0"/>
+        </a:xfrm>
+      </p:grpSpPr>
+      <p:sp>
+        <p:nvSpPr>
+          <p:cNvPr id="4" name="Marcador de Posição do Número do Diapositivo 3">
+            <a:extLst>
+              <a:ext uri="{FF2B5EF4-FFF2-40B4-BE49-F238E27FC236}">
+                <a16:creationId xmlns:a16="http://schemas.microsoft.com/office/drawing/2014/main" id="{49A42431-EF08-457C-95A9-CB2B9DC90DBE}"/>
+              </a:ext>
+            </a:extLst>
+          </p:cNvPr>
+          <p:cNvSpPr>
+            <a:spLocks noGrp="1"/>
+          </p:cNvSpPr>
+          <p:nvPr>
+            <p:ph type="sldNum" sz="quarter" idx="12"/>
+          </p:nvPr>
+        </p:nvSpPr>
+        <p:spPr>
+          <a:xfrm>
+            <a:off x="8258967" y="6108173"/>
+            <a:ext cx="427833" cy="365125"/>
+          </a:xfrm>
+        </p:spPr>
+        <p:txBody>
+          <a:bodyPr/>
+          <a:lstStyle/>
+          <a:p>
+            <a:fld id="{D57F1E4F-1CFF-5643-939E-217C01CDF565}" type="slidenum">
+              <a:rPr lang="en-US" smtClean="0"/>
+              <a:pPr/>
+              <a:t>3</a:t>
+            </a:fld>
+            <a:endParaRPr lang="en-US" dirty="0"/>
+          </a:p>
+        </p:txBody>
+      </p:sp>
+      <p:sp>
+        <p:nvSpPr>
+          <p:cNvPr id="5" name="Título 1">
+            <a:extLst>
+              <a:ext uri="{FF2B5EF4-FFF2-40B4-BE49-F238E27FC236}">
+                <a16:creationId xmlns:a16="http://schemas.microsoft.com/office/drawing/2014/main" id="{CA1F277A-F535-410C-81F5-3BEBBC6A0E18}"/>
+              </a:ext>
+            </a:extLst>
+          </p:cNvPr>
+          <p:cNvSpPr>
+            <a:spLocks noGrp="1"/>
+          </p:cNvSpPr>
+          <p:nvPr>
+            <p:ph type="title"/>
+          </p:nvPr>
+        </p:nvSpPr>
+        <p:spPr>
+          <a:xfrm>
+            <a:off x="1542752" y="1"/>
+            <a:ext cx="6877827" cy="1219200"/>
+          </a:xfrm>
+        </p:spPr>
+        <p:txBody>
+          <a:bodyPr>
+            <a:normAutofit/>
+          </a:bodyPr>
+          <a:lstStyle/>
+          <a:p>
+            <a:r>
+              <a:rPr lang="pt-PT"/>
+              <a:t>Solução Encontrada</a:t>
+            </a:r>
+            <a:endParaRPr lang="pt-PT" dirty="0"/>
+          </a:p>
+        </p:txBody>
+      </p:sp>
+      <p:pic>
+        <p:nvPicPr>
+          <p:cNvPr id="6" name="Picture 4" descr="Resultado de imagem para web platform">
+            <a:extLst>
+              <a:ext uri="{FF2B5EF4-FFF2-40B4-BE49-F238E27FC236}">
+                <a16:creationId xmlns:a16="http://schemas.microsoft.com/office/drawing/2014/main" id="{FFBF4424-1277-4D35-B826-69BC307E3121}"/>
+              </a:ext>
+            </a:extLst>
+          </p:cNvPr>
+          <p:cNvPicPr>
+            <a:picLocks noChangeAspect="1" noChangeArrowheads="1"/>
+          </p:cNvPicPr>
+          <p:nvPr/>
+        </p:nvPicPr>
+        <p:blipFill>
+          <a:blip r:embed="rId2">
+            <a:extLst>
+              <a:ext uri="{28A0092B-C50C-407E-A947-70E740481C1C}">
+                <a14:useLocalDpi xmlns:a14="http://schemas.microsoft.com/office/drawing/2010/main" val="0"/>
+              </a:ext>
+            </a:extLst>
+          </a:blip>
+          <a:srcRect/>
+          <a:stretch>
+            <a:fillRect/>
+          </a:stretch>
+        </p:blipFill>
+        <p:spPr bwMode="auto">
+          <a:xfrm>
+            <a:off x="885033" y="1278257"/>
+            <a:ext cx="3903431" cy="2385430"/>
           </a:xfrm>
           <a:prstGeom prst="roundRect">
             <a:avLst>
@@ -7075,10 +7979,129 @@
           <a:extLst/>
         </p:spPr>
       </p:pic>
+      <p:pic>
+        <p:nvPicPr>
+          <p:cNvPr id="43" name="Picture 4" descr="Resultado de imagem para Cybersecurity knowledge">
+            <a:extLst>
+              <a:ext uri="{FF2B5EF4-FFF2-40B4-BE49-F238E27FC236}">
+                <a16:creationId xmlns:a16="http://schemas.microsoft.com/office/drawing/2014/main" id="{F19D0739-8909-46A1-A795-4209D89B9175}"/>
+              </a:ext>
+            </a:extLst>
+          </p:cNvPr>
+          <p:cNvPicPr>
+            <a:picLocks noChangeAspect="1" noChangeArrowheads="1"/>
+          </p:cNvPicPr>
+          <p:nvPr/>
+        </p:nvPicPr>
+        <p:blipFill>
+          <a:blip r:embed="rId3">
+            <a:extLst>
+              <a:ext uri="{28A0092B-C50C-407E-A947-70E740481C1C}">
+                <a14:useLocalDpi xmlns:a14="http://schemas.microsoft.com/office/drawing/2010/main" val="0"/>
+              </a:ext>
+            </a:extLst>
+          </a:blip>
+          <a:srcRect/>
+          <a:stretch>
+            <a:fillRect/>
+          </a:stretch>
+        </p:blipFill>
+        <p:spPr bwMode="auto">
+          <a:xfrm>
+            <a:off x="4572000" y="3858456"/>
+            <a:ext cx="4305106" cy="2249717"/>
+          </a:xfrm>
+          <a:prstGeom prst="roundRect">
+            <a:avLst>
+              <a:gd name="adj" fmla="val 4167"/>
+            </a:avLst>
+          </a:prstGeom>
+          <a:solidFill>
+            <a:srgbClr val="FFFFFF"/>
+          </a:solidFill>
+          <a:ln w="76200" cap="sq">
+            <a:solidFill>
+              <a:srgbClr val="292929"/>
+            </a:solidFill>
+            <a:miter lim="800000"/>
+          </a:ln>
+          <a:effectLst>
+            <a:reflection blurRad="12700" stA="28000" endPos="28000" dist="5000" dir="5400000" sy="-100000" algn="bl" rotWithShape="0"/>
+          </a:effectLst>
+          <a:scene3d>
+            <a:camera prst="orthographicFront"/>
+            <a:lightRig rig="threePt" dir="t">
+              <a:rot lat="0" lon="0" rev="2700000"/>
+            </a:lightRig>
+          </a:scene3d>
+          <a:sp3d>
+            <a:bevelT h="38100"/>
+            <a:contourClr>
+              <a:srgbClr val="C0C0C0"/>
+            </a:contourClr>
+          </a:sp3d>
+          <a:extLst>
+            <a:ext uri="{909E8E84-426E-40DD-AFC4-6F175D3DCCD1}">
+              <a14:hiddenFill xmlns:a14="http://schemas.microsoft.com/office/drawing/2010/main">
+                <a:solidFill>
+                  <a:srgbClr val="FFFFFF"/>
+                </a:solidFill>
+              </a14:hiddenFill>
+            </a:ext>
+          </a:extLst>
+        </p:spPr>
+      </p:pic>
+      <p:sp>
+        <p:nvSpPr>
+          <p:cNvPr id="55" name="Marcador de Posição de Conteúdo 2">
+            <a:extLst>
+              <a:ext uri="{FF2B5EF4-FFF2-40B4-BE49-F238E27FC236}">
+                <a16:creationId xmlns:a16="http://schemas.microsoft.com/office/drawing/2014/main" id="{F78E5346-CB76-4A53-88DC-5338BE250897}"/>
+              </a:ext>
+            </a:extLst>
+          </p:cNvPr>
+          <p:cNvSpPr>
+            <a:spLocks noGrp="1"/>
+          </p:cNvSpPr>
+          <p:nvPr>
+            <p:ph idx="1"/>
+          </p:nvPr>
+        </p:nvSpPr>
+        <p:spPr>
+          <a:xfrm>
+            <a:off x="5096933" y="1046923"/>
+            <a:ext cx="3589867" cy="2249717"/>
+          </a:xfrm>
+        </p:spPr>
+        <p:txBody>
+          <a:bodyPr>
+            <a:normAutofit/>
+          </a:bodyPr>
+          <a:lstStyle/>
+          <a:p>
+            <a:pPr>
+              <a:buFont typeface="Arial" panose="020B0604020202020204" pitchFamily="34" charset="0"/>
+              <a:buChar char="•"/>
+            </a:pPr>
+            <a:r>
+              <a:rPr lang="pt-PT" dirty="0"/>
+              <a:t>Desenvolvimento de uma plataforma </a:t>
+            </a:r>
+            <a:r>
+              <a:rPr lang="pt-PT" i="1" dirty="0"/>
+              <a:t>web</a:t>
+            </a:r>
+            <a:r>
+              <a:rPr lang="pt-PT" dirty="0"/>
+              <a:t> de aprendizagem</a:t>
+            </a:r>
+          </a:p>
+        </p:txBody>
+      </p:sp>
     </p:spTree>
     <p:extLst>
       <p:ext uri="{BB962C8B-B14F-4D97-AF65-F5344CB8AC3E}">
-        <p14:creationId xmlns:p14="http://schemas.microsoft.com/office/powerpoint/2010/main" val="2766241932"/>
+        <p14:creationId xmlns:p14="http://schemas.microsoft.com/office/powerpoint/2010/main" val="37937050"/>
       </p:ext>
     </p:extLst>
   </p:cSld>
@@ -7088,7 +8111,7 @@
 </p:sld>
 </file>
 
-<file path=ppt/slides/slide3.xml><?xml version="1.0" encoding="utf-8"?>
+<file path=ppt/slides/slide4.xml><?xml version="1.0" encoding="utf-8"?>
 <p:sld xmlns:a="http://schemas.openxmlformats.org/drawingml/2006/main" xmlns:r="http://schemas.openxmlformats.org/officeDocument/2006/relationships" xmlns:p="http://schemas.openxmlformats.org/presentationml/2006/main">
   <p:cSld>
     <p:bg>
@@ -7201,15 +8224,6 @@
           <a:p>
             <a:r>
               <a:rPr lang="pt-PT" sz="2200" dirty="0"/>
-              <a:t>Plataforma Online</a:t>
-            </a:r>
-          </a:p>
-          <a:p>
-            <a:endParaRPr lang="pt-PT" sz="2200" dirty="0"/>
-          </a:p>
-          <a:p>
-            <a:r>
-              <a:rPr lang="pt-PT" sz="2200" dirty="0"/>
               <a:t>Competições de </a:t>
             </a:r>
             <a:r>
@@ -7228,15 +8242,36 @@
             </a:r>
           </a:p>
           <a:p>
+            <a:pPr marL="0" indent="0">
+              <a:buNone/>
+            </a:pPr>
+            <a:r>
+              <a:rPr lang="pt-PT" sz="2200" dirty="0"/>
+              <a:t>aos desafios.</a:t>
+            </a:r>
+          </a:p>
+          <a:p>
             <a:endParaRPr lang="pt-PT" sz="2200" dirty="0"/>
           </a:p>
           <a:p>
             <a:r>
               <a:rPr lang="pt-PT" sz="2200" dirty="0"/>
-              <a:t>Inserção de Propostas</a:t>
-            </a:r>
-          </a:p>
-          <a:p>
+              <a:t>Inserção de Propostas de desafios e</a:t>
+            </a:r>
+          </a:p>
+          <a:p>
+            <a:pPr marL="0" indent="0">
+              <a:buNone/>
+            </a:pPr>
+            <a:r>
+              <a:rPr lang="pt-PT" sz="2200" dirty="0"/>
+              <a:t>perguntas de escolha múltipla</a:t>
+            </a:r>
+          </a:p>
+          <a:p>
+            <a:pPr marL="0" indent="0">
+              <a:buNone/>
+            </a:pPr>
             <a:endParaRPr lang="pt-PT" sz="2200" dirty="0"/>
           </a:p>
           <a:p>
@@ -7247,9 +8282,6 @@
             <a:endParaRPr lang="pt-PT" sz="2200" dirty="0"/>
           </a:p>
           <a:p>
-            <a:pPr marL="0" indent="0">
-              <a:buNone/>
-            </a:pPr>
             <a:endParaRPr lang="pt-PT" sz="2200" dirty="0"/>
           </a:p>
           <a:p>
@@ -7310,12 +8342,84 @@
                   <a:spcPts val="600"/>
                 </a:spcAft>
               </a:pPr>
-              <a:t>3</a:t>
+              <a:t>4</a:t>
             </a:fld>
             <a:endParaRPr lang="en-US"/>
           </a:p>
         </p:txBody>
       </p:sp>
+      <p:pic>
+        <p:nvPicPr>
+          <p:cNvPr id="5" name="Picture 2" descr="Imagem relacionada">
+            <a:extLst>
+              <a:ext uri="{FF2B5EF4-FFF2-40B4-BE49-F238E27FC236}">
+                <a16:creationId xmlns:a16="http://schemas.microsoft.com/office/drawing/2014/main" id="{A14ED2B3-3AA0-4E53-B3D7-849660A3A8C8}"/>
+              </a:ext>
+            </a:extLst>
+          </p:cNvPr>
+          <p:cNvPicPr>
+            <a:picLocks noChangeAspect="1" noChangeArrowheads="1"/>
+          </p:cNvPicPr>
+          <p:nvPr/>
+        </p:nvPicPr>
+        <p:blipFill>
+          <a:blip r:embed="rId3">
+            <a:extLst>
+              <a:ext uri="{28A0092B-C50C-407E-A947-70E740481C1C}">
+                <a14:useLocalDpi xmlns:a14="http://schemas.microsoft.com/office/drawing/2010/main" val="0"/>
+              </a:ext>
+            </a:extLst>
+          </a:blip>
+          <a:srcRect/>
+          <a:stretch>
+            <a:fillRect/>
+          </a:stretch>
+        </p:blipFill>
+        <p:spPr bwMode="auto">
+          <a:xfrm>
+            <a:off x="5690656" y="1722783"/>
+            <a:ext cx="3104445" cy="2328334"/>
+          </a:xfrm>
+          <a:prstGeom prst="roundRect">
+            <a:avLst>
+              <a:gd name="adj" fmla="val 4167"/>
+            </a:avLst>
+          </a:prstGeom>
+          <a:solidFill>
+            <a:srgbClr val="FFFFFF"/>
+          </a:solidFill>
+          <a:ln w="76200" cap="sq">
+            <a:solidFill>
+              <a:srgbClr val="292929"/>
+            </a:solidFill>
+            <a:miter lim="800000"/>
+          </a:ln>
+          <a:effectLst>
+            <a:reflection blurRad="12700" stA="28000" endPos="28000" dist="5000" dir="5400000" sy="-100000" algn="bl" rotWithShape="0"/>
+          </a:effectLst>
+          <a:scene3d>
+            <a:camera prst="orthographicFront"/>
+            <a:lightRig rig="threePt" dir="t">
+              <a:rot lat="0" lon="0" rev="2700000"/>
+            </a:lightRig>
+          </a:scene3d>
+          <a:sp3d>
+            <a:bevelT h="38100"/>
+            <a:contourClr>
+              <a:srgbClr val="C0C0C0"/>
+            </a:contourClr>
+          </a:sp3d>
+          <a:extLst>
+            <a:ext uri="{909E8E84-426E-40DD-AFC4-6F175D3DCCD1}">
+              <a14:hiddenFill xmlns:a14="http://schemas.microsoft.com/office/drawing/2010/main">
+                <a:solidFill>
+                  <a:srgbClr val="FFFFFF"/>
+                </a:solidFill>
+              </a14:hiddenFill>
+            </a:ext>
+          </a:extLst>
+        </p:spPr>
+      </p:pic>
     </p:spTree>
     <p:extLst>
       <p:ext uri="{BB962C8B-B14F-4D97-AF65-F5344CB8AC3E}">
@@ -7329,7 +8433,7 @@
 </p:sld>
 </file>
 
-<file path=ppt/slides/slide4.xml><?xml version="1.0" encoding="utf-8"?>
+<file path=ppt/slides/slide5.xml><?xml version="1.0" encoding="utf-8"?>
 <p:sld xmlns:a="http://schemas.openxmlformats.org/drawingml/2006/main" xmlns:r="http://schemas.openxmlformats.org/officeDocument/2006/relationships" xmlns:p="http://schemas.openxmlformats.org/presentationml/2006/main">
   <p:cSld>
     <p:spTree>
@@ -7408,7 +8512,7 @@
             <a:fld id="{D57F1E4F-1CFF-5643-939E-217C01CDF565}" type="slidenum">
               <a:rPr lang="en-US" smtClean="0"/>
               <a:pPr/>
-              <a:t>4</a:t>
+              <a:t>5</a:t>
             </a:fld>
             <a:endParaRPr lang="en-US" dirty="0"/>
           </a:p>
@@ -8832,6 +9936,284 @@
           </a:extLst>
         </p:spPr>
       </p:pic>
+      <p:sp>
+        <p:nvSpPr>
+          <p:cNvPr id="36" name="CaixaDeTexto 35">
+            <a:extLst>
+              <a:ext uri="{FF2B5EF4-FFF2-40B4-BE49-F238E27FC236}">
+                <a16:creationId xmlns:a16="http://schemas.microsoft.com/office/drawing/2014/main" id="{940BF4D3-5C00-4F77-9E94-8F5D987DAB4F}"/>
+              </a:ext>
+            </a:extLst>
+          </p:cNvPr>
+          <p:cNvSpPr txBox="1"/>
+          <p:nvPr/>
+        </p:nvSpPr>
+        <p:spPr>
+          <a:xfrm>
+            <a:off x="7853866" y="987504"/>
+            <a:ext cx="1358064" cy="584775"/>
+          </a:xfrm>
+          <a:prstGeom prst="rect">
+            <a:avLst/>
+          </a:prstGeom>
+          <a:noFill/>
+        </p:spPr>
+        <p:txBody>
+          <a:bodyPr wrap="none" rtlCol="0">
+            <a:spAutoFit/>
+          </a:bodyPr>
+          <a:lstStyle/>
+          <a:p>
+            <a:pPr algn="ctr"/>
+            <a:r>
+              <a:rPr lang="pt-PT" sz="1600" dirty="0"/>
+              <a:t>Sistema de</a:t>
+            </a:r>
+          </a:p>
+          <a:p>
+            <a:pPr algn="ctr"/>
+            <a:r>
+              <a:rPr lang="pt-PT" sz="1600" dirty="0"/>
+              <a:t>Classificações</a:t>
+            </a:r>
+          </a:p>
+        </p:txBody>
+      </p:sp>
+      <p:pic>
+        <p:nvPicPr>
+          <p:cNvPr id="37" name="Picture 4" descr="Resultado de imagem para check png">
+            <a:extLst>
+              <a:ext uri="{FF2B5EF4-FFF2-40B4-BE49-F238E27FC236}">
+                <a16:creationId xmlns:a16="http://schemas.microsoft.com/office/drawing/2014/main" id="{3F53ED0A-A0CE-4CCB-AC88-43FC3333EFC1}"/>
+              </a:ext>
+            </a:extLst>
+          </p:cNvPr>
+          <p:cNvPicPr>
+            <a:picLocks noChangeAspect="1" noChangeArrowheads="1"/>
+          </p:cNvPicPr>
+          <p:nvPr/>
+        </p:nvPicPr>
+        <p:blipFill>
+          <a:blip r:embed="rId8">
+            <a:extLst>
+              <a:ext uri="{28A0092B-C50C-407E-A947-70E740481C1C}">
+                <a14:useLocalDpi xmlns:a14="http://schemas.microsoft.com/office/drawing/2010/main" val="0"/>
+              </a:ext>
+            </a:extLst>
+          </a:blip>
+          <a:srcRect/>
+          <a:stretch>
+            <a:fillRect/>
+          </a:stretch>
+        </p:blipFill>
+        <p:spPr bwMode="auto">
+          <a:xfrm>
+            <a:off x="8077477" y="4752420"/>
+            <a:ext cx="790225" cy="790225"/>
+          </a:xfrm>
+          <a:prstGeom prst="rect">
+            <a:avLst/>
+          </a:prstGeom>
+          <a:noFill/>
+          <a:extLst>
+            <a:ext uri="{909E8E84-426E-40DD-AFC4-6F175D3DCCD1}">
+              <a14:hiddenFill xmlns:a14="http://schemas.microsoft.com/office/drawing/2010/main">
+                <a:solidFill>
+                  <a:srgbClr val="FFFFFF"/>
+                </a:solidFill>
+              </a14:hiddenFill>
+            </a:ext>
+          </a:extLst>
+        </p:spPr>
+      </p:pic>
+      <p:pic>
+        <p:nvPicPr>
+          <p:cNvPr id="38" name="Picture 4" descr="Resultado de imagem para check png">
+            <a:extLst>
+              <a:ext uri="{FF2B5EF4-FFF2-40B4-BE49-F238E27FC236}">
+                <a16:creationId xmlns:a16="http://schemas.microsoft.com/office/drawing/2014/main" id="{27F83467-C283-4D92-AD38-F8546B5FC9B9}"/>
+              </a:ext>
+            </a:extLst>
+          </p:cNvPr>
+          <p:cNvPicPr>
+            <a:picLocks noChangeAspect="1" noChangeArrowheads="1"/>
+          </p:cNvPicPr>
+          <p:nvPr/>
+        </p:nvPicPr>
+        <p:blipFill>
+          <a:blip r:embed="rId8">
+            <a:extLst>
+              <a:ext uri="{28A0092B-C50C-407E-A947-70E740481C1C}">
+                <a14:useLocalDpi xmlns:a14="http://schemas.microsoft.com/office/drawing/2010/main" val="0"/>
+              </a:ext>
+            </a:extLst>
+          </a:blip>
+          <a:srcRect/>
+          <a:stretch>
+            <a:fillRect/>
+          </a:stretch>
+        </p:blipFill>
+        <p:spPr bwMode="auto">
+          <a:xfrm>
+            <a:off x="8077477" y="2548786"/>
+            <a:ext cx="790225" cy="790225"/>
+          </a:xfrm>
+          <a:prstGeom prst="rect">
+            <a:avLst/>
+          </a:prstGeom>
+          <a:noFill/>
+          <a:extLst>
+            <a:ext uri="{909E8E84-426E-40DD-AFC4-6F175D3DCCD1}">
+              <a14:hiddenFill xmlns:a14="http://schemas.microsoft.com/office/drawing/2010/main">
+                <a:solidFill>
+                  <a:srgbClr val="FFFFFF"/>
+                </a:solidFill>
+              </a14:hiddenFill>
+            </a:ext>
+          </a:extLst>
+        </p:spPr>
+      </p:pic>
+      <p:pic>
+        <p:nvPicPr>
+          <p:cNvPr id="39" name="Picture 4" descr="Resultado de imagem para check png">
+            <a:extLst>
+              <a:ext uri="{FF2B5EF4-FFF2-40B4-BE49-F238E27FC236}">
+                <a16:creationId xmlns:a16="http://schemas.microsoft.com/office/drawing/2014/main" id="{299CEA90-FDCB-4F22-82D0-A8383EE0D692}"/>
+              </a:ext>
+            </a:extLst>
+          </p:cNvPr>
+          <p:cNvPicPr>
+            <a:picLocks noChangeAspect="1" noChangeArrowheads="1"/>
+          </p:cNvPicPr>
+          <p:nvPr/>
+        </p:nvPicPr>
+        <p:blipFill>
+          <a:blip r:embed="rId8">
+            <a:extLst>
+              <a:ext uri="{28A0092B-C50C-407E-A947-70E740481C1C}">
+                <a14:useLocalDpi xmlns:a14="http://schemas.microsoft.com/office/drawing/2010/main" val="0"/>
+              </a:ext>
+            </a:extLst>
+          </a:blip>
+          <a:srcRect/>
+          <a:stretch>
+            <a:fillRect/>
+          </a:stretch>
+        </p:blipFill>
+        <p:spPr bwMode="auto">
+          <a:xfrm>
+            <a:off x="8137031" y="3628514"/>
+            <a:ext cx="790225" cy="790225"/>
+          </a:xfrm>
+          <a:prstGeom prst="rect">
+            <a:avLst/>
+          </a:prstGeom>
+          <a:noFill/>
+          <a:extLst>
+            <a:ext uri="{909E8E84-426E-40DD-AFC4-6F175D3DCCD1}">
+              <a14:hiddenFill xmlns:a14="http://schemas.microsoft.com/office/drawing/2010/main">
+                <a:solidFill>
+                  <a:srgbClr val="FFFFFF"/>
+                </a:solidFill>
+              </a14:hiddenFill>
+            </a:ext>
+          </a:extLst>
+        </p:spPr>
+      </p:pic>
+      <p:pic>
+        <p:nvPicPr>
+          <p:cNvPr id="40" name="Picture 4" descr="Resultado de imagem para check png">
+            <a:extLst>
+              <a:ext uri="{FF2B5EF4-FFF2-40B4-BE49-F238E27FC236}">
+                <a16:creationId xmlns:a16="http://schemas.microsoft.com/office/drawing/2014/main" id="{DFC5D654-B4CC-4F39-8BBD-23527D351263}"/>
+              </a:ext>
+            </a:extLst>
+          </p:cNvPr>
+          <p:cNvPicPr>
+            <a:picLocks noChangeAspect="1" noChangeArrowheads="1"/>
+          </p:cNvPicPr>
+          <p:nvPr/>
+        </p:nvPicPr>
+        <p:blipFill>
+          <a:blip r:embed="rId8">
+            <a:extLst>
+              <a:ext uri="{28A0092B-C50C-407E-A947-70E740481C1C}">
+                <a14:useLocalDpi xmlns:a14="http://schemas.microsoft.com/office/drawing/2010/main" val="0"/>
+              </a:ext>
+            </a:extLst>
+          </a:blip>
+          <a:srcRect/>
+          <a:stretch>
+            <a:fillRect/>
+          </a:stretch>
+        </p:blipFill>
+        <p:spPr bwMode="auto">
+          <a:xfrm>
+            <a:off x="8228424" y="5916082"/>
+            <a:ext cx="790225" cy="790225"/>
+          </a:xfrm>
+          <a:prstGeom prst="rect">
+            <a:avLst/>
+          </a:prstGeom>
+          <a:noFill/>
+          <a:extLst>
+            <a:ext uri="{909E8E84-426E-40DD-AFC4-6F175D3DCCD1}">
+              <a14:hiddenFill xmlns:a14="http://schemas.microsoft.com/office/drawing/2010/main">
+                <a:solidFill>
+                  <a:srgbClr val="FFFFFF"/>
+                </a:solidFill>
+              </a14:hiddenFill>
+            </a:ext>
+          </a:extLst>
+        </p:spPr>
+      </p:pic>
+      <p:pic>
+        <p:nvPicPr>
+          <p:cNvPr id="41" name="Picture 4" descr="Resultado de imagem para check png">
+            <a:extLst>
+              <a:ext uri="{FF2B5EF4-FFF2-40B4-BE49-F238E27FC236}">
+                <a16:creationId xmlns:a16="http://schemas.microsoft.com/office/drawing/2014/main" id="{AC1DF2C8-2FE5-450F-A37C-0835FD38C8DA}"/>
+              </a:ext>
+            </a:extLst>
+          </p:cNvPr>
+          <p:cNvPicPr>
+            <a:picLocks noChangeAspect="1" noChangeArrowheads="1"/>
+          </p:cNvPicPr>
+          <p:nvPr/>
+        </p:nvPicPr>
+        <p:blipFill>
+          <a:blip r:embed="rId8">
+            <a:extLst>
+              <a:ext uri="{28A0092B-C50C-407E-A947-70E740481C1C}">
+                <a14:useLocalDpi xmlns:a14="http://schemas.microsoft.com/office/drawing/2010/main" val="0"/>
+              </a:ext>
+            </a:extLst>
+          </a:blip>
+          <a:srcRect/>
+          <a:stretch>
+            <a:fillRect/>
+          </a:stretch>
+        </p:blipFill>
+        <p:spPr bwMode="auto">
+          <a:xfrm>
+            <a:off x="8180200" y="1552879"/>
+            <a:ext cx="790225" cy="790225"/>
+          </a:xfrm>
+          <a:prstGeom prst="rect">
+            <a:avLst/>
+          </a:prstGeom>
+          <a:noFill/>
+          <a:extLst>
+            <a:ext uri="{909E8E84-426E-40DD-AFC4-6F175D3DCCD1}">
+              <a14:hiddenFill xmlns:a14="http://schemas.microsoft.com/office/drawing/2010/main">
+                <a:solidFill>
+                  <a:srgbClr val="FFFFFF"/>
+                </a:solidFill>
+              </a14:hiddenFill>
+            </a:ext>
+          </a:extLst>
+        </p:spPr>
+      </p:pic>
     </p:spTree>
     <p:extLst>
       <p:ext uri="{BB962C8B-B14F-4D97-AF65-F5344CB8AC3E}">
@@ -8845,7 +10227,7 @@
 </p:sld>
 </file>
 
-<file path=ppt/slides/slide5.xml><?xml version="1.0" encoding="utf-8"?>
+<file path=ppt/slides/slide6.xml><?xml version="1.0" encoding="utf-8"?>
 <p:sld xmlns:a="http://schemas.openxmlformats.org/drawingml/2006/main" xmlns:r="http://schemas.openxmlformats.org/officeDocument/2006/relationships" xmlns:p="http://schemas.openxmlformats.org/presentationml/2006/main">
   <p:cSld>
     <p:spTree>
@@ -8919,7 +10301,7 @@
             <a:fld id="{D57F1E4F-1CFF-5643-939E-217C01CDF565}" type="slidenum">
               <a:rPr lang="en-US" smtClean="0"/>
               <a:pPr/>
-              <a:t>5</a:t>
+              <a:t>6</a:t>
             </a:fld>
             <a:endParaRPr lang="en-US" dirty="0"/>
           </a:p>
@@ -8993,6 +10375,793 @@
     <p:extLst>
       <p:ext uri="{BB962C8B-B14F-4D97-AF65-F5344CB8AC3E}">
         <p14:creationId xmlns:p14="http://schemas.microsoft.com/office/powerpoint/2010/main" val="192111094"/>
+      </p:ext>
+    </p:extLst>
+  </p:cSld>
+  <p:clrMapOvr>
+    <a:masterClrMapping/>
+  </p:clrMapOvr>
+</p:sld>
+</file>
+
+<file path=ppt/slides/slide7.xml><?xml version="1.0" encoding="utf-8"?>
+<p:sld xmlns:a="http://schemas.openxmlformats.org/drawingml/2006/main" xmlns:r="http://schemas.openxmlformats.org/officeDocument/2006/relationships" xmlns:p="http://schemas.openxmlformats.org/presentationml/2006/main">
+  <p:cSld>
+    <p:spTree>
+      <p:nvGrpSpPr>
+        <p:cNvPr id="1" name=""/>
+        <p:cNvGrpSpPr/>
+        <p:nvPr/>
+      </p:nvGrpSpPr>
+      <p:grpSpPr>
+        <a:xfrm>
+          <a:off x="0" y="0"/>
+          <a:ext cx="0" cy="0"/>
+          <a:chOff x="0" y="0"/>
+          <a:chExt cx="0" cy="0"/>
+        </a:xfrm>
+      </p:grpSpPr>
+      <p:sp>
+        <p:nvSpPr>
+          <p:cNvPr id="4" name="Marcador de Posição do Número do Diapositivo 3">
+            <a:extLst>
+              <a:ext uri="{FF2B5EF4-FFF2-40B4-BE49-F238E27FC236}">
+                <a16:creationId xmlns:a16="http://schemas.microsoft.com/office/drawing/2014/main" id="{0E09A64B-F68A-4E2E-9766-000EF8F0FE90}"/>
+              </a:ext>
+            </a:extLst>
+          </p:cNvPr>
+          <p:cNvSpPr>
+            <a:spLocks noGrp="1"/>
+          </p:cNvSpPr>
+          <p:nvPr>
+            <p:ph type="sldNum" sz="quarter" idx="12"/>
+          </p:nvPr>
+        </p:nvSpPr>
+        <p:spPr/>
+        <p:txBody>
+          <a:bodyPr/>
+          <a:lstStyle/>
+          <a:p>
+            <a:fld id="{D57F1E4F-1CFF-5643-939E-217C01CDF565}" type="slidenum">
+              <a:rPr lang="en-US" smtClean="0"/>
+              <a:pPr/>
+              <a:t>7</a:t>
+            </a:fld>
+            <a:endParaRPr lang="en-US" dirty="0"/>
+          </a:p>
+        </p:txBody>
+      </p:sp>
+      <p:sp>
+        <p:nvSpPr>
+          <p:cNvPr id="5" name="Título 1">
+            <a:extLst>
+              <a:ext uri="{FF2B5EF4-FFF2-40B4-BE49-F238E27FC236}">
+                <a16:creationId xmlns:a16="http://schemas.microsoft.com/office/drawing/2014/main" id="{4C5FBF05-5F53-455F-84CB-EC04F48B85F0}"/>
+              </a:ext>
+            </a:extLst>
+          </p:cNvPr>
+          <p:cNvSpPr>
+            <a:spLocks noGrp="1"/>
+          </p:cNvSpPr>
+          <p:nvPr>
+            <p:ph type="title"/>
+          </p:nvPr>
+        </p:nvSpPr>
+        <p:spPr>
+          <a:xfrm>
+            <a:off x="982132" y="-1"/>
+            <a:ext cx="7704667" cy="1179443"/>
+          </a:xfrm>
+        </p:spPr>
+        <p:txBody>
+          <a:bodyPr/>
+          <a:lstStyle/>
+          <a:p>
+            <a:r>
+              <a:rPr lang="pt-PT" dirty="0"/>
+              <a:t>Tecnologias Usadas</a:t>
+            </a:r>
+          </a:p>
+        </p:txBody>
+      </p:sp>
+      <p:pic>
+        <p:nvPicPr>
+          <p:cNvPr id="5122" name="Picture 2" descr="Resultado de imagem para ReactJS">
+            <a:extLst>
+              <a:ext uri="{FF2B5EF4-FFF2-40B4-BE49-F238E27FC236}">
+                <a16:creationId xmlns:a16="http://schemas.microsoft.com/office/drawing/2014/main" id="{2CBACC0E-BEA6-46B8-B46C-11A6D59FDE20}"/>
+              </a:ext>
+            </a:extLst>
+          </p:cNvPr>
+          <p:cNvPicPr>
+            <a:picLocks noChangeAspect="1" noChangeArrowheads="1"/>
+          </p:cNvPicPr>
+          <p:nvPr/>
+        </p:nvPicPr>
+        <p:blipFill>
+          <a:blip r:embed="rId2">
+            <a:extLst>
+              <a:ext uri="{28A0092B-C50C-407E-A947-70E740481C1C}">
+                <a14:useLocalDpi xmlns:a14="http://schemas.microsoft.com/office/drawing/2010/main" val="0"/>
+              </a:ext>
+            </a:extLst>
+          </a:blip>
+          <a:srcRect/>
+          <a:stretch>
+            <a:fillRect/>
+          </a:stretch>
+        </p:blipFill>
+        <p:spPr bwMode="auto">
+          <a:xfrm>
+            <a:off x="861391" y="1306995"/>
+            <a:ext cx="3710609" cy="2122005"/>
+          </a:xfrm>
+          <a:prstGeom prst="roundRect">
+            <a:avLst>
+              <a:gd name="adj" fmla="val 4167"/>
+            </a:avLst>
+          </a:prstGeom>
+          <a:solidFill>
+            <a:srgbClr val="FFFFFF"/>
+          </a:solidFill>
+          <a:ln w="76200" cap="sq">
+            <a:solidFill>
+              <a:srgbClr val="292929"/>
+            </a:solidFill>
+            <a:miter lim="800000"/>
+          </a:ln>
+          <a:effectLst>
+            <a:reflection blurRad="12700" stA="28000" endPos="28000" dist="5000" dir="5400000" sy="-100000" algn="bl" rotWithShape="0"/>
+          </a:effectLst>
+          <a:scene3d>
+            <a:camera prst="orthographicFront"/>
+            <a:lightRig rig="threePt" dir="t">
+              <a:rot lat="0" lon="0" rev="2700000"/>
+            </a:lightRig>
+          </a:scene3d>
+          <a:sp3d>
+            <a:bevelT h="38100"/>
+            <a:contourClr>
+              <a:srgbClr val="C0C0C0"/>
+            </a:contourClr>
+          </a:sp3d>
+          <a:extLst>
+            <a:ext uri="{909E8E84-426E-40DD-AFC4-6F175D3DCCD1}">
+              <a14:hiddenFill xmlns:a14="http://schemas.microsoft.com/office/drawing/2010/main">
+                <a:solidFill>
+                  <a:srgbClr val="FFFFFF"/>
+                </a:solidFill>
+              </a14:hiddenFill>
+            </a:ext>
+          </a:extLst>
+        </p:spPr>
+      </p:pic>
+      <p:pic>
+        <p:nvPicPr>
+          <p:cNvPr id="5124" name="Picture 4" descr="Resultado de imagem para NodeJS">
+            <a:extLst>
+              <a:ext uri="{FF2B5EF4-FFF2-40B4-BE49-F238E27FC236}">
+                <a16:creationId xmlns:a16="http://schemas.microsoft.com/office/drawing/2014/main" id="{A9F5A231-3DC0-437C-A545-83AFB82518C2}"/>
+              </a:ext>
+            </a:extLst>
+          </p:cNvPr>
+          <p:cNvPicPr>
+            <a:picLocks noChangeAspect="1" noChangeArrowheads="1"/>
+          </p:cNvPicPr>
+          <p:nvPr/>
+        </p:nvPicPr>
+        <p:blipFill>
+          <a:blip r:embed="rId3">
+            <a:extLst>
+              <a:ext uri="{28A0092B-C50C-407E-A947-70E740481C1C}">
+                <a14:useLocalDpi xmlns:a14="http://schemas.microsoft.com/office/drawing/2010/main" val="0"/>
+              </a:ext>
+            </a:extLst>
+          </a:blip>
+          <a:srcRect/>
+          <a:stretch>
+            <a:fillRect/>
+          </a:stretch>
+        </p:blipFill>
+        <p:spPr bwMode="auto">
+          <a:xfrm>
+            <a:off x="5328384" y="2367997"/>
+            <a:ext cx="3469414" cy="2122005"/>
+          </a:xfrm>
+          <a:prstGeom prst="roundRect">
+            <a:avLst>
+              <a:gd name="adj" fmla="val 4167"/>
+            </a:avLst>
+          </a:prstGeom>
+          <a:solidFill>
+            <a:srgbClr val="FFFFFF"/>
+          </a:solidFill>
+          <a:ln w="76200" cap="sq">
+            <a:solidFill>
+              <a:srgbClr val="292929"/>
+            </a:solidFill>
+            <a:miter lim="800000"/>
+          </a:ln>
+          <a:effectLst>
+            <a:reflection blurRad="12700" stA="28000" endPos="28000" dist="5000" dir="5400000" sy="-100000" algn="bl" rotWithShape="0"/>
+          </a:effectLst>
+          <a:scene3d>
+            <a:camera prst="orthographicFront"/>
+            <a:lightRig rig="threePt" dir="t">
+              <a:rot lat="0" lon="0" rev="2700000"/>
+            </a:lightRig>
+          </a:scene3d>
+          <a:sp3d>
+            <a:bevelT h="38100"/>
+            <a:contourClr>
+              <a:srgbClr val="C0C0C0"/>
+            </a:contourClr>
+          </a:sp3d>
+          <a:extLst>
+            <a:ext uri="{909E8E84-426E-40DD-AFC4-6F175D3DCCD1}">
+              <a14:hiddenFill xmlns:a14="http://schemas.microsoft.com/office/drawing/2010/main">
+                <a:solidFill>
+                  <a:srgbClr val="FFFFFF"/>
+                </a:solidFill>
+              </a14:hiddenFill>
+            </a:ext>
+          </a:extLst>
+        </p:spPr>
+      </p:pic>
+      <p:pic>
+        <p:nvPicPr>
+          <p:cNvPr id="5126" name="Picture 6" descr="Resultado de imagem para MySQL">
+            <a:extLst>
+              <a:ext uri="{FF2B5EF4-FFF2-40B4-BE49-F238E27FC236}">
+                <a16:creationId xmlns:a16="http://schemas.microsoft.com/office/drawing/2014/main" id="{F137DCFD-2149-497B-8927-B466F747A025}"/>
+              </a:ext>
+            </a:extLst>
+          </p:cNvPr>
+          <p:cNvPicPr>
+            <a:picLocks noChangeAspect="1" noChangeArrowheads="1"/>
+          </p:cNvPicPr>
+          <p:nvPr/>
+        </p:nvPicPr>
+        <p:blipFill>
+          <a:blip r:embed="rId4">
+            <a:extLst>
+              <a:ext uri="{28A0092B-C50C-407E-A947-70E740481C1C}">
+                <a14:useLocalDpi xmlns:a14="http://schemas.microsoft.com/office/drawing/2010/main" val="0"/>
+              </a:ext>
+            </a:extLst>
+          </a:blip>
+          <a:srcRect/>
+          <a:stretch>
+            <a:fillRect/>
+          </a:stretch>
+        </p:blipFill>
+        <p:spPr bwMode="auto">
+          <a:xfrm>
+            <a:off x="855816" y="4556495"/>
+            <a:ext cx="3716184" cy="1916803"/>
+          </a:xfrm>
+          <a:prstGeom prst="roundRect">
+            <a:avLst>
+              <a:gd name="adj" fmla="val 4167"/>
+            </a:avLst>
+          </a:prstGeom>
+          <a:solidFill>
+            <a:srgbClr val="FFFFFF"/>
+          </a:solidFill>
+          <a:ln w="76200" cap="sq">
+            <a:solidFill>
+              <a:srgbClr val="292929"/>
+            </a:solidFill>
+            <a:miter lim="800000"/>
+          </a:ln>
+          <a:effectLst>
+            <a:reflection blurRad="12700" stA="28000" endPos="28000" dist="5000" dir="5400000" sy="-100000" algn="bl" rotWithShape="0"/>
+          </a:effectLst>
+          <a:scene3d>
+            <a:camera prst="orthographicFront"/>
+            <a:lightRig rig="threePt" dir="t">
+              <a:rot lat="0" lon="0" rev="2700000"/>
+            </a:lightRig>
+          </a:scene3d>
+          <a:sp3d>
+            <a:bevelT h="38100"/>
+            <a:contourClr>
+              <a:srgbClr val="C0C0C0"/>
+            </a:contourClr>
+          </a:sp3d>
+          <a:extLst>
+            <a:ext uri="{909E8E84-426E-40DD-AFC4-6F175D3DCCD1}">
+              <a14:hiddenFill xmlns:a14="http://schemas.microsoft.com/office/drawing/2010/main">
+                <a:solidFill>
+                  <a:srgbClr val="FFFFFF"/>
+                </a:solidFill>
+              </a14:hiddenFill>
+            </a:ext>
+          </a:extLst>
+        </p:spPr>
+      </p:pic>
+    </p:spTree>
+    <p:extLst>
+      <p:ext uri="{BB962C8B-B14F-4D97-AF65-F5344CB8AC3E}">
+        <p14:creationId xmlns:p14="http://schemas.microsoft.com/office/powerpoint/2010/main" val="2405544583"/>
+      </p:ext>
+    </p:extLst>
+  </p:cSld>
+  <p:clrMapOvr>
+    <a:masterClrMapping/>
+  </p:clrMapOvr>
+</p:sld>
+</file>
+
+<file path=ppt/slides/slide8.xml><?xml version="1.0" encoding="utf-8"?>
+<p:sld xmlns:a="http://schemas.openxmlformats.org/drawingml/2006/main" xmlns:r="http://schemas.openxmlformats.org/officeDocument/2006/relationships" xmlns:p="http://schemas.openxmlformats.org/presentationml/2006/main">
+  <p:cSld>
+    <p:spTree>
+      <p:nvGrpSpPr>
+        <p:cNvPr id="1" name=""/>
+        <p:cNvGrpSpPr/>
+        <p:nvPr/>
+      </p:nvGrpSpPr>
+      <p:grpSpPr>
+        <a:xfrm>
+          <a:off x="0" y="0"/>
+          <a:ext cx="0" cy="0"/>
+          <a:chOff x="0" y="0"/>
+          <a:chExt cx="0" cy="0"/>
+        </a:xfrm>
+      </p:grpSpPr>
+      <p:sp>
+        <p:nvSpPr>
+          <p:cNvPr id="4" name="Marcador de Posição do Número do Diapositivo 3">
+            <a:extLst>
+              <a:ext uri="{FF2B5EF4-FFF2-40B4-BE49-F238E27FC236}">
+                <a16:creationId xmlns:a16="http://schemas.microsoft.com/office/drawing/2014/main" id="{2C8D6143-976B-4BE9-80B1-A85199FF7C08}"/>
+              </a:ext>
+            </a:extLst>
+          </p:cNvPr>
+          <p:cNvSpPr>
+            <a:spLocks noGrp="1"/>
+          </p:cNvSpPr>
+          <p:nvPr>
+            <p:ph type="sldNum" sz="quarter" idx="12"/>
+          </p:nvPr>
+        </p:nvSpPr>
+        <p:spPr>
+          <a:xfrm>
+            <a:off x="8258967" y="6108173"/>
+            <a:ext cx="427833" cy="365125"/>
+          </a:xfrm>
+        </p:spPr>
+        <p:txBody>
+          <a:bodyPr/>
+          <a:lstStyle/>
+          <a:p>
+            <a:fld id="{D57F1E4F-1CFF-5643-939E-217C01CDF565}" type="slidenum">
+              <a:rPr lang="en-US" smtClean="0"/>
+              <a:pPr/>
+              <a:t>8</a:t>
+            </a:fld>
+            <a:endParaRPr lang="en-US" dirty="0"/>
+          </a:p>
+        </p:txBody>
+      </p:sp>
+      <p:pic>
+        <p:nvPicPr>
+          <p:cNvPr id="5" name="Picture 4" descr="Resultado de imagem para graph use of ReactJS against Angular">
+            <a:extLst>
+              <a:ext uri="{FF2B5EF4-FFF2-40B4-BE49-F238E27FC236}">
+                <a16:creationId xmlns:a16="http://schemas.microsoft.com/office/drawing/2014/main" id="{77FDCC23-6736-425A-B684-8800E88CB91D}"/>
+              </a:ext>
+            </a:extLst>
+          </p:cNvPr>
+          <p:cNvPicPr>
+            <a:picLocks noChangeAspect="1" noChangeArrowheads="1"/>
+          </p:cNvPicPr>
+          <p:nvPr/>
+        </p:nvPicPr>
+        <p:blipFill>
+          <a:blip r:embed="rId2">
+            <a:extLst>
+              <a:ext uri="{28A0092B-C50C-407E-A947-70E740481C1C}">
+                <a14:useLocalDpi xmlns:a14="http://schemas.microsoft.com/office/drawing/2010/main" val="0"/>
+              </a:ext>
+            </a:extLst>
+          </a:blip>
+          <a:srcRect/>
+          <a:stretch>
+            <a:fillRect/>
+          </a:stretch>
+        </p:blipFill>
+        <p:spPr bwMode="auto">
+          <a:xfrm>
+            <a:off x="895538" y="1927570"/>
+            <a:ext cx="7577345" cy="3201498"/>
+          </a:xfrm>
+          <a:prstGeom prst="rect">
+            <a:avLst/>
+          </a:prstGeom>
+          <a:noFill/>
+          <a:extLst>
+            <a:ext uri="{909E8E84-426E-40DD-AFC4-6F175D3DCCD1}">
+              <a14:hiddenFill xmlns:a14="http://schemas.microsoft.com/office/drawing/2010/main">
+                <a:solidFill>
+                  <a:srgbClr val="FFFFFF"/>
+                </a:solidFill>
+              </a14:hiddenFill>
+            </a:ext>
+          </a:extLst>
+        </p:spPr>
+      </p:pic>
+      <p:sp>
+        <p:nvSpPr>
+          <p:cNvPr id="17" name="Título 1">
+            <a:extLst>
+              <a:ext uri="{FF2B5EF4-FFF2-40B4-BE49-F238E27FC236}">
+                <a16:creationId xmlns:a16="http://schemas.microsoft.com/office/drawing/2014/main" id="{E898606A-C74A-4A7E-A284-8BF22BC0347A}"/>
+              </a:ext>
+            </a:extLst>
+          </p:cNvPr>
+          <p:cNvSpPr>
+            <a:spLocks noGrp="1"/>
+          </p:cNvSpPr>
+          <p:nvPr>
+            <p:ph type="title"/>
+          </p:nvPr>
+        </p:nvSpPr>
+        <p:spPr>
+          <a:xfrm>
+            <a:off x="982132" y="-1"/>
+            <a:ext cx="7704667" cy="1179443"/>
+          </a:xfrm>
+        </p:spPr>
+        <p:txBody>
+          <a:bodyPr/>
+          <a:lstStyle/>
+          <a:p>
+            <a:r>
+              <a:rPr lang="pt-PT" dirty="0" err="1"/>
+              <a:t>ReactJS</a:t>
+            </a:r>
+            <a:endParaRPr lang="pt-PT" dirty="0"/>
+          </a:p>
+        </p:txBody>
+      </p:sp>
+    </p:spTree>
+    <p:extLst>
+      <p:ext uri="{BB962C8B-B14F-4D97-AF65-F5344CB8AC3E}">
+        <p14:creationId xmlns:p14="http://schemas.microsoft.com/office/powerpoint/2010/main" val="157088739"/>
+      </p:ext>
+    </p:extLst>
+  </p:cSld>
+  <p:clrMapOvr>
+    <a:masterClrMapping/>
+  </p:clrMapOvr>
+</p:sld>
+</file>
+
+<file path=ppt/slides/slide9.xml><?xml version="1.0" encoding="utf-8"?>
+<p:sld xmlns:a="http://schemas.openxmlformats.org/drawingml/2006/main" xmlns:r="http://schemas.openxmlformats.org/officeDocument/2006/relationships" xmlns:p="http://schemas.openxmlformats.org/presentationml/2006/main">
+  <p:cSld>
+    <p:spTree>
+      <p:nvGrpSpPr>
+        <p:cNvPr id="1" name=""/>
+        <p:cNvGrpSpPr/>
+        <p:nvPr/>
+      </p:nvGrpSpPr>
+      <p:grpSpPr>
+        <a:xfrm>
+          <a:off x="0" y="0"/>
+          <a:ext cx="0" cy="0"/>
+          <a:chOff x="0" y="0"/>
+          <a:chExt cx="0" cy="0"/>
+        </a:xfrm>
+      </p:grpSpPr>
+      <p:sp>
+        <p:nvSpPr>
+          <p:cNvPr id="4" name="Marcador de Posição do Número do Diapositivo 3">
+            <a:extLst>
+              <a:ext uri="{FF2B5EF4-FFF2-40B4-BE49-F238E27FC236}">
+                <a16:creationId xmlns:a16="http://schemas.microsoft.com/office/drawing/2014/main" id="{766665C1-966A-44D9-8227-62CCEB3F2D7E}"/>
+              </a:ext>
+            </a:extLst>
+          </p:cNvPr>
+          <p:cNvSpPr>
+            <a:spLocks noGrp="1"/>
+          </p:cNvSpPr>
+          <p:nvPr>
+            <p:ph type="sldNum" sz="quarter" idx="12"/>
+          </p:nvPr>
+        </p:nvSpPr>
+        <p:spPr/>
+        <p:txBody>
+          <a:bodyPr/>
+          <a:lstStyle/>
+          <a:p>
+            <a:fld id="{D57F1E4F-1CFF-5643-939E-217C01CDF565}" type="slidenum">
+              <a:rPr lang="en-US" smtClean="0"/>
+              <a:pPr/>
+              <a:t>9</a:t>
+            </a:fld>
+            <a:endParaRPr lang="en-US" dirty="0"/>
+          </a:p>
+        </p:txBody>
+      </p:sp>
+      <p:sp>
+        <p:nvSpPr>
+          <p:cNvPr id="5" name="Título 1">
+            <a:extLst>
+              <a:ext uri="{FF2B5EF4-FFF2-40B4-BE49-F238E27FC236}">
+                <a16:creationId xmlns:a16="http://schemas.microsoft.com/office/drawing/2014/main" id="{7946794C-AF19-4049-BA5B-EC9ABEF5256A}"/>
+              </a:ext>
+            </a:extLst>
+          </p:cNvPr>
+          <p:cNvSpPr>
+            <a:spLocks noGrp="1"/>
+          </p:cNvSpPr>
+          <p:nvPr>
+            <p:ph type="title"/>
+          </p:nvPr>
+        </p:nvSpPr>
+        <p:spPr>
+          <a:xfrm>
+            <a:off x="982132" y="-1"/>
+            <a:ext cx="7704667" cy="1179443"/>
+          </a:xfrm>
+        </p:spPr>
+        <p:txBody>
+          <a:bodyPr/>
+          <a:lstStyle/>
+          <a:p>
+            <a:r>
+              <a:rPr lang="pt-PT" dirty="0" err="1"/>
+              <a:t>NodeJS</a:t>
+            </a:r>
+            <a:endParaRPr lang="pt-PT" dirty="0"/>
+          </a:p>
+        </p:txBody>
+      </p:sp>
+      <p:pic>
+        <p:nvPicPr>
+          <p:cNvPr id="6146" name="Picture 2" descr="http://www.deadcoderising.com/content/images/2017/09/successful_callback.gif">
+            <a:extLst>
+              <a:ext uri="{FF2B5EF4-FFF2-40B4-BE49-F238E27FC236}">
+                <a16:creationId xmlns:a16="http://schemas.microsoft.com/office/drawing/2014/main" id="{BFB7B800-D289-43E9-8949-9DF4189B3793}"/>
+              </a:ext>
+            </a:extLst>
+          </p:cNvPr>
+          <p:cNvPicPr>
+            <a:picLocks noChangeAspect="1" noChangeArrowheads="1" noCrop="1"/>
+          </p:cNvPicPr>
+          <p:nvPr/>
+        </p:nvPicPr>
+        <p:blipFill>
+          <a:blip r:embed="rId2">
+            <a:extLst>
+              <a:ext uri="{28A0092B-C50C-407E-A947-70E740481C1C}">
+                <a14:useLocalDpi xmlns:a14="http://schemas.microsoft.com/office/drawing/2010/main" val="0"/>
+              </a:ext>
+            </a:extLst>
+          </a:blip>
+          <a:srcRect/>
+          <a:stretch>
+            <a:fillRect/>
+          </a:stretch>
+        </p:blipFill>
+        <p:spPr bwMode="auto">
+          <a:xfrm>
+            <a:off x="982132" y="1260200"/>
+            <a:ext cx="7923304" cy="2435914"/>
+          </a:xfrm>
+          <a:prstGeom prst="rect">
+            <a:avLst/>
+          </a:prstGeom>
+          <a:noFill/>
+          <a:extLst>
+            <a:ext uri="{909E8E84-426E-40DD-AFC4-6F175D3DCCD1}">
+              <a14:hiddenFill xmlns:a14="http://schemas.microsoft.com/office/drawing/2010/main">
+                <a:solidFill>
+                  <a:srgbClr val="FFFFFF"/>
+                </a:solidFill>
+              </a14:hiddenFill>
+            </a:ext>
+          </a:extLst>
+        </p:spPr>
+      </p:pic>
+      <p:graphicFrame>
+        <p:nvGraphicFramePr>
+          <p:cNvPr id="6" name="Tabela 5">
+            <a:extLst>
+              <a:ext uri="{FF2B5EF4-FFF2-40B4-BE49-F238E27FC236}">
+                <a16:creationId xmlns:a16="http://schemas.microsoft.com/office/drawing/2014/main" id="{30EAFAF2-585B-4FDF-BB1F-F8B5D4E50FBF}"/>
+              </a:ext>
+            </a:extLst>
+          </p:cNvPr>
+          <p:cNvGraphicFramePr>
+            <a:graphicFrameLocks noGrp="1"/>
+          </p:cNvGraphicFramePr>
+          <p:nvPr>
+            <p:extLst>
+              <p:ext uri="{D42A27DB-BD31-4B8C-83A1-F6EECF244321}">
+                <p14:modId xmlns:p14="http://schemas.microsoft.com/office/powerpoint/2010/main" val="1803345138"/>
+              </p:ext>
+            </p:extLst>
+          </p:nvPr>
+        </p:nvGraphicFramePr>
+        <p:xfrm>
+          <a:off x="1789043" y="4272722"/>
+          <a:ext cx="6093422" cy="2291080"/>
+        </p:xfrm>
+        <a:graphic>
+          <a:graphicData uri="http://schemas.openxmlformats.org/drawingml/2006/table">
+            <a:tbl>
+              <a:tblPr firstRow="1" bandRow="1">
+                <a:tableStyleId>{5C22544A-7EE6-4342-B048-85BDC9FD1C3A}</a:tableStyleId>
+              </a:tblPr>
+              <a:tblGrid>
+                <a:gridCol w="2040835">
+                  <a:extLst>
+                    <a:ext uri="{9D8B030D-6E8A-4147-A177-3AD203B41FA5}">
+                      <a16:colId xmlns:a16="http://schemas.microsoft.com/office/drawing/2014/main" val="2256973016"/>
+                    </a:ext>
+                  </a:extLst>
+                </a:gridCol>
+                <a:gridCol w="4052587">
+                  <a:extLst>
+                    <a:ext uri="{9D8B030D-6E8A-4147-A177-3AD203B41FA5}">
+                      <a16:colId xmlns:a16="http://schemas.microsoft.com/office/drawing/2014/main" val="116857977"/>
+                    </a:ext>
+                  </a:extLst>
+                </a:gridCol>
+              </a:tblGrid>
+              <a:tr h="370840">
+                <a:tc gridSpan="2">
+                  <a:txBody>
+                    <a:bodyPr/>
+                    <a:lstStyle/>
+                    <a:p>
+                      <a:pPr algn="ctr"/>
+                      <a:r>
+                        <a:rPr lang="pt-PT" dirty="0">
+                          <a:latin typeface="Times New Roman" panose="02020603050405020304" pitchFamily="18" charset="0"/>
+                          <a:cs typeface="Times New Roman" panose="02020603050405020304" pitchFamily="18" charset="0"/>
+                        </a:rPr>
+                        <a:t>Sistema de Módulos</a:t>
+                      </a:r>
+                    </a:p>
+                  </a:txBody>
+                  <a:tcPr/>
+                </a:tc>
+                <a:tc hMerge="1">
+                  <a:txBody>
+                    <a:bodyPr/>
+                    <a:lstStyle/>
+                    <a:p>
+                      <a:endParaRPr lang="pt-PT" dirty="0"/>
+                    </a:p>
+                  </a:txBody>
+                  <a:tcPr/>
+                </a:tc>
+                <a:extLst>
+                  <a:ext uri="{0D108BD9-81ED-4DB2-BD59-A6C34878D82A}">
+                    <a16:rowId xmlns:a16="http://schemas.microsoft.com/office/drawing/2014/main" val="133878433"/>
+                  </a:ext>
+                </a:extLst>
+              </a:tr>
+              <a:tr h="370840">
+                <a:tc>
+                  <a:txBody>
+                    <a:bodyPr/>
+                    <a:lstStyle/>
+                    <a:p>
+                      <a:pPr algn="ctr"/>
+                      <a:r>
+                        <a:rPr lang="pt-PT" dirty="0"/>
+                        <a:t>Nativo</a:t>
+                      </a:r>
+                    </a:p>
+                  </a:txBody>
+                  <a:tcPr anchor="ctr"/>
+                </a:tc>
+                <a:tc>
+                  <a:txBody>
+                    <a:bodyPr/>
+                    <a:lstStyle/>
+                    <a:p>
+                      <a:r>
+                        <a:rPr lang="pt-PT" dirty="0"/>
+                        <a:t>Módulos que já vem instalados com o </a:t>
+                      </a:r>
+                      <a:r>
+                        <a:rPr lang="pt-PT" dirty="0" err="1"/>
+                        <a:t>NodeJS</a:t>
+                      </a:r>
+                      <a:endParaRPr lang="pt-PT" dirty="0"/>
+                    </a:p>
+                  </a:txBody>
+                  <a:tcPr anchor="ctr"/>
+                </a:tc>
+                <a:extLst>
+                  <a:ext uri="{0D108BD9-81ED-4DB2-BD59-A6C34878D82A}">
+                    <a16:rowId xmlns:a16="http://schemas.microsoft.com/office/drawing/2014/main" val="4115125092"/>
+                  </a:ext>
+                </a:extLst>
+              </a:tr>
+              <a:tr h="370840">
+                <a:tc>
+                  <a:txBody>
+                    <a:bodyPr/>
+                    <a:lstStyle/>
+                    <a:p>
+                      <a:pPr algn="ctr"/>
+                      <a:r>
+                        <a:rPr lang="pt-PT" dirty="0"/>
+                        <a:t>Terceiros</a:t>
+                      </a:r>
+                    </a:p>
+                  </a:txBody>
+                  <a:tcPr anchor="ctr"/>
+                </a:tc>
+                <a:tc>
+                  <a:txBody>
+                    <a:bodyPr/>
+                    <a:lstStyle/>
+                    <a:p>
+                      <a:r>
+                        <a:rPr lang="pt-PT" dirty="0"/>
+                        <a:t>Módulos de terceiros, instalados a partir de pacotes em repositórios</a:t>
+                      </a:r>
+                    </a:p>
+                  </a:txBody>
+                  <a:tcPr anchor="ctr"/>
+                </a:tc>
+                <a:extLst>
+                  <a:ext uri="{0D108BD9-81ED-4DB2-BD59-A6C34878D82A}">
+                    <a16:rowId xmlns:a16="http://schemas.microsoft.com/office/drawing/2014/main" val="535509901"/>
+                  </a:ext>
+                </a:extLst>
+              </a:tr>
+              <a:tr h="370840">
+                <a:tc>
+                  <a:txBody>
+                    <a:bodyPr/>
+                    <a:lstStyle/>
+                    <a:p>
+                      <a:pPr algn="ctr"/>
+                      <a:r>
+                        <a:rPr lang="pt-PT" dirty="0"/>
+                        <a:t>Locais</a:t>
+                      </a:r>
+                    </a:p>
+                  </a:txBody>
+                  <a:tcPr anchor="ctr"/>
+                </a:tc>
+                <a:tc>
+                  <a:txBody>
+                    <a:bodyPr/>
+                    <a:lstStyle/>
+                    <a:p>
+                      <a:r>
+                        <a:rPr lang="pt-PT" dirty="0"/>
+                        <a:t>Módulos criados pelo próprio programador</a:t>
+                      </a:r>
+                    </a:p>
+                  </a:txBody>
+                  <a:tcPr anchor="ctr"/>
+                </a:tc>
+                <a:extLst>
+                  <a:ext uri="{0D108BD9-81ED-4DB2-BD59-A6C34878D82A}">
+                    <a16:rowId xmlns:a16="http://schemas.microsoft.com/office/drawing/2014/main" val="3050176609"/>
+                  </a:ext>
+                </a:extLst>
+              </a:tr>
+            </a:tbl>
+          </a:graphicData>
+        </a:graphic>
+      </p:graphicFrame>
+    </p:spTree>
+    <p:extLst>
+      <p:ext uri="{BB962C8B-B14F-4D97-AF65-F5344CB8AC3E}">
+        <p14:creationId xmlns:p14="http://schemas.microsoft.com/office/powerpoint/2010/main" val="1317074521"/>
       </p:ext>
     </p:extLst>
   </p:cSld>

</xml_diff>